<commit_message>
polymer_builder set substructure coordinates
</commit_message>
<xml_diff>
--- a/docs/power_point/nemd.pptx
+++ b/docs/power_point/nemd.pptx
@@ -4,6 +4,9 @@
   <p:sldMasterIdLst>
     <p:sldMasterId id="2147483648" r:id="rId1"/>
   </p:sldMasterIdLst>
+  <p:notesMasterIdLst>
+    <p:notesMasterId r:id="rId7"/>
+  </p:notesMasterIdLst>
   <p:sldIdLst>
     <p:sldId id="256" r:id="rId2"/>
     <p:sldId id="257" r:id="rId3"/>
@@ -108,7 +111,2982 @@
       </a:defRPr>
     </a:lvl9pPr>
   </p:defaultTextStyle>
+  <p:extLst>
+    <p:ext uri="{EFAFB233-063F-42B5-8137-9DF3F51BA10A}">
+      <p15:sldGuideLst xmlns:p15="http://schemas.microsoft.com/office/powerpoint/2012/main"/>
+    </p:ext>
+  </p:extLst>
 </p:presentation>
+</file>
+
+<file path=ppt/diagrams/colors1.xml><?xml version="1.0" encoding="utf-8"?>
+<dgm:colorsDef xmlns:dgm="http://schemas.openxmlformats.org/drawingml/2006/diagram" xmlns:a="http://schemas.openxmlformats.org/drawingml/2006/main" uniqueId="urn:microsoft.com/office/officeart/2005/8/colors/colorful4">
+  <dgm:title val=""/>
+  <dgm:desc val=""/>
+  <dgm:catLst>
+    <dgm:cat type="colorful" pri="10400"/>
+  </dgm:catLst>
+  <dgm:styleLbl name="node0">
+    <dgm:fillClrLst meth="repeat">
+      <a:schemeClr val="accent3"/>
+    </dgm:fillClrLst>
+    <dgm:linClrLst meth="repeat">
+      <a:schemeClr val="lt1"/>
+    </dgm:linClrLst>
+    <dgm:effectClrLst/>
+    <dgm:txLinClrLst/>
+    <dgm:txFillClrLst/>
+    <dgm:txEffectClrLst/>
+  </dgm:styleLbl>
+  <dgm:styleLbl name="node1">
+    <dgm:fillClrLst>
+      <a:schemeClr val="accent4"/>
+      <a:schemeClr val="accent5"/>
+    </dgm:fillClrLst>
+    <dgm:linClrLst meth="repeat">
+      <a:schemeClr val="lt1"/>
+    </dgm:linClrLst>
+    <dgm:effectClrLst/>
+    <dgm:txLinClrLst/>
+    <dgm:txFillClrLst/>
+    <dgm:txEffectClrLst/>
+  </dgm:styleLbl>
+  <dgm:styleLbl name="alignNode1">
+    <dgm:fillClrLst>
+      <a:schemeClr val="accent4"/>
+      <a:schemeClr val="accent5"/>
+    </dgm:fillClrLst>
+    <dgm:linClrLst>
+      <a:schemeClr val="accent4"/>
+      <a:schemeClr val="accent5"/>
+    </dgm:linClrLst>
+    <dgm:effectClrLst/>
+    <dgm:txLinClrLst/>
+    <dgm:txFillClrLst/>
+    <dgm:txEffectClrLst/>
+  </dgm:styleLbl>
+  <dgm:styleLbl name="lnNode1">
+    <dgm:fillClrLst>
+      <a:schemeClr val="accent4"/>
+      <a:schemeClr val="accent5"/>
+    </dgm:fillClrLst>
+    <dgm:linClrLst meth="repeat">
+      <a:schemeClr val="lt1"/>
+    </dgm:linClrLst>
+    <dgm:effectClrLst/>
+    <dgm:txLinClrLst/>
+    <dgm:txFillClrLst/>
+    <dgm:txEffectClrLst/>
+  </dgm:styleLbl>
+  <dgm:styleLbl name="vennNode1">
+    <dgm:fillClrLst>
+      <a:schemeClr val="accent4">
+        <a:alpha val="50000"/>
+      </a:schemeClr>
+      <a:schemeClr val="accent5">
+        <a:alpha val="50000"/>
+      </a:schemeClr>
+    </dgm:fillClrLst>
+    <dgm:linClrLst meth="repeat">
+      <a:schemeClr val="lt1"/>
+    </dgm:linClrLst>
+    <dgm:effectClrLst/>
+    <dgm:txLinClrLst/>
+    <dgm:txFillClrLst/>
+    <dgm:txEffectClrLst/>
+  </dgm:styleLbl>
+  <dgm:styleLbl name="node2">
+    <dgm:fillClrLst>
+      <a:schemeClr val="accent5"/>
+    </dgm:fillClrLst>
+    <dgm:linClrLst meth="repeat">
+      <a:schemeClr val="lt1"/>
+    </dgm:linClrLst>
+    <dgm:effectClrLst/>
+    <dgm:txLinClrLst/>
+    <dgm:txFillClrLst/>
+    <dgm:txEffectClrLst/>
+  </dgm:styleLbl>
+  <dgm:styleLbl name="node3">
+    <dgm:fillClrLst>
+      <a:schemeClr val="accent6"/>
+    </dgm:fillClrLst>
+    <dgm:linClrLst meth="repeat">
+      <a:schemeClr val="lt1"/>
+    </dgm:linClrLst>
+    <dgm:effectClrLst/>
+    <dgm:txLinClrLst/>
+    <dgm:txFillClrLst/>
+    <dgm:txEffectClrLst/>
+  </dgm:styleLbl>
+  <dgm:styleLbl name="node4">
+    <dgm:fillClrLst>
+      <a:schemeClr val="accent1"/>
+    </dgm:fillClrLst>
+    <dgm:linClrLst meth="repeat">
+      <a:schemeClr val="lt1"/>
+    </dgm:linClrLst>
+    <dgm:effectClrLst/>
+    <dgm:txLinClrLst/>
+    <dgm:txFillClrLst/>
+    <dgm:txEffectClrLst/>
+  </dgm:styleLbl>
+  <dgm:styleLbl name="fgImgPlace1">
+    <dgm:fillClrLst>
+      <a:schemeClr val="accent4">
+        <a:tint val="50000"/>
+      </a:schemeClr>
+      <a:schemeClr val="accent5">
+        <a:tint val="50000"/>
+      </a:schemeClr>
+    </dgm:fillClrLst>
+    <dgm:linClrLst meth="repeat">
+      <a:schemeClr val="lt1"/>
+    </dgm:linClrLst>
+    <dgm:effectClrLst/>
+    <dgm:txLinClrLst/>
+    <dgm:txFillClrLst meth="repeat">
+      <a:schemeClr val="lt1"/>
+    </dgm:txFillClrLst>
+    <dgm:txEffectClrLst/>
+  </dgm:styleLbl>
+  <dgm:styleLbl name="alignImgPlace1">
+    <dgm:fillClrLst>
+      <a:schemeClr val="accent4">
+        <a:tint val="50000"/>
+      </a:schemeClr>
+      <a:schemeClr val="accent5">
+        <a:tint val="20000"/>
+      </a:schemeClr>
+    </dgm:fillClrLst>
+    <dgm:linClrLst meth="repeat">
+      <a:schemeClr val="lt1"/>
+    </dgm:linClrLst>
+    <dgm:effectClrLst/>
+    <dgm:txLinClrLst/>
+    <dgm:txFillClrLst meth="repeat">
+      <a:schemeClr val="lt1"/>
+    </dgm:txFillClrLst>
+    <dgm:txEffectClrLst/>
+  </dgm:styleLbl>
+  <dgm:styleLbl name="bgImgPlace1">
+    <dgm:fillClrLst>
+      <a:schemeClr val="accent4">
+        <a:tint val="50000"/>
+      </a:schemeClr>
+      <a:schemeClr val="accent5">
+        <a:tint val="20000"/>
+      </a:schemeClr>
+    </dgm:fillClrLst>
+    <dgm:linClrLst meth="repeat">
+      <a:schemeClr val="lt1"/>
+    </dgm:linClrLst>
+    <dgm:effectClrLst/>
+    <dgm:txLinClrLst/>
+    <dgm:txFillClrLst meth="repeat">
+      <a:schemeClr val="lt1"/>
+    </dgm:txFillClrLst>
+    <dgm:txEffectClrLst/>
+  </dgm:styleLbl>
+  <dgm:styleLbl name="sibTrans2D1">
+    <dgm:fillClrLst>
+      <a:schemeClr val="accent4"/>
+      <a:schemeClr val="accent5"/>
+    </dgm:fillClrLst>
+    <dgm:linClrLst meth="repeat">
+      <a:schemeClr val="lt1"/>
+    </dgm:linClrLst>
+    <dgm:effectClrLst/>
+    <dgm:txLinClrLst/>
+    <dgm:txFillClrLst/>
+    <dgm:txEffectClrLst/>
+  </dgm:styleLbl>
+  <dgm:styleLbl name="fgSibTrans2D1">
+    <dgm:fillClrLst>
+      <a:schemeClr val="accent4"/>
+      <a:schemeClr val="accent5"/>
+    </dgm:fillClrLst>
+    <dgm:linClrLst meth="repeat">
+      <a:schemeClr val="lt1"/>
+    </dgm:linClrLst>
+    <dgm:effectClrLst/>
+    <dgm:txLinClrLst/>
+    <dgm:txFillClrLst meth="repeat">
+      <a:schemeClr val="lt1"/>
+    </dgm:txFillClrLst>
+    <dgm:txEffectClrLst/>
+  </dgm:styleLbl>
+  <dgm:styleLbl name="bgSibTrans2D1">
+    <dgm:fillClrLst>
+      <a:schemeClr val="accent4"/>
+      <a:schemeClr val="accent5"/>
+    </dgm:fillClrLst>
+    <dgm:linClrLst meth="repeat">
+      <a:schemeClr val="lt1"/>
+    </dgm:linClrLst>
+    <dgm:effectClrLst/>
+    <dgm:txLinClrLst/>
+    <dgm:txFillClrLst meth="repeat">
+      <a:schemeClr val="lt1"/>
+    </dgm:txFillClrLst>
+    <dgm:txEffectClrLst/>
+  </dgm:styleLbl>
+  <dgm:styleLbl name="sibTrans1D1">
+    <dgm:fillClrLst/>
+    <dgm:linClrLst>
+      <a:schemeClr val="accent4"/>
+      <a:schemeClr val="accent5"/>
+    </dgm:linClrLst>
+    <dgm:effectClrLst/>
+    <dgm:txLinClrLst/>
+    <dgm:txFillClrLst meth="repeat">
+      <a:schemeClr val="tx1"/>
+    </dgm:txFillClrLst>
+    <dgm:txEffectClrLst/>
+  </dgm:styleLbl>
+  <dgm:styleLbl name="callout">
+    <dgm:fillClrLst meth="repeat">
+      <a:schemeClr val="accent4"/>
+    </dgm:fillClrLst>
+    <dgm:linClrLst meth="repeat">
+      <a:schemeClr val="accent4">
+        <a:tint val="50000"/>
+      </a:schemeClr>
+    </dgm:linClrLst>
+    <dgm:effectClrLst/>
+    <dgm:txLinClrLst/>
+    <dgm:txFillClrLst meth="repeat">
+      <a:schemeClr val="tx1"/>
+    </dgm:txFillClrLst>
+    <dgm:txEffectClrLst/>
+  </dgm:styleLbl>
+  <dgm:styleLbl name="asst0">
+    <dgm:fillClrLst meth="repeat">
+      <a:schemeClr val="accent4"/>
+    </dgm:fillClrLst>
+    <dgm:linClrLst meth="repeat">
+      <a:schemeClr val="lt1">
+        <a:shade val="80000"/>
+      </a:schemeClr>
+    </dgm:linClrLst>
+    <dgm:effectClrLst/>
+    <dgm:txLinClrLst/>
+    <dgm:txFillClrLst/>
+    <dgm:txEffectClrLst/>
+  </dgm:styleLbl>
+  <dgm:styleLbl name="asst1">
+    <dgm:fillClrLst meth="repeat">
+      <a:schemeClr val="accent5"/>
+    </dgm:fillClrLst>
+    <dgm:linClrLst meth="repeat">
+      <a:schemeClr val="lt1">
+        <a:shade val="80000"/>
+      </a:schemeClr>
+    </dgm:linClrLst>
+    <dgm:effectClrLst/>
+    <dgm:txLinClrLst/>
+    <dgm:txFillClrLst/>
+    <dgm:txEffectClrLst/>
+  </dgm:styleLbl>
+  <dgm:styleLbl name="asst2">
+    <dgm:fillClrLst>
+      <a:schemeClr val="accent6"/>
+    </dgm:fillClrLst>
+    <dgm:linClrLst meth="repeat">
+      <a:schemeClr val="lt1"/>
+    </dgm:linClrLst>
+    <dgm:effectClrLst/>
+    <dgm:txLinClrLst/>
+    <dgm:txFillClrLst/>
+    <dgm:txEffectClrLst/>
+  </dgm:styleLbl>
+  <dgm:styleLbl name="asst3">
+    <dgm:fillClrLst>
+      <a:schemeClr val="accent1"/>
+    </dgm:fillClrLst>
+    <dgm:linClrLst meth="repeat">
+      <a:schemeClr val="lt1"/>
+    </dgm:linClrLst>
+    <dgm:effectClrLst/>
+    <dgm:txLinClrLst/>
+    <dgm:txFillClrLst/>
+    <dgm:txEffectClrLst/>
+  </dgm:styleLbl>
+  <dgm:styleLbl name="asst4">
+    <dgm:fillClrLst>
+      <a:schemeClr val="accent2"/>
+    </dgm:fillClrLst>
+    <dgm:linClrLst meth="repeat">
+      <a:schemeClr val="lt1"/>
+    </dgm:linClrLst>
+    <dgm:effectClrLst/>
+    <dgm:txLinClrLst/>
+    <dgm:txFillClrLst/>
+    <dgm:txEffectClrLst/>
+  </dgm:styleLbl>
+  <dgm:styleLbl name="parChTrans2D1">
+    <dgm:fillClrLst meth="repeat">
+      <a:schemeClr val="accent4"/>
+    </dgm:fillClrLst>
+    <dgm:linClrLst meth="repeat">
+      <a:schemeClr val="lt1"/>
+    </dgm:linClrLst>
+    <dgm:effectClrLst/>
+    <dgm:txLinClrLst/>
+    <dgm:txFillClrLst meth="repeat">
+      <a:schemeClr val="lt1"/>
+    </dgm:txFillClrLst>
+    <dgm:txEffectClrLst/>
+  </dgm:styleLbl>
+  <dgm:styleLbl name="parChTrans2D2">
+    <dgm:fillClrLst meth="repeat">
+      <a:schemeClr val="accent5"/>
+    </dgm:fillClrLst>
+    <dgm:linClrLst meth="repeat">
+      <a:schemeClr val="lt1"/>
+    </dgm:linClrLst>
+    <dgm:effectClrLst/>
+    <dgm:txLinClrLst/>
+    <dgm:txFillClrLst/>
+    <dgm:txEffectClrLst/>
+  </dgm:styleLbl>
+  <dgm:styleLbl name="parChTrans2D3">
+    <dgm:fillClrLst meth="repeat">
+      <a:schemeClr val="accent5"/>
+    </dgm:fillClrLst>
+    <dgm:linClrLst meth="repeat">
+      <a:schemeClr val="lt1"/>
+    </dgm:linClrLst>
+    <dgm:effectClrLst/>
+    <dgm:txLinClrLst/>
+    <dgm:txFillClrLst/>
+    <dgm:txEffectClrLst/>
+  </dgm:styleLbl>
+  <dgm:styleLbl name="parChTrans2D4">
+    <dgm:fillClrLst meth="repeat">
+      <a:schemeClr val="accent6"/>
+    </dgm:fillClrLst>
+    <dgm:linClrLst meth="repeat">
+      <a:schemeClr val="lt1"/>
+    </dgm:linClrLst>
+    <dgm:effectClrLst/>
+    <dgm:txLinClrLst/>
+    <dgm:txFillClrLst meth="repeat">
+      <a:schemeClr val="lt1"/>
+    </dgm:txFillClrLst>
+    <dgm:txEffectClrLst/>
+  </dgm:styleLbl>
+  <dgm:styleLbl name="parChTrans1D1">
+    <dgm:fillClrLst meth="repeat">
+      <a:schemeClr val="accent4"/>
+    </dgm:fillClrLst>
+    <dgm:linClrLst meth="repeat">
+      <a:schemeClr val="accent4"/>
+    </dgm:linClrLst>
+    <dgm:effectClrLst/>
+    <dgm:txLinClrLst/>
+    <dgm:txFillClrLst meth="repeat">
+      <a:schemeClr val="tx1"/>
+    </dgm:txFillClrLst>
+    <dgm:txEffectClrLst/>
+  </dgm:styleLbl>
+  <dgm:styleLbl name="parChTrans1D2">
+    <dgm:fillClrLst meth="repeat">
+      <a:schemeClr val="accent4">
+        <a:tint val="90000"/>
+      </a:schemeClr>
+    </dgm:fillClrLst>
+    <dgm:linClrLst meth="repeat">
+      <a:schemeClr val="accent5"/>
+    </dgm:linClrLst>
+    <dgm:effectClrLst/>
+    <dgm:txLinClrLst/>
+    <dgm:txFillClrLst meth="repeat">
+      <a:schemeClr val="tx1"/>
+    </dgm:txFillClrLst>
+    <dgm:txEffectClrLst/>
+  </dgm:styleLbl>
+  <dgm:styleLbl name="parChTrans1D3">
+    <dgm:fillClrLst meth="repeat">
+      <a:schemeClr val="accent4">
+        <a:tint val="70000"/>
+      </a:schemeClr>
+    </dgm:fillClrLst>
+    <dgm:linClrLst meth="repeat">
+      <a:schemeClr val="accent6"/>
+    </dgm:linClrLst>
+    <dgm:effectClrLst/>
+    <dgm:txLinClrLst/>
+    <dgm:txFillClrLst meth="repeat">
+      <a:schemeClr val="tx1"/>
+    </dgm:txFillClrLst>
+    <dgm:txEffectClrLst/>
+  </dgm:styleLbl>
+  <dgm:styleLbl name="parChTrans1D4">
+    <dgm:fillClrLst meth="repeat">
+      <a:schemeClr val="accent4">
+        <a:tint val="50000"/>
+      </a:schemeClr>
+    </dgm:fillClrLst>
+    <dgm:linClrLst meth="repeat">
+      <a:schemeClr val="accent1"/>
+    </dgm:linClrLst>
+    <dgm:effectClrLst/>
+    <dgm:txLinClrLst/>
+    <dgm:txFillClrLst meth="repeat">
+      <a:schemeClr val="tx1"/>
+    </dgm:txFillClrLst>
+    <dgm:txEffectClrLst/>
+  </dgm:styleLbl>
+  <dgm:styleLbl name="fgAcc1">
+    <dgm:fillClrLst meth="repeat">
+      <a:schemeClr val="lt1">
+        <a:alpha val="90000"/>
+      </a:schemeClr>
+    </dgm:fillClrLst>
+    <dgm:linClrLst>
+      <a:schemeClr val="accent4"/>
+      <a:schemeClr val="accent5"/>
+    </dgm:linClrLst>
+    <dgm:effectClrLst/>
+    <dgm:txLinClrLst/>
+    <dgm:txFillClrLst meth="repeat">
+      <a:schemeClr val="dk1"/>
+    </dgm:txFillClrLst>
+    <dgm:txEffectClrLst/>
+  </dgm:styleLbl>
+  <dgm:styleLbl name="conFgAcc1">
+    <dgm:fillClrLst meth="repeat">
+      <a:schemeClr val="lt1">
+        <a:alpha val="90000"/>
+      </a:schemeClr>
+    </dgm:fillClrLst>
+    <dgm:linClrLst>
+      <a:schemeClr val="accent4"/>
+      <a:schemeClr val="accent5"/>
+    </dgm:linClrLst>
+    <dgm:effectClrLst/>
+    <dgm:txLinClrLst/>
+    <dgm:txFillClrLst meth="repeat">
+      <a:schemeClr val="dk1"/>
+    </dgm:txFillClrLst>
+    <dgm:txEffectClrLst/>
+  </dgm:styleLbl>
+  <dgm:styleLbl name="alignAcc1">
+    <dgm:fillClrLst meth="repeat">
+      <a:schemeClr val="lt1">
+        <a:alpha val="90000"/>
+      </a:schemeClr>
+    </dgm:fillClrLst>
+    <dgm:linClrLst>
+      <a:schemeClr val="accent4"/>
+      <a:schemeClr val="accent5"/>
+    </dgm:linClrLst>
+    <dgm:effectClrLst/>
+    <dgm:txLinClrLst/>
+    <dgm:txFillClrLst meth="repeat">
+      <a:schemeClr val="dk1"/>
+    </dgm:txFillClrLst>
+    <dgm:txEffectClrLst/>
+  </dgm:styleLbl>
+  <dgm:styleLbl name="trAlignAcc1">
+    <dgm:fillClrLst meth="repeat">
+      <a:schemeClr val="lt1">
+        <a:alpha val="40000"/>
+      </a:schemeClr>
+    </dgm:fillClrLst>
+    <dgm:linClrLst meth="repeat">
+      <a:schemeClr val="accent4"/>
+    </dgm:linClrLst>
+    <dgm:effectClrLst/>
+    <dgm:txLinClrLst/>
+    <dgm:txFillClrLst meth="repeat">
+      <a:schemeClr val="dk1"/>
+    </dgm:txFillClrLst>
+    <dgm:txEffectClrLst/>
+  </dgm:styleLbl>
+  <dgm:styleLbl name="bgAcc1">
+    <dgm:fillClrLst meth="repeat">
+      <a:schemeClr val="lt1">
+        <a:alpha val="90000"/>
+      </a:schemeClr>
+    </dgm:fillClrLst>
+    <dgm:linClrLst>
+      <a:schemeClr val="accent4"/>
+      <a:schemeClr val="accent5"/>
+    </dgm:linClrLst>
+    <dgm:effectClrLst/>
+    <dgm:txLinClrLst/>
+    <dgm:txFillClrLst meth="repeat">
+      <a:schemeClr val="dk1"/>
+    </dgm:txFillClrLst>
+    <dgm:txEffectClrLst/>
+  </dgm:styleLbl>
+  <dgm:styleLbl name="solidFgAcc1">
+    <dgm:fillClrLst meth="repeat">
+      <a:schemeClr val="lt1"/>
+    </dgm:fillClrLst>
+    <dgm:linClrLst>
+      <a:schemeClr val="accent4"/>
+      <a:schemeClr val="accent5"/>
+    </dgm:linClrLst>
+    <dgm:effectClrLst/>
+    <dgm:txLinClrLst/>
+    <dgm:txFillClrLst meth="repeat">
+      <a:schemeClr val="dk1"/>
+    </dgm:txFillClrLst>
+    <dgm:txEffectClrLst/>
+  </dgm:styleLbl>
+  <dgm:styleLbl name="solidAlignAcc1">
+    <dgm:fillClrLst meth="repeat">
+      <a:schemeClr val="lt1"/>
+    </dgm:fillClrLst>
+    <dgm:linClrLst>
+      <a:schemeClr val="accent4"/>
+      <a:schemeClr val="accent5"/>
+    </dgm:linClrLst>
+    <dgm:effectClrLst/>
+    <dgm:txLinClrLst/>
+    <dgm:txFillClrLst meth="repeat">
+      <a:schemeClr val="dk1"/>
+    </dgm:txFillClrLst>
+    <dgm:txEffectClrLst/>
+  </dgm:styleLbl>
+  <dgm:styleLbl name="solidBgAcc1">
+    <dgm:fillClrLst meth="repeat">
+      <a:schemeClr val="lt1"/>
+    </dgm:fillClrLst>
+    <dgm:linClrLst>
+      <a:schemeClr val="accent4"/>
+      <a:schemeClr val="accent5"/>
+    </dgm:linClrLst>
+    <dgm:effectClrLst/>
+    <dgm:txLinClrLst/>
+    <dgm:txFillClrLst meth="repeat">
+      <a:schemeClr val="dk1"/>
+    </dgm:txFillClrLst>
+    <dgm:txEffectClrLst/>
+  </dgm:styleLbl>
+  <dgm:styleLbl name="fgAccFollowNode1">
+    <dgm:fillClrLst>
+      <a:schemeClr val="accent4">
+        <a:tint val="40000"/>
+        <a:alpha val="90000"/>
+      </a:schemeClr>
+      <a:schemeClr val="accent5">
+        <a:tint val="40000"/>
+        <a:alpha val="90000"/>
+      </a:schemeClr>
+    </dgm:fillClrLst>
+    <dgm:linClrLst>
+      <a:schemeClr val="accent4">
+        <a:tint val="40000"/>
+        <a:alpha val="90000"/>
+      </a:schemeClr>
+      <a:schemeClr val="accent5">
+        <a:tint val="40000"/>
+        <a:alpha val="90000"/>
+      </a:schemeClr>
+    </dgm:linClrLst>
+    <dgm:effectClrLst/>
+    <dgm:txLinClrLst/>
+    <dgm:txFillClrLst meth="repeat">
+      <a:schemeClr val="dk1"/>
+    </dgm:txFillClrLst>
+    <dgm:txEffectClrLst/>
+  </dgm:styleLbl>
+  <dgm:styleLbl name="alignAccFollowNode1">
+    <dgm:fillClrLst>
+      <a:schemeClr val="accent4">
+        <a:tint val="40000"/>
+        <a:alpha val="90000"/>
+      </a:schemeClr>
+      <a:schemeClr val="accent5">
+        <a:tint val="40000"/>
+        <a:alpha val="90000"/>
+      </a:schemeClr>
+    </dgm:fillClrLst>
+    <dgm:linClrLst>
+      <a:schemeClr val="accent4">
+        <a:tint val="40000"/>
+        <a:alpha val="90000"/>
+      </a:schemeClr>
+      <a:schemeClr val="accent5">
+        <a:tint val="40000"/>
+        <a:alpha val="90000"/>
+      </a:schemeClr>
+    </dgm:linClrLst>
+    <dgm:effectClrLst/>
+    <dgm:txLinClrLst/>
+    <dgm:txFillClrLst meth="repeat">
+      <a:schemeClr val="dk1"/>
+    </dgm:txFillClrLst>
+    <dgm:txEffectClrLst/>
+  </dgm:styleLbl>
+  <dgm:styleLbl name="bgAccFollowNode1">
+    <dgm:fillClrLst>
+      <a:schemeClr val="accent4">
+        <a:tint val="40000"/>
+        <a:alpha val="90000"/>
+      </a:schemeClr>
+      <a:schemeClr val="accent5">
+        <a:tint val="40000"/>
+        <a:alpha val="90000"/>
+      </a:schemeClr>
+    </dgm:fillClrLst>
+    <dgm:linClrLst>
+      <a:schemeClr val="accent4">
+        <a:tint val="40000"/>
+        <a:alpha val="90000"/>
+      </a:schemeClr>
+      <a:schemeClr val="accent5">
+        <a:tint val="40000"/>
+        <a:alpha val="90000"/>
+      </a:schemeClr>
+    </dgm:linClrLst>
+    <dgm:effectClrLst/>
+    <dgm:txLinClrLst/>
+    <dgm:txFillClrLst meth="repeat">
+      <a:schemeClr val="dk1"/>
+    </dgm:txFillClrLst>
+    <dgm:txEffectClrLst/>
+  </dgm:styleLbl>
+  <dgm:styleLbl name="fgAcc0">
+    <dgm:fillClrLst meth="repeat">
+      <a:schemeClr val="lt1">
+        <a:alpha val="90000"/>
+      </a:schemeClr>
+    </dgm:fillClrLst>
+    <dgm:linClrLst>
+      <a:schemeClr val="accent3"/>
+    </dgm:linClrLst>
+    <dgm:effectClrLst/>
+    <dgm:txLinClrLst/>
+    <dgm:txFillClrLst meth="repeat">
+      <a:schemeClr val="dk1"/>
+    </dgm:txFillClrLst>
+    <dgm:txEffectClrLst/>
+  </dgm:styleLbl>
+  <dgm:styleLbl name="fgAcc2">
+    <dgm:fillClrLst meth="repeat">
+      <a:schemeClr val="lt1">
+        <a:alpha val="90000"/>
+      </a:schemeClr>
+    </dgm:fillClrLst>
+    <dgm:linClrLst>
+      <a:schemeClr val="accent5"/>
+    </dgm:linClrLst>
+    <dgm:effectClrLst/>
+    <dgm:txLinClrLst/>
+    <dgm:txFillClrLst meth="repeat">
+      <a:schemeClr val="dk1"/>
+    </dgm:txFillClrLst>
+    <dgm:txEffectClrLst/>
+  </dgm:styleLbl>
+  <dgm:styleLbl name="fgAcc3">
+    <dgm:fillClrLst meth="repeat">
+      <a:schemeClr val="lt1">
+        <a:alpha val="90000"/>
+      </a:schemeClr>
+    </dgm:fillClrLst>
+    <dgm:linClrLst>
+      <a:schemeClr val="accent6"/>
+    </dgm:linClrLst>
+    <dgm:effectClrLst/>
+    <dgm:txLinClrLst/>
+    <dgm:txFillClrLst meth="repeat">
+      <a:schemeClr val="dk1"/>
+    </dgm:txFillClrLst>
+    <dgm:txEffectClrLst/>
+  </dgm:styleLbl>
+  <dgm:styleLbl name="fgAcc4">
+    <dgm:fillClrLst meth="repeat">
+      <a:schemeClr val="lt1">
+        <a:alpha val="90000"/>
+      </a:schemeClr>
+    </dgm:fillClrLst>
+    <dgm:linClrLst>
+      <a:schemeClr val="accent1"/>
+    </dgm:linClrLst>
+    <dgm:effectClrLst/>
+    <dgm:txLinClrLst/>
+    <dgm:txFillClrLst meth="repeat">
+      <a:schemeClr val="dk1"/>
+    </dgm:txFillClrLst>
+    <dgm:txEffectClrLst/>
+  </dgm:styleLbl>
+  <dgm:styleLbl name="bgShp">
+    <dgm:fillClrLst meth="repeat">
+      <a:schemeClr val="accent4">
+        <a:tint val="40000"/>
+      </a:schemeClr>
+    </dgm:fillClrLst>
+    <dgm:linClrLst meth="repeat">
+      <a:schemeClr val="dk1"/>
+    </dgm:linClrLst>
+    <dgm:effectClrLst/>
+    <dgm:txLinClrLst/>
+    <dgm:txFillClrLst meth="repeat">
+      <a:schemeClr val="dk1"/>
+    </dgm:txFillClrLst>
+    <dgm:txEffectClrLst/>
+  </dgm:styleLbl>
+  <dgm:styleLbl name="dkBgShp">
+    <dgm:fillClrLst meth="repeat">
+      <a:schemeClr val="accent4">
+        <a:shade val="90000"/>
+      </a:schemeClr>
+    </dgm:fillClrLst>
+    <dgm:linClrLst meth="repeat">
+      <a:schemeClr val="dk1"/>
+    </dgm:linClrLst>
+    <dgm:effectClrLst/>
+    <dgm:txLinClrLst/>
+    <dgm:txFillClrLst meth="repeat">
+      <a:schemeClr val="lt1"/>
+    </dgm:txFillClrLst>
+    <dgm:txEffectClrLst/>
+  </dgm:styleLbl>
+  <dgm:styleLbl name="trBgShp">
+    <dgm:fillClrLst meth="repeat">
+      <a:schemeClr val="accent4">
+        <a:tint val="50000"/>
+        <a:alpha val="40000"/>
+      </a:schemeClr>
+    </dgm:fillClrLst>
+    <dgm:linClrLst meth="repeat">
+      <a:schemeClr val="accent4"/>
+    </dgm:linClrLst>
+    <dgm:effectClrLst/>
+    <dgm:txLinClrLst/>
+    <dgm:txFillClrLst meth="repeat">
+      <a:schemeClr val="lt1"/>
+    </dgm:txFillClrLst>
+    <dgm:txEffectClrLst/>
+  </dgm:styleLbl>
+  <dgm:styleLbl name="fgShp">
+    <dgm:fillClrLst meth="repeat">
+      <a:schemeClr val="accent4">
+        <a:tint val="40000"/>
+      </a:schemeClr>
+    </dgm:fillClrLst>
+    <dgm:linClrLst meth="repeat">
+      <a:schemeClr val="lt1"/>
+    </dgm:linClrLst>
+    <dgm:effectClrLst/>
+    <dgm:txLinClrLst/>
+    <dgm:txFillClrLst meth="repeat">
+      <a:schemeClr val="dk1"/>
+    </dgm:txFillClrLst>
+    <dgm:txEffectClrLst/>
+  </dgm:styleLbl>
+  <dgm:styleLbl name="revTx">
+    <dgm:fillClrLst meth="repeat">
+      <a:schemeClr val="lt1">
+        <a:alpha val="0"/>
+      </a:schemeClr>
+    </dgm:fillClrLst>
+    <dgm:linClrLst meth="repeat">
+      <a:schemeClr val="dk1">
+        <a:alpha val="0"/>
+      </a:schemeClr>
+    </dgm:linClrLst>
+    <dgm:effectClrLst/>
+    <dgm:txLinClrLst/>
+    <dgm:txFillClrLst meth="repeat">
+      <a:schemeClr val="tx1"/>
+    </dgm:txFillClrLst>
+    <dgm:txEffectClrLst/>
+  </dgm:styleLbl>
+</dgm:colorsDef>
+</file>
+
+<file path=ppt/diagrams/data1.xml><?xml version="1.0" encoding="utf-8"?>
+<dgm:dataModel xmlns:dgm="http://schemas.openxmlformats.org/drawingml/2006/diagram" xmlns:a="http://schemas.openxmlformats.org/drawingml/2006/main">
+  <dgm:ptLst>
+    <dgm:pt modelId="{4765096E-E1C6-164D-B98E-CDE6D8745907}" type="doc">
+      <dgm:prSet loTypeId="urn:microsoft.com/office/officeart/2005/8/layout/pyramid2" loCatId="" qsTypeId="urn:microsoft.com/office/officeart/2005/8/quickstyle/3d5" qsCatId="3D" csTypeId="urn:microsoft.com/office/officeart/2005/8/colors/colorful4" csCatId="colorful" phldr="1"/>
+      <dgm:spPr/>
+    </dgm:pt>
+    <dgm:pt modelId="{CF43773A-924B-4440-9A7C-6EE57CFDC801}">
+      <dgm:prSet phldrT="[Text]"/>
+      <dgm:spPr/>
+      <dgm:t>
+        <a:bodyPr/>
+        <a:lstStyle/>
+        <a:p>
+          <a:r>
+            <a:rPr lang="en-US" dirty="0"/>
+            <a:t>Manual</a:t>
+          </a:r>
+        </a:p>
+      </dgm:t>
+    </dgm:pt>
+    <dgm:pt modelId="{47B28B43-0FFE-FB48-8D1F-08E10696516C}" type="parTrans" cxnId="{2D816EDD-AE42-2D4B-90F9-A416EB65E53B}">
+      <dgm:prSet/>
+      <dgm:spPr/>
+      <dgm:t>
+        <a:bodyPr/>
+        <a:lstStyle/>
+        <a:p>
+          <a:endParaRPr lang="en-US"/>
+        </a:p>
+      </dgm:t>
+    </dgm:pt>
+    <dgm:pt modelId="{B6DA65D8-D038-CC40-81B2-DFE315BE6E85}" type="sibTrans" cxnId="{2D816EDD-AE42-2D4B-90F9-A416EB65E53B}">
+      <dgm:prSet/>
+      <dgm:spPr/>
+      <dgm:t>
+        <a:bodyPr/>
+        <a:lstStyle/>
+        <a:p>
+          <a:endParaRPr lang="en-US"/>
+        </a:p>
+      </dgm:t>
+    </dgm:pt>
+    <dgm:pt modelId="{5798AC41-C752-1649-AD4D-BA27405CA489}">
+      <dgm:prSet phldrT="[Text]"/>
+      <dgm:spPr/>
+      <dgm:t>
+        <a:bodyPr/>
+        <a:lstStyle/>
+        <a:p>
+          <a:r>
+            <a:rPr lang="en-US" dirty="0"/>
+            <a:t>Integration</a:t>
+          </a:r>
+        </a:p>
+      </dgm:t>
+    </dgm:pt>
+    <dgm:pt modelId="{0453A639-A264-0C4B-9879-4C2BD7DDBC1F}" type="parTrans" cxnId="{DFFC2709-73D7-604C-B287-AF4C97CA0A3D}">
+      <dgm:prSet/>
+      <dgm:spPr/>
+      <dgm:t>
+        <a:bodyPr/>
+        <a:lstStyle/>
+        <a:p>
+          <a:endParaRPr lang="en-US"/>
+        </a:p>
+      </dgm:t>
+    </dgm:pt>
+    <dgm:pt modelId="{2C79C665-B5AE-7D49-928E-A23040B166D4}" type="sibTrans" cxnId="{DFFC2709-73D7-604C-B287-AF4C97CA0A3D}">
+      <dgm:prSet/>
+      <dgm:spPr/>
+      <dgm:t>
+        <a:bodyPr/>
+        <a:lstStyle/>
+        <a:p>
+          <a:endParaRPr lang="en-US"/>
+        </a:p>
+      </dgm:t>
+    </dgm:pt>
+    <dgm:pt modelId="{C44C9E7C-BD5E-6D4A-8FAF-5E0A50B612A6}">
+      <dgm:prSet phldrT="[Text]"/>
+      <dgm:spPr/>
+      <dgm:t>
+        <a:bodyPr/>
+        <a:lstStyle/>
+        <a:p>
+          <a:r>
+            <a:rPr lang="en-US" dirty="0"/>
+            <a:t>Unit Testing</a:t>
+          </a:r>
+        </a:p>
+      </dgm:t>
+    </dgm:pt>
+    <dgm:pt modelId="{6207AB9F-741B-B141-BE88-34BE25B997D8}" type="parTrans" cxnId="{2AC04B86-E91A-DF49-B73F-0A4ADCD4C2A6}">
+      <dgm:prSet/>
+      <dgm:spPr/>
+      <dgm:t>
+        <a:bodyPr/>
+        <a:lstStyle/>
+        <a:p>
+          <a:endParaRPr lang="en-US"/>
+        </a:p>
+      </dgm:t>
+    </dgm:pt>
+    <dgm:pt modelId="{9D25E740-BFE3-654E-B9B8-F87222125C83}" type="sibTrans" cxnId="{2AC04B86-E91A-DF49-B73F-0A4ADCD4C2A6}">
+      <dgm:prSet/>
+      <dgm:spPr/>
+      <dgm:t>
+        <a:bodyPr/>
+        <a:lstStyle/>
+        <a:p>
+          <a:endParaRPr lang="en-US"/>
+        </a:p>
+      </dgm:t>
+    </dgm:pt>
+    <dgm:pt modelId="{0CD3F3C9-1DCD-6347-9033-81CD50F06C0E}" type="pres">
+      <dgm:prSet presAssocID="{4765096E-E1C6-164D-B98E-CDE6D8745907}" presName="compositeShape" presStyleCnt="0">
+        <dgm:presLayoutVars>
+          <dgm:dir/>
+          <dgm:resizeHandles/>
+        </dgm:presLayoutVars>
+      </dgm:prSet>
+      <dgm:spPr/>
+    </dgm:pt>
+    <dgm:pt modelId="{2F05D1DC-CE68-9141-89E1-41356C33FFC8}" type="pres">
+      <dgm:prSet presAssocID="{4765096E-E1C6-164D-B98E-CDE6D8745907}" presName="pyramid" presStyleLbl="node1" presStyleIdx="0" presStyleCnt="1" custLinFactNeighborX="-11704"/>
+      <dgm:spPr/>
+    </dgm:pt>
+    <dgm:pt modelId="{A4B39254-F9C2-3448-B361-2D8E187144A1}" type="pres">
+      <dgm:prSet presAssocID="{4765096E-E1C6-164D-B98E-CDE6D8745907}" presName="theList" presStyleCnt="0"/>
+      <dgm:spPr/>
+    </dgm:pt>
+    <dgm:pt modelId="{9FFB5DC5-2882-1342-94BC-8D83E932AE6E}" type="pres">
+      <dgm:prSet presAssocID="{CF43773A-924B-4440-9A7C-6EE57CFDC801}" presName="aNode" presStyleLbl="fgAcc1" presStyleIdx="0" presStyleCnt="3">
+        <dgm:presLayoutVars>
+          <dgm:bulletEnabled val="1"/>
+        </dgm:presLayoutVars>
+      </dgm:prSet>
+      <dgm:spPr/>
+    </dgm:pt>
+    <dgm:pt modelId="{D5EAFEC4-BA04-C242-B0B9-9670378DFD11}" type="pres">
+      <dgm:prSet presAssocID="{CF43773A-924B-4440-9A7C-6EE57CFDC801}" presName="aSpace" presStyleCnt="0"/>
+      <dgm:spPr/>
+    </dgm:pt>
+    <dgm:pt modelId="{23E87320-31A1-1141-9A02-B029676225E9}" type="pres">
+      <dgm:prSet presAssocID="{5798AC41-C752-1649-AD4D-BA27405CA489}" presName="aNode" presStyleLbl="fgAcc1" presStyleIdx="1" presStyleCnt="3">
+        <dgm:presLayoutVars>
+          <dgm:bulletEnabled val="1"/>
+        </dgm:presLayoutVars>
+      </dgm:prSet>
+      <dgm:spPr/>
+    </dgm:pt>
+    <dgm:pt modelId="{32B29186-C177-524B-B081-1A1BFDD3A203}" type="pres">
+      <dgm:prSet presAssocID="{5798AC41-C752-1649-AD4D-BA27405CA489}" presName="aSpace" presStyleCnt="0"/>
+      <dgm:spPr/>
+    </dgm:pt>
+    <dgm:pt modelId="{96D97B51-B64F-2A4C-9883-EE37F99CE9C2}" type="pres">
+      <dgm:prSet presAssocID="{C44C9E7C-BD5E-6D4A-8FAF-5E0A50B612A6}" presName="aNode" presStyleLbl="fgAcc1" presStyleIdx="2" presStyleCnt="3">
+        <dgm:presLayoutVars>
+          <dgm:bulletEnabled val="1"/>
+        </dgm:presLayoutVars>
+      </dgm:prSet>
+      <dgm:spPr/>
+    </dgm:pt>
+    <dgm:pt modelId="{FE335219-C4E0-C547-9C8E-EECC1C2A8C04}" type="pres">
+      <dgm:prSet presAssocID="{C44C9E7C-BD5E-6D4A-8FAF-5E0A50B612A6}" presName="aSpace" presStyleCnt="0"/>
+      <dgm:spPr/>
+    </dgm:pt>
+  </dgm:ptLst>
+  <dgm:cxnLst>
+    <dgm:cxn modelId="{DFFC2709-73D7-604C-B287-AF4C97CA0A3D}" srcId="{4765096E-E1C6-164D-B98E-CDE6D8745907}" destId="{5798AC41-C752-1649-AD4D-BA27405CA489}" srcOrd="1" destOrd="0" parTransId="{0453A639-A264-0C4B-9879-4C2BD7DDBC1F}" sibTransId="{2C79C665-B5AE-7D49-928E-A23040B166D4}"/>
+    <dgm:cxn modelId="{D9B5E734-9C10-F246-97D6-6C68741AD85D}" type="presOf" srcId="{CF43773A-924B-4440-9A7C-6EE57CFDC801}" destId="{9FFB5DC5-2882-1342-94BC-8D83E932AE6E}" srcOrd="0" destOrd="0" presId="urn:microsoft.com/office/officeart/2005/8/layout/pyramid2"/>
+    <dgm:cxn modelId="{43F77152-9B6B-2E41-92C4-B4B6A82B0100}" type="presOf" srcId="{C44C9E7C-BD5E-6D4A-8FAF-5E0A50B612A6}" destId="{96D97B51-B64F-2A4C-9883-EE37F99CE9C2}" srcOrd="0" destOrd="0" presId="urn:microsoft.com/office/officeart/2005/8/layout/pyramid2"/>
+    <dgm:cxn modelId="{2AC04B86-E91A-DF49-B73F-0A4ADCD4C2A6}" srcId="{4765096E-E1C6-164D-B98E-CDE6D8745907}" destId="{C44C9E7C-BD5E-6D4A-8FAF-5E0A50B612A6}" srcOrd="2" destOrd="0" parTransId="{6207AB9F-741B-B141-BE88-34BE25B997D8}" sibTransId="{9D25E740-BFE3-654E-B9B8-F87222125C83}"/>
+    <dgm:cxn modelId="{1278D3C2-B6C5-D847-8A82-05D565D5D215}" type="presOf" srcId="{5798AC41-C752-1649-AD4D-BA27405CA489}" destId="{23E87320-31A1-1141-9A02-B029676225E9}" srcOrd="0" destOrd="0" presId="urn:microsoft.com/office/officeart/2005/8/layout/pyramid2"/>
+    <dgm:cxn modelId="{2D816EDD-AE42-2D4B-90F9-A416EB65E53B}" srcId="{4765096E-E1C6-164D-B98E-CDE6D8745907}" destId="{CF43773A-924B-4440-9A7C-6EE57CFDC801}" srcOrd="0" destOrd="0" parTransId="{47B28B43-0FFE-FB48-8D1F-08E10696516C}" sibTransId="{B6DA65D8-D038-CC40-81B2-DFE315BE6E85}"/>
+    <dgm:cxn modelId="{3F34B0F2-3493-8847-AE82-5619A3B6D59F}" type="presOf" srcId="{4765096E-E1C6-164D-B98E-CDE6D8745907}" destId="{0CD3F3C9-1DCD-6347-9033-81CD50F06C0E}" srcOrd="0" destOrd="0" presId="urn:microsoft.com/office/officeart/2005/8/layout/pyramid2"/>
+    <dgm:cxn modelId="{FFFBAEC1-2DDD-3E47-9E30-E115B35B267A}" type="presParOf" srcId="{0CD3F3C9-1DCD-6347-9033-81CD50F06C0E}" destId="{2F05D1DC-CE68-9141-89E1-41356C33FFC8}" srcOrd="0" destOrd="0" presId="urn:microsoft.com/office/officeart/2005/8/layout/pyramid2"/>
+    <dgm:cxn modelId="{763CCB4E-7C2C-3142-9FBD-91A66C284B68}" type="presParOf" srcId="{0CD3F3C9-1DCD-6347-9033-81CD50F06C0E}" destId="{A4B39254-F9C2-3448-B361-2D8E187144A1}" srcOrd="1" destOrd="0" presId="urn:microsoft.com/office/officeart/2005/8/layout/pyramid2"/>
+    <dgm:cxn modelId="{6EB35182-5E4E-604D-A621-23CD6D3A06C8}" type="presParOf" srcId="{A4B39254-F9C2-3448-B361-2D8E187144A1}" destId="{9FFB5DC5-2882-1342-94BC-8D83E932AE6E}" srcOrd="0" destOrd="0" presId="urn:microsoft.com/office/officeart/2005/8/layout/pyramid2"/>
+    <dgm:cxn modelId="{8F1C898B-7C77-DF40-80B0-A8AFB7ABB27D}" type="presParOf" srcId="{A4B39254-F9C2-3448-B361-2D8E187144A1}" destId="{D5EAFEC4-BA04-C242-B0B9-9670378DFD11}" srcOrd="1" destOrd="0" presId="urn:microsoft.com/office/officeart/2005/8/layout/pyramid2"/>
+    <dgm:cxn modelId="{E9925E0B-A1EF-AF47-8F72-CD4D20F69F3A}" type="presParOf" srcId="{A4B39254-F9C2-3448-B361-2D8E187144A1}" destId="{23E87320-31A1-1141-9A02-B029676225E9}" srcOrd="2" destOrd="0" presId="urn:microsoft.com/office/officeart/2005/8/layout/pyramid2"/>
+    <dgm:cxn modelId="{07C4195A-AC4A-9241-96D2-D45ADBFFF3B0}" type="presParOf" srcId="{A4B39254-F9C2-3448-B361-2D8E187144A1}" destId="{32B29186-C177-524B-B081-1A1BFDD3A203}" srcOrd="3" destOrd="0" presId="urn:microsoft.com/office/officeart/2005/8/layout/pyramid2"/>
+    <dgm:cxn modelId="{3760772F-3B6B-8143-9296-C6A6051DF86D}" type="presParOf" srcId="{A4B39254-F9C2-3448-B361-2D8E187144A1}" destId="{96D97B51-B64F-2A4C-9883-EE37F99CE9C2}" srcOrd="4" destOrd="0" presId="urn:microsoft.com/office/officeart/2005/8/layout/pyramid2"/>
+    <dgm:cxn modelId="{9AD4B6BA-89B6-5343-8AAC-88756F88F38C}" type="presParOf" srcId="{A4B39254-F9C2-3448-B361-2D8E187144A1}" destId="{FE335219-C4E0-C547-9C8E-EECC1C2A8C04}" srcOrd="5" destOrd="0" presId="urn:microsoft.com/office/officeart/2005/8/layout/pyramid2"/>
+  </dgm:cxnLst>
+  <dgm:bg/>
+  <dgm:whole/>
+  <dgm:extLst>
+    <a:ext uri="http://schemas.microsoft.com/office/drawing/2008/diagram">
+      <dsp:dataModelExt xmlns:dsp="http://schemas.microsoft.com/office/drawing/2008/diagram" relId="rId7" minVer="http://schemas.openxmlformats.org/drawingml/2006/diagram"/>
+    </a:ext>
+  </dgm:extLst>
+</dgm:dataModel>
+</file>
+
+<file path=ppt/diagrams/drawing1.xml><?xml version="1.0" encoding="utf-8"?>
+<dsp:drawing xmlns:dgm="http://schemas.openxmlformats.org/drawingml/2006/diagram" xmlns:dsp="http://schemas.microsoft.com/office/drawing/2008/diagram" xmlns:a="http://schemas.openxmlformats.org/drawingml/2006/main">
+  <dsp:spTree>
+    <dsp:nvGrpSpPr>
+      <dsp:cNvPr id="0" name=""/>
+      <dsp:cNvGrpSpPr/>
+    </dsp:nvGrpSpPr>
+    <dsp:grpSpPr/>
+    <dsp:sp modelId="{2F05D1DC-CE68-9141-89E1-41356C33FFC8}">
+      <dsp:nvSpPr>
+        <dsp:cNvPr id="0" name=""/>
+        <dsp:cNvSpPr/>
+      </dsp:nvSpPr>
+      <dsp:spPr>
+        <a:xfrm>
+          <a:off x="105356" y="0"/>
+          <a:ext cx="1562793" cy="1562793"/>
+        </a:xfrm>
+        <a:prstGeom prst="triangle">
+          <a:avLst/>
+        </a:prstGeom>
+        <a:solidFill>
+          <a:schemeClr val="accent4">
+            <a:hueOff val="0"/>
+            <a:satOff val="0"/>
+            <a:lumOff val="0"/>
+            <a:alphaOff val="0"/>
+          </a:schemeClr>
+        </a:solidFill>
+        <a:ln>
+          <a:noFill/>
+        </a:ln>
+        <a:effectLst/>
+        <a:sp3d extrusionH="381000" contourW="38100" prstMaterial="matte">
+          <a:contourClr>
+            <a:schemeClr val="lt1"/>
+          </a:contourClr>
+        </a:sp3d>
+      </dsp:spPr>
+      <dsp:style>
+        <a:lnRef idx="0">
+          <a:scrgbClr r="0" g="0" b="0"/>
+        </a:lnRef>
+        <a:fillRef idx="1">
+          <a:scrgbClr r="0" g="0" b="0"/>
+        </a:fillRef>
+        <a:effectRef idx="0">
+          <a:scrgbClr r="0" g="0" b="0"/>
+        </a:effectRef>
+        <a:fontRef idx="minor">
+          <a:schemeClr val="lt1"/>
+        </a:fontRef>
+      </dsp:style>
+    </dsp:sp>
+    <dsp:sp modelId="{9FFB5DC5-2882-1342-94BC-8D83E932AE6E}">
+      <dsp:nvSpPr>
+        <dsp:cNvPr id="0" name=""/>
+        <dsp:cNvSpPr/>
+      </dsp:nvSpPr>
+      <dsp:spPr>
+        <a:xfrm>
+          <a:off x="1069662" y="157118"/>
+          <a:ext cx="1015815" cy="369942"/>
+        </a:xfrm>
+        <a:prstGeom prst="roundRect">
+          <a:avLst/>
+        </a:prstGeom>
+        <a:solidFill>
+          <a:schemeClr val="lt1">
+            <a:alpha val="90000"/>
+            <a:hueOff val="0"/>
+            <a:satOff val="0"/>
+            <a:lumOff val="0"/>
+            <a:alphaOff val="0"/>
+          </a:schemeClr>
+        </a:solidFill>
+        <a:ln w="6350" cap="flat" cmpd="sng" algn="ctr">
+          <a:solidFill>
+            <a:schemeClr val="accent4">
+              <a:hueOff val="0"/>
+              <a:satOff val="0"/>
+              <a:lumOff val="0"/>
+              <a:alphaOff val="0"/>
+            </a:schemeClr>
+          </a:solidFill>
+          <a:prstDash val="solid"/>
+          <a:miter lim="800000"/>
+        </a:ln>
+        <a:effectLst/>
+        <a:sp3d z="57150" extrusionH="63500" prstMaterial="matte"/>
+      </dsp:spPr>
+      <dsp:style>
+        <a:lnRef idx="1">
+          <a:scrgbClr r="0" g="0" b="0"/>
+        </a:lnRef>
+        <a:fillRef idx="1">
+          <a:scrgbClr r="0" g="0" b="0"/>
+        </a:fillRef>
+        <a:effectRef idx="0">
+          <a:scrgbClr r="0" g="0" b="0"/>
+        </a:effectRef>
+        <a:fontRef idx="minor"/>
+      </dsp:style>
+      <dsp:txBody>
+        <a:bodyPr spcFirstLastPara="0" vert="horz" wrap="square" lIns="53340" tIns="53340" rIns="53340" bIns="53340" numCol="1" spcCol="1270" anchor="ctr" anchorCtr="0">
+          <a:noAutofit/>
+        </a:bodyPr>
+        <a:lstStyle/>
+        <a:p>
+          <a:pPr marL="0" lvl="0" indent="0" algn="ctr" defTabSz="622300">
+            <a:lnSpc>
+              <a:spcPct val="90000"/>
+            </a:lnSpc>
+            <a:spcBef>
+              <a:spcPct val="0"/>
+            </a:spcBef>
+            <a:spcAft>
+              <a:spcPct val="35000"/>
+            </a:spcAft>
+            <a:buNone/>
+          </a:pPr>
+          <a:r>
+            <a:rPr lang="en-US" sz="1400" kern="1200" dirty="0"/>
+            <a:t>Manual</a:t>
+          </a:r>
+        </a:p>
+      </dsp:txBody>
+      <dsp:txXfrm>
+        <a:off x="1087721" y="175177"/>
+        <a:ext cx="979697" cy="333824"/>
+      </dsp:txXfrm>
+    </dsp:sp>
+    <dsp:sp modelId="{23E87320-31A1-1141-9A02-B029676225E9}">
+      <dsp:nvSpPr>
+        <dsp:cNvPr id="0" name=""/>
+        <dsp:cNvSpPr/>
+      </dsp:nvSpPr>
+      <dsp:spPr>
+        <a:xfrm>
+          <a:off x="1069662" y="573303"/>
+          <a:ext cx="1015815" cy="369942"/>
+        </a:xfrm>
+        <a:prstGeom prst="roundRect">
+          <a:avLst/>
+        </a:prstGeom>
+        <a:solidFill>
+          <a:schemeClr val="lt1">
+            <a:alpha val="90000"/>
+            <a:hueOff val="0"/>
+            <a:satOff val="0"/>
+            <a:lumOff val="0"/>
+            <a:alphaOff val="0"/>
+          </a:schemeClr>
+        </a:solidFill>
+        <a:ln w="6350" cap="flat" cmpd="sng" algn="ctr">
+          <a:solidFill>
+            <a:schemeClr val="accent4">
+              <a:hueOff val="4900445"/>
+              <a:satOff val="-20388"/>
+              <a:lumOff val="4804"/>
+              <a:alphaOff val="0"/>
+            </a:schemeClr>
+          </a:solidFill>
+          <a:prstDash val="solid"/>
+          <a:miter lim="800000"/>
+        </a:ln>
+        <a:effectLst/>
+        <a:sp3d z="57150" extrusionH="63500" prstMaterial="matte"/>
+      </dsp:spPr>
+      <dsp:style>
+        <a:lnRef idx="1">
+          <a:scrgbClr r="0" g="0" b="0"/>
+        </a:lnRef>
+        <a:fillRef idx="1">
+          <a:scrgbClr r="0" g="0" b="0"/>
+        </a:fillRef>
+        <a:effectRef idx="0">
+          <a:scrgbClr r="0" g="0" b="0"/>
+        </a:effectRef>
+        <a:fontRef idx="minor"/>
+      </dsp:style>
+      <dsp:txBody>
+        <a:bodyPr spcFirstLastPara="0" vert="horz" wrap="square" lIns="53340" tIns="53340" rIns="53340" bIns="53340" numCol="1" spcCol="1270" anchor="ctr" anchorCtr="0">
+          <a:noAutofit/>
+        </a:bodyPr>
+        <a:lstStyle/>
+        <a:p>
+          <a:pPr marL="0" lvl="0" indent="0" algn="ctr" defTabSz="622300">
+            <a:lnSpc>
+              <a:spcPct val="90000"/>
+            </a:lnSpc>
+            <a:spcBef>
+              <a:spcPct val="0"/>
+            </a:spcBef>
+            <a:spcAft>
+              <a:spcPct val="35000"/>
+            </a:spcAft>
+            <a:buNone/>
+          </a:pPr>
+          <a:r>
+            <a:rPr lang="en-US" sz="1400" kern="1200" dirty="0"/>
+            <a:t>Integration</a:t>
+          </a:r>
+        </a:p>
+      </dsp:txBody>
+      <dsp:txXfrm>
+        <a:off x="1087721" y="591362"/>
+        <a:ext cx="979697" cy="333824"/>
+      </dsp:txXfrm>
+    </dsp:sp>
+    <dsp:sp modelId="{96D97B51-B64F-2A4C-9883-EE37F99CE9C2}">
+      <dsp:nvSpPr>
+        <dsp:cNvPr id="0" name=""/>
+        <dsp:cNvSpPr/>
+      </dsp:nvSpPr>
+      <dsp:spPr>
+        <a:xfrm>
+          <a:off x="1069662" y="989489"/>
+          <a:ext cx="1015815" cy="369942"/>
+        </a:xfrm>
+        <a:prstGeom prst="roundRect">
+          <a:avLst/>
+        </a:prstGeom>
+        <a:solidFill>
+          <a:schemeClr val="lt1">
+            <a:alpha val="90000"/>
+            <a:hueOff val="0"/>
+            <a:satOff val="0"/>
+            <a:lumOff val="0"/>
+            <a:alphaOff val="0"/>
+          </a:schemeClr>
+        </a:solidFill>
+        <a:ln w="6350" cap="flat" cmpd="sng" algn="ctr">
+          <a:solidFill>
+            <a:schemeClr val="accent4">
+              <a:hueOff val="9800891"/>
+              <a:satOff val="-40777"/>
+              <a:lumOff val="9608"/>
+              <a:alphaOff val="0"/>
+            </a:schemeClr>
+          </a:solidFill>
+          <a:prstDash val="solid"/>
+          <a:miter lim="800000"/>
+        </a:ln>
+        <a:effectLst/>
+        <a:sp3d z="57150" extrusionH="63500" prstMaterial="matte"/>
+      </dsp:spPr>
+      <dsp:style>
+        <a:lnRef idx="1">
+          <a:scrgbClr r="0" g="0" b="0"/>
+        </a:lnRef>
+        <a:fillRef idx="1">
+          <a:scrgbClr r="0" g="0" b="0"/>
+        </a:fillRef>
+        <a:effectRef idx="0">
+          <a:scrgbClr r="0" g="0" b="0"/>
+        </a:effectRef>
+        <a:fontRef idx="minor"/>
+      </dsp:style>
+      <dsp:txBody>
+        <a:bodyPr spcFirstLastPara="0" vert="horz" wrap="square" lIns="53340" tIns="53340" rIns="53340" bIns="53340" numCol="1" spcCol="1270" anchor="ctr" anchorCtr="0">
+          <a:noAutofit/>
+        </a:bodyPr>
+        <a:lstStyle/>
+        <a:p>
+          <a:pPr marL="0" lvl="0" indent="0" algn="ctr" defTabSz="622300">
+            <a:lnSpc>
+              <a:spcPct val="90000"/>
+            </a:lnSpc>
+            <a:spcBef>
+              <a:spcPct val="0"/>
+            </a:spcBef>
+            <a:spcAft>
+              <a:spcPct val="35000"/>
+            </a:spcAft>
+            <a:buNone/>
+          </a:pPr>
+          <a:r>
+            <a:rPr lang="en-US" sz="1400" kern="1200" dirty="0"/>
+            <a:t>Unit Testing</a:t>
+          </a:r>
+        </a:p>
+      </dsp:txBody>
+      <dsp:txXfrm>
+        <a:off x="1087721" y="1007548"/>
+        <a:ext cx="979697" cy="333824"/>
+      </dsp:txXfrm>
+    </dsp:sp>
+  </dsp:spTree>
+</dsp:drawing>
+</file>
+
+<file path=ppt/diagrams/layout1.xml><?xml version="1.0" encoding="utf-8"?>
+<dgm:layoutDef xmlns:dgm="http://schemas.openxmlformats.org/drawingml/2006/diagram" xmlns:a="http://schemas.openxmlformats.org/drawingml/2006/main" uniqueId="urn:microsoft.com/office/officeart/2005/8/layout/pyramid2">
+  <dgm:title val=""/>
+  <dgm:desc val=""/>
+  <dgm:catLst>
+    <dgm:cat type="pyramid" pri="3000"/>
+    <dgm:cat type="list" pri="21000"/>
+    <dgm:cat type="convert" pri="17000"/>
+  </dgm:catLst>
+  <dgm:sampData useDef="1">
+    <dgm:dataModel>
+      <dgm:ptLst/>
+      <dgm:bg/>
+      <dgm:whole/>
+    </dgm:dataModel>
+  </dgm:sampData>
+  <dgm:styleData useDef="1">
+    <dgm:dataModel>
+      <dgm:ptLst/>
+      <dgm:bg/>
+      <dgm:whole/>
+    </dgm:dataModel>
+  </dgm:styleData>
+  <dgm:clrData useDef="1">
+    <dgm:dataModel>
+      <dgm:ptLst/>
+      <dgm:bg/>
+      <dgm:whole/>
+    </dgm:dataModel>
+  </dgm:clrData>
+  <dgm:layoutNode name="compositeShape">
+    <dgm:alg type="composite"/>
+    <dgm:shape xmlns:r="http://schemas.openxmlformats.org/officeDocument/2006/relationships" r:blip="">
+      <dgm:adjLst/>
+    </dgm:shape>
+    <dgm:presOf/>
+    <dgm:varLst>
+      <dgm:dir/>
+      <dgm:resizeHandles/>
+    </dgm:varLst>
+    <dgm:choose name="Name0">
+      <dgm:if name="Name1" func="var" arg="dir" op="equ" val="norm">
+        <dgm:constrLst>
+          <dgm:constr type="w" for="ch" forName="pyramid" refType="h"/>
+          <dgm:constr type="h" for="ch" forName="pyramid" refType="h"/>
+          <dgm:constr type="h" for="ch" forName="theList" refType="h" fact="0.8"/>
+          <dgm:constr type="w" for="ch" forName="theList" refType="h" fact="0.65"/>
+          <dgm:constr type="ctrY" for="ch" forName="theList" refType="h" refFor="ch" refForName="pyramid" fact="0.5"/>
+          <dgm:constr type="l" for="ch" forName="theList" refType="w" refFor="ch" refForName="pyramid" fact="0.5"/>
+          <dgm:constr type="h" for="des" forName="aSpace" refType="h" fact="0.1"/>
+        </dgm:constrLst>
+      </dgm:if>
+      <dgm:else name="Name2">
+        <dgm:constrLst>
+          <dgm:constr type="w" for="ch" forName="pyramid" refType="h"/>
+          <dgm:constr type="h" for="ch" forName="pyramid" refType="h"/>
+          <dgm:constr type="h" for="ch" forName="theList" refType="h" fact="0.8"/>
+          <dgm:constr type="w" for="ch" forName="theList" refType="h" fact="0.65"/>
+          <dgm:constr type="ctrY" for="ch" forName="theList" refType="h" refFor="ch" refForName="pyramid" fact="0.5"/>
+          <dgm:constr type="r" for="ch" forName="theList" refType="w" refFor="ch" refForName="pyramid" fact="0.5"/>
+          <dgm:constr type="h" for="des" forName="aSpace" refType="h" fact="0.1"/>
+        </dgm:constrLst>
+      </dgm:else>
+    </dgm:choose>
+    <dgm:ruleLst/>
+    <dgm:choose name="Name3">
+      <dgm:if name="Name4" axis="ch" ptType="node" func="cnt" op="gte" val="1">
+        <dgm:layoutNode name="pyramid" styleLbl="node1">
+          <dgm:alg type="sp"/>
+          <dgm:shape xmlns:r="http://schemas.openxmlformats.org/officeDocument/2006/relationships" type="triangle" r:blip="">
+            <dgm:adjLst/>
+          </dgm:shape>
+          <dgm:presOf/>
+          <dgm:constrLst/>
+          <dgm:ruleLst/>
+        </dgm:layoutNode>
+        <dgm:layoutNode name="theList">
+          <dgm:alg type="lin">
+            <dgm:param type="linDir" val="fromT"/>
+          </dgm:alg>
+          <dgm:shape xmlns:r="http://schemas.openxmlformats.org/officeDocument/2006/relationships" r:blip="">
+            <dgm:adjLst/>
+          </dgm:shape>
+          <dgm:presOf/>
+          <dgm:constrLst>
+            <dgm:constr type="w" for="ch" forName="aNode" refType="w"/>
+            <dgm:constr type="h" for="ch" forName="aNode" refType="h"/>
+            <dgm:constr type="primFontSz" for="ch" ptType="node" op="equ"/>
+          </dgm:constrLst>
+          <dgm:ruleLst/>
+          <dgm:forEach name="aNodeForEach" axis="ch" ptType="node">
+            <dgm:layoutNode name="aNode" styleLbl="fgAcc1">
+              <dgm:varLst>
+                <dgm:bulletEnabled val="1"/>
+              </dgm:varLst>
+              <dgm:alg type="tx"/>
+              <dgm:shape xmlns:r="http://schemas.openxmlformats.org/officeDocument/2006/relationships" type="roundRect" r:blip="">
+                <dgm:adjLst/>
+              </dgm:shape>
+              <dgm:presOf axis="desOrSelf" ptType="node"/>
+              <dgm:constrLst>
+                <dgm:constr type="primFontSz" val="65"/>
+                <dgm:constr type="tMarg" refType="primFontSz" fact="0.3"/>
+                <dgm:constr type="bMarg" refType="primFontSz" fact="0.3"/>
+                <dgm:constr type="lMarg" refType="primFontSz" fact="0.3"/>
+                <dgm:constr type="rMarg" refType="primFontSz" fact="0.3"/>
+              </dgm:constrLst>
+              <dgm:ruleLst>
+                <dgm:rule type="primFontSz" val="5" fact="NaN" max="NaN"/>
+              </dgm:ruleLst>
+            </dgm:layoutNode>
+            <dgm:layoutNode name="aSpace">
+              <dgm:alg type="sp"/>
+              <dgm:shape xmlns:r="http://schemas.openxmlformats.org/officeDocument/2006/relationships" r:blip="">
+                <dgm:adjLst/>
+              </dgm:shape>
+              <dgm:presOf/>
+              <dgm:constrLst/>
+              <dgm:ruleLst/>
+            </dgm:layoutNode>
+          </dgm:forEach>
+        </dgm:layoutNode>
+      </dgm:if>
+      <dgm:else name="Name5"/>
+    </dgm:choose>
+  </dgm:layoutNode>
+</dgm:layoutDef>
+</file>
+
+<file path=ppt/diagrams/quickStyle1.xml><?xml version="1.0" encoding="utf-8"?>
+<dgm:styleDef xmlns:dgm="http://schemas.openxmlformats.org/drawingml/2006/diagram" xmlns:a="http://schemas.openxmlformats.org/drawingml/2006/main" uniqueId="urn:microsoft.com/office/officeart/2005/8/quickstyle/3d5">
+  <dgm:title val=""/>
+  <dgm:desc val=""/>
+  <dgm:catLst>
+    <dgm:cat type="3D" pri="11500"/>
+  </dgm:catLst>
+  <dgm:scene3d>
+    <a:camera prst="isometricOffAxis2Left" zoom="95000"/>
+    <a:lightRig rig="flat" dir="t"/>
+  </dgm:scene3d>
+  <dgm:styleLbl name="node0">
+    <dgm:scene3d>
+      <a:camera prst="orthographicFront"/>
+      <a:lightRig rig="threePt" dir="t"/>
+    </dgm:scene3d>
+    <dgm:sp3d extrusionH="381000" contourW="38100" prstMaterial="matte">
+      <a:contourClr>
+        <a:schemeClr val="lt1"/>
+      </a:contourClr>
+    </dgm:sp3d>
+    <dgm:txPr/>
+    <dgm:style>
+      <a:lnRef idx="0">
+        <a:scrgbClr r="0" g="0" b="0"/>
+      </a:lnRef>
+      <a:fillRef idx="1">
+        <a:scrgbClr r="0" g="0" b="0"/>
+      </a:fillRef>
+      <a:effectRef idx="0">
+        <a:scrgbClr r="0" g="0" b="0"/>
+      </a:effectRef>
+      <a:fontRef idx="minor">
+        <a:schemeClr val="lt1"/>
+      </a:fontRef>
+    </dgm:style>
+  </dgm:styleLbl>
+  <dgm:styleLbl name="lnNode1">
+    <dgm:scene3d>
+      <a:camera prst="orthographicFront"/>
+      <a:lightRig rig="threePt" dir="t"/>
+    </dgm:scene3d>
+    <dgm:sp3d extrusionH="381000" contourW="38100" prstMaterial="matte">
+      <a:contourClr>
+        <a:schemeClr val="lt1"/>
+      </a:contourClr>
+    </dgm:sp3d>
+    <dgm:txPr/>
+    <dgm:style>
+      <a:lnRef idx="0">
+        <a:scrgbClr r="0" g="0" b="0"/>
+      </a:lnRef>
+      <a:fillRef idx="1">
+        <a:scrgbClr r="0" g="0" b="0"/>
+      </a:fillRef>
+      <a:effectRef idx="0">
+        <a:scrgbClr r="0" g="0" b="0"/>
+      </a:effectRef>
+      <a:fontRef idx="minor">
+        <a:schemeClr val="lt1"/>
+      </a:fontRef>
+    </dgm:style>
+  </dgm:styleLbl>
+  <dgm:styleLbl name="vennNode1">
+    <dgm:scene3d>
+      <a:camera prst="orthographicFront"/>
+      <a:lightRig rig="threePt" dir="t"/>
+    </dgm:scene3d>
+    <dgm:sp3d extrusionH="381000" contourW="38100" prstMaterial="matte">
+      <a:contourClr>
+        <a:schemeClr val="lt1"/>
+      </a:contourClr>
+    </dgm:sp3d>
+    <dgm:txPr/>
+    <dgm:style>
+      <a:lnRef idx="0">
+        <a:scrgbClr r="0" g="0" b="0"/>
+      </a:lnRef>
+      <a:fillRef idx="1">
+        <a:scrgbClr r="0" g="0" b="0"/>
+      </a:fillRef>
+      <a:effectRef idx="0">
+        <a:scrgbClr r="0" g="0" b="0"/>
+      </a:effectRef>
+      <a:fontRef idx="minor">
+        <a:schemeClr val="tx1"/>
+      </a:fontRef>
+    </dgm:style>
+  </dgm:styleLbl>
+  <dgm:styleLbl name="alignNode1">
+    <dgm:scene3d>
+      <a:camera prst="orthographicFront"/>
+      <a:lightRig rig="threePt" dir="t"/>
+    </dgm:scene3d>
+    <dgm:sp3d extrusionH="381000" contourW="38100" prstMaterial="matte">
+      <a:contourClr>
+        <a:schemeClr val="lt1"/>
+      </a:contourClr>
+    </dgm:sp3d>
+    <dgm:txPr/>
+    <dgm:style>
+      <a:lnRef idx="1">
+        <a:scrgbClr r="0" g="0" b="0"/>
+      </a:lnRef>
+      <a:fillRef idx="1">
+        <a:scrgbClr r="0" g="0" b="0"/>
+      </a:fillRef>
+      <a:effectRef idx="0">
+        <a:scrgbClr r="0" g="0" b="0"/>
+      </a:effectRef>
+      <a:fontRef idx="minor">
+        <a:schemeClr val="lt1"/>
+      </a:fontRef>
+    </dgm:style>
+  </dgm:styleLbl>
+  <dgm:styleLbl name="node1">
+    <dgm:scene3d>
+      <a:camera prst="orthographicFront"/>
+      <a:lightRig rig="threePt" dir="t"/>
+    </dgm:scene3d>
+    <dgm:sp3d extrusionH="381000" contourW="38100" prstMaterial="matte">
+      <a:contourClr>
+        <a:schemeClr val="lt1"/>
+      </a:contourClr>
+    </dgm:sp3d>
+    <dgm:txPr/>
+    <dgm:style>
+      <a:lnRef idx="0">
+        <a:scrgbClr r="0" g="0" b="0"/>
+      </a:lnRef>
+      <a:fillRef idx="1">
+        <a:scrgbClr r="0" g="0" b="0"/>
+      </a:fillRef>
+      <a:effectRef idx="0">
+        <a:scrgbClr r="0" g="0" b="0"/>
+      </a:effectRef>
+      <a:fontRef idx="minor">
+        <a:schemeClr val="lt1"/>
+      </a:fontRef>
+    </dgm:style>
+  </dgm:styleLbl>
+  <dgm:styleLbl name="node2">
+    <dgm:scene3d>
+      <a:camera prst="orthographicFront"/>
+      <a:lightRig rig="threePt" dir="t"/>
+    </dgm:scene3d>
+    <dgm:sp3d extrusionH="381000" contourW="38100" prstMaterial="matte">
+      <a:contourClr>
+        <a:schemeClr val="lt1"/>
+      </a:contourClr>
+    </dgm:sp3d>
+    <dgm:txPr/>
+    <dgm:style>
+      <a:lnRef idx="0">
+        <a:scrgbClr r="0" g="0" b="0"/>
+      </a:lnRef>
+      <a:fillRef idx="1">
+        <a:scrgbClr r="0" g="0" b="0"/>
+      </a:fillRef>
+      <a:effectRef idx="0">
+        <a:scrgbClr r="0" g="0" b="0"/>
+      </a:effectRef>
+      <a:fontRef idx="minor">
+        <a:schemeClr val="lt1"/>
+      </a:fontRef>
+    </dgm:style>
+  </dgm:styleLbl>
+  <dgm:styleLbl name="node3">
+    <dgm:scene3d>
+      <a:camera prst="orthographicFront"/>
+      <a:lightRig rig="threePt" dir="t"/>
+    </dgm:scene3d>
+    <dgm:sp3d extrusionH="381000" contourW="38100" prstMaterial="matte">
+      <a:contourClr>
+        <a:schemeClr val="lt1"/>
+      </a:contourClr>
+    </dgm:sp3d>
+    <dgm:txPr/>
+    <dgm:style>
+      <a:lnRef idx="0">
+        <a:scrgbClr r="0" g="0" b="0"/>
+      </a:lnRef>
+      <a:fillRef idx="1">
+        <a:scrgbClr r="0" g="0" b="0"/>
+      </a:fillRef>
+      <a:effectRef idx="0">
+        <a:scrgbClr r="0" g="0" b="0"/>
+      </a:effectRef>
+      <a:fontRef idx="minor">
+        <a:schemeClr val="lt1"/>
+      </a:fontRef>
+    </dgm:style>
+  </dgm:styleLbl>
+  <dgm:styleLbl name="node4">
+    <dgm:scene3d>
+      <a:camera prst="orthographicFront"/>
+      <a:lightRig rig="threePt" dir="t"/>
+    </dgm:scene3d>
+    <dgm:sp3d extrusionH="381000" contourW="38100" prstMaterial="matte">
+      <a:contourClr>
+        <a:schemeClr val="lt1"/>
+      </a:contourClr>
+    </dgm:sp3d>
+    <dgm:txPr/>
+    <dgm:style>
+      <a:lnRef idx="0">
+        <a:scrgbClr r="0" g="0" b="0"/>
+      </a:lnRef>
+      <a:fillRef idx="1">
+        <a:scrgbClr r="0" g="0" b="0"/>
+      </a:fillRef>
+      <a:effectRef idx="0">
+        <a:scrgbClr r="0" g="0" b="0"/>
+      </a:effectRef>
+      <a:fontRef idx="minor">
+        <a:schemeClr val="lt1"/>
+      </a:fontRef>
+    </dgm:style>
+  </dgm:styleLbl>
+  <dgm:styleLbl name="fgImgPlace1">
+    <dgm:scene3d>
+      <a:camera prst="orthographicFront"/>
+      <a:lightRig rig="threePt" dir="t"/>
+    </dgm:scene3d>
+    <dgm:sp3d z="57150" extrusionH="63500" contourW="12700" prstMaterial="matte">
+      <a:contourClr>
+        <a:schemeClr val="lt1"/>
+      </a:contourClr>
+    </dgm:sp3d>
+    <dgm:txPr/>
+    <dgm:style>
+      <a:lnRef idx="0">
+        <a:scrgbClr r="0" g="0" b="0"/>
+      </a:lnRef>
+      <a:fillRef idx="1">
+        <a:scrgbClr r="0" g="0" b="0"/>
+      </a:fillRef>
+      <a:effectRef idx="0">
+        <a:scrgbClr r="0" g="0" b="0"/>
+      </a:effectRef>
+      <a:fontRef idx="minor"/>
+    </dgm:style>
+  </dgm:styleLbl>
+  <dgm:styleLbl name="alignImgPlace1">
+    <dgm:scene3d>
+      <a:camera prst="orthographicFront"/>
+      <a:lightRig rig="threePt" dir="t"/>
+    </dgm:scene3d>
+    <dgm:sp3d extrusionH="63500" contourW="12700" prstMaterial="matte">
+      <a:contourClr>
+        <a:schemeClr val="lt1"/>
+      </a:contourClr>
+    </dgm:sp3d>
+    <dgm:txPr/>
+    <dgm:style>
+      <a:lnRef idx="0">
+        <a:scrgbClr r="0" g="0" b="0"/>
+      </a:lnRef>
+      <a:fillRef idx="1">
+        <a:scrgbClr r="0" g="0" b="0"/>
+      </a:fillRef>
+      <a:effectRef idx="0">
+        <a:scrgbClr r="0" g="0" b="0"/>
+      </a:effectRef>
+      <a:fontRef idx="minor"/>
+    </dgm:style>
+  </dgm:styleLbl>
+  <dgm:styleLbl name="bgImgPlace1">
+    <dgm:scene3d>
+      <a:camera prst="orthographicFront"/>
+      <a:lightRig rig="threePt" dir="t"/>
+    </dgm:scene3d>
+    <dgm:sp3d z="-381000" extrusionH="63500" contourW="12700" prstMaterial="matte">
+      <a:contourClr>
+        <a:schemeClr val="lt1"/>
+      </a:contourClr>
+    </dgm:sp3d>
+    <dgm:txPr/>
+    <dgm:style>
+      <a:lnRef idx="0">
+        <a:scrgbClr r="0" g="0" b="0"/>
+      </a:lnRef>
+      <a:fillRef idx="1">
+        <a:scrgbClr r="0" g="0" b="0"/>
+      </a:fillRef>
+      <a:effectRef idx="0">
+        <a:scrgbClr r="0" g="0" b="0"/>
+      </a:effectRef>
+      <a:fontRef idx="minor"/>
+    </dgm:style>
+  </dgm:styleLbl>
+  <dgm:styleLbl name="sibTrans2D1">
+    <dgm:scene3d>
+      <a:camera prst="orthographicFront"/>
+      <a:lightRig rig="threePt" dir="t"/>
+    </dgm:scene3d>
+    <dgm:sp3d z="-52400" extrusionH="181000" contourW="38100" prstMaterial="matte">
+      <a:contourClr>
+        <a:schemeClr val="lt1"/>
+      </a:contourClr>
+    </dgm:sp3d>
+    <dgm:txPr/>
+    <dgm:style>
+      <a:lnRef idx="0">
+        <a:scrgbClr r="0" g="0" b="0"/>
+      </a:lnRef>
+      <a:fillRef idx="1">
+        <a:scrgbClr r="0" g="0" b="0"/>
+      </a:fillRef>
+      <a:effectRef idx="0">
+        <a:scrgbClr r="0" g="0" b="0"/>
+      </a:effectRef>
+      <a:fontRef idx="minor">
+        <a:schemeClr val="lt1"/>
+      </a:fontRef>
+    </dgm:style>
+  </dgm:styleLbl>
+  <dgm:styleLbl name="fgSibTrans2D1">
+    <dgm:scene3d>
+      <a:camera prst="orthographicFront"/>
+      <a:lightRig rig="threePt" dir="t"/>
+    </dgm:scene3d>
+    <dgm:sp3d z="57150" extrusionH="63500" contourW="12700" prstMaterial="matte">
+      <a:contourClr>
+        <a:schemeClr val="dk1">
+          <a:tint val="20000"/>
+        </a:schemeClr>
+      </a:contourClr>
+    </dgm:sp3d>
+    <dgm:txPr/>
+    <dgm:style>
+      <a:lnRef idx="0">
+        <a:scrgbClr r="0" g="0" b="0"/>
+      </a:lnRef>
+      <a:fillRef idx="1">
+        <a:scrgbClr r="0" g="0" b="0"/>
+      </a:fillRef>
+      <a:effectRef idx="0">
+        <a:scrgbClr r="0" g="0" b="0"/>
+      </a:effectRef>
+      <a:fontRef idx="minor">
+        <a:schemeClr val="lt1"/>
+      </a:fontRef>
+    </dgm:style>
+  </dgm:styleLbl>
+  <dgm:styleLbl name="bgSibTrans2D1">
+    <dgm:scene3d>
+      <a:camera prst="orthographicFront"/>
+      <a:lightRig rig="threePt" dir="t"/>
+    </dgm:scene3d>
+    <dgm:sp3d z="-381000" extrusionH="63500" contourW="12700" prstMaterial="matte">
+      <a:contourClr>
+        <a:schemeClr val="dk1">
+          <a:tint val="20000"/>
+        </a:schemeClr>
+      </a:contourClr>
+    </dgm:sp3d>
+    <dgm:txPr/>
+    <dgm:style>
+      <a:lnRef idx="0">
+        <a:scrgbClr r="0" g="0" b="0"/>
+      </a:lnRef>
+      <a:fillRef idx="1">
+        <a:scrgbClr r="0" g="0" b="0"/>
+      </a:fillRef>
+      <a:effectRef idx="0">
+        <a:scrgbClr r="0" g="0" b="0"/>
+      </a:effectRef>
+      <a:fontRef idx="minor">
+        <a:schemeClr val="lt1"/>
+      </a:fontRef>
+    </dgm:style>
+  </dgm:styleLbl>
+  <dgm:styleLbl name="sibTrans1D1">
+    <dgm:scene3d>
+      <a:camera prst="orthographicFront"/>
+      <a:lightRig rig="threePt" dir="t"/>
+    </dgm:scene3d>
+    <dgm:sp3d z="-40000" prstMaterial="matte"/>
+    <dgm:txPr/>
+    <dgm:style>
+      <a:lnRef idx="1">
+        <a:scrgbClr r="0" g="0" b="0"/>
+      </a:lnRef>
+      <a:fillRef idx="0">
+        <a:scrgbClr r="0" g="0" b="0"/>
+      </a:fillRef>
+      <a:effectRef idx="0">
+        <a:scrgbClr r="0" g="0" b="0"/>
+      </a:effectRef>
+      <a:fontRef idx="minor"/>
+    </dgm:style>
+  </dgm:styleLbl>
+  <dgm:styleLbl name="callout">
+    <dgm:scene3d>
+      <a:camera prst="orthographicFront"/>
+      <a:lightRig rig="threePt" dir="t"/>
+    </dgm:scene3d>
+    <dgm:sp3d z="127000" prstMaterial="matte"/>
+    <dgm:txPr/>
+    <dgm:style>
+      <a:lnRef idx="2">
+        <a:scrgbClr r="0" g="0" b="0"/>
+      </a:lnRef>
+      <a:fillRef idx="1">
+        <a:scrgbClr r="0" g="0" b="0"/>
+      </a:fillRef>
+      <a:effectRef idx="0">
+        <a:scrgbClr r="0" g="0" b="0"/>
+      </a:effectRef>
+      <a:fontRef idx="minor"/>
+    </dgm:style>
+  </dgm:styleLbl>
+  <dgm:styleLbl name="asst0">
+    <dgm:scene3d>
+      <a:camera prst="orthographicFront"/>
+      <a:lightRig rig="threePt" dir="t"/>
+    </dgm:scene3d>
+    <dgm:sp3d extrusionH="381000" contourW="38100" prstMaterial="matte">
+      <a:contourClr>
+        <a:schemeClr val="lt1"/>
+      </a:contourClr>
+    </dgm:sp3d>
+    <dgm:txPr/>
+    <dgm:style>
+      <a:lnRef idx="0">
+        <a:scrgbClr r="0" g="0" b="0"/>
+      </a:lnRef>
+      <a:fillRef idx="1">
+        <a:scrgbClr r="0" g="0" b="0"/>
+      </a:fillRef>
+      <a:effectRef idx="0">
+        <a:scrgbClr r="0" g="0" b="0"/>
+      </a:effectRef>
+      <a:fontRef idx="minor">
+        <a:schemeClr val="lt1"/>
+      </a:fontRef>
+    </dgm:style>
+  </dgm:styleLbl>
+  <dgm:styleLbl name="asst1">
+    <dgm:scene3d>
+      <a:camera prst="orthographicFront"/>
+      <a:lightRig rig="threePt" dir="t"/>
+    </dgm:scene3d>
+    <dgm:sp3d extrusionH="381000" contourW="38100" prstMaterial="matte">
+      <a:contourClr>
+        <a:schemeClr val="lt1"/>
+      </a:contourClr>
+    </dgm:sp3d>
+    <dgm:txPr/>
+    <dgm:style>
+      <a:lnRef idx="0">
+        <a:scrgbClr r="0" g="0" b="0"/>
+      </a:lnRef>
+      <a:fillRef idx="1">
+        <a:scrgbClr r="0" g="0" b="0"/>
+      </a:fillRef>
+      <a:effectRef idx="0">
+        <a:scrgbClr r="0" g="0" b="0"/>
+      </a:effectRef>
+      <a:fontRef idx="minor">
+        <a:schemeClr val="lt1"/>
+      </a:fontRef>
+    </dgm:style>
+  </dgm:styleLbl>
+  <dgm:styleLbl name="asst2">
+    <dgm:scene3d>
+      <a:camera prst="orthographicFront"/>
+      <a:lightRig rig="threePt" dir="t"/>
+    </dgm:scene3d>
+    <dgm:sp3d extrusionH="381000" contourW="38100" prstMaterial="matte">
+      <a:contourClr>
+        <a:schemeClr val="lt1"/>
+      </a:contourClr>
+    </dgm:sp3d>
+    <dgm:txPr/>
+    <dgm:style>
+      <a:lnRef idx="0">
+        <a:scrgbClr r="0" g="0" b="0"/>
+      </a:lnRef>
+      <a:fillRef idx="1">
+        <a:scrgbClr r="0" g="0" b="0"/>
+      </a:fillRef>
+      <a:effectRef idx="0">
+        <a:scrgbClr r="0" g="0" b="0"/>
+      </a:effectRef>
+      <a:fontRef idx="minor">
+        <a:schemeClr val="lt1"/>
+      </a:fontRef>
+    </dgm:style>
+  </dgm:styleLbl>
+  <dgm:styleLbl name="asst3">
+    <dgm:scene3d>
+      <a:camera prst="orthographicFront"/>
+      <a:lightRig rig="threePt" dir="t"/>
+    </dgm:scene3d>
+    <dgm:sp3d extrusionH="381000" contourW="38100" prstMaterial="matte">
+      <a:contourClr>
+        <a:schemeClr val="lt1"/>
+      </a:contourClr>
+    </dgm:sp3d>
+    <dgm:txPr/>
+    <dgm:style>
+      <a:lnRef idx="0">
+        <a:scrgbClr r="0" g="0" b="0"/>
+      </a:lnRef>
+      <a:fillRef idx="1">
+        <a:scrgbClr r="0" g="0" b="0"/>
+      </a:fillRef>
+      <a:effectRef idx="0">
+        <a:scrgbClr r="0" g="0" b="0"/>
+      </a:effectRef>
+      <a:fontRef idx="minor">
+        <a:schemeClr val="lt1"/>
+      </a:fontRef>
+    </dgm:style>
+  </dgm:styleLbl>
+  <dgm:styleLbl name="parChTrans2D1">
+    <dgm:scene3d>
+      <a:camera prst="orthographicFront"/>
+      <a:lightRig rig="threePt" dir="t"/>
+    </dgm:scene3d>
+    <dgm:sp3d z="52400" extrusionH="381000" contourW="38100" prstMaterial="matte">
+      <a:contourClr>
+        <a:schemeClr val="lt1"/>
+      </a:contourClr>
+    </dgm:sp3d>
+    <dgm:txPr/>
+    <dgm:style>
+      <a:lnRef idx="0">
+        <a:scrgbClr r="0" g="0" b="0"/>
+      </a:lnRef>
+      <a:fillRef idx="1">
+        <a:scrgbClr r="0" g="0" b="0"/>
+      </a:fillRef>
+      <a:effectRef idx="0">
+        <a:scrgbClr r="0" g="0" b="0"/>
+      </a:effectRef>
+      <a:fontRef idx="minor">
+        <a:schemeClr val="lt1"/>
+      </a:fontRef>
+    </dgm:style>
+  </dgm:styleLbl>
+  <dgm:styleLbl name="parChTrans2D2">
+    <dgm:scene3d>
+      <a:camera prst="orthographicFront"/>
+      <a:lightRig rig="threePt" dir="t"/>
+    </dgm:scene3d>
+    <dgm:sp3d z="52400" extrusionH="381000" contourW="38100" prstMaterial="matte">
+      <a:contourClr>
+        <a:schemeClr val="lt1"/>
+      </a:contourClr>
+    </dgm:sp3d>
+    <dgm:txPr/>
+    <dgm:style>
+      <a:lnRef idx="0">
+        <a:scrgbClr r="0" g="0" b="0"/>
+      </a:lnRef>
+      <a:fillRef idx="1">
+        <a:scrgbClr r="0" g="0" b="0"/>
+      </a:fillRef>
+      <a:effectRef idx="0">
+        <a:scrgbClr r="0" g="0" b="0"/>
+      </a:effectRef>
+      <a:fontRef idx="minor">
+        <a:schemeClr val="lt1"/>
+      </a:fontRef>
+    </dgm:style>
+  </dgm:styleLbl>
+  <dgm:styleLbl name="parChTrans2D3">
+    <dgm:scene3d>
+      <a:camera prst="orthographicFront"/>
+      <a:lightRig rig="threePt" dir="t"/>
+    </dgm:scene3d>
+    <dgm:sp3d z="60000" prstMaterial="flat">
+      <a:bevelT w="120900" h="88900"/>
+      <a:bevelB w="88900" h="31750" prst="angle"/>
+    </dgm:sp3d>
+    <dgm:txPr/>
+    <dgm:style>
+      <a:lnRef idx="0">
+        <a:scrgbClr r="0" g="0" b="0"/>
+      </a:lnRef>
+      <a:fillRef idx="3">
+        <a:scrgbClr r="0" g="0" b="0"/>
+      </a:fillRef>
+      <a:effectRef idx="1">
+        <a:scrgbClr r="0" g="0" b="0"/>
+      </a:effectRef>
+      <a:fontRef idx="minor">
+        <a:schemeClr val="lt1"/>
+      </a:fontRef>
+    </dgm:style>
+  </dgm:styleLbl>
+  <dgm:styleLbl name="parChTrans2D4">
+    <dgm:scene3d>
+      <a:camera prst="orthographicFront"/>
+      <a:lightRig rig="threePt" dir="t"/>
+    </dgm:scene3d>
+    <dgm:sp3d z="60000" prstMaterial="flat">
+      <a:bevelT w="120900" h="88900"/>
+      <a:bevelB w="88900" h="31750" prst="angle"/>
+    </dgm:sp3d>
+    <dgm:txPr/>
+    <dgm:style>
+      <a:lnRef idx="0">
+        <a:scrgbClr r="0" g="0" b="0"/>
+      </a:lnRef>
+      <a:fillRef idx="3">
+        <a:scrgbClr r="0" g="0" b="0"/>
+      </a:fillRef>
+      <a:effectRef idx="1">
+        <a:scrgbClr r="0" g="0" b="0"/>
+      </a:effectRef>
+      <a:fontRef idx="minor">
+        <a:schemeClr val="lt1"/>
+      </a:fontRef>
+    </dgm:style>
+  </dgm:styleLbl>
+  <dgm:styleLbl name="parChTrans1D1">
+    <dgm:scene3d>
+      <a:camera prst="orthographicFront"/>
+      <a:lightRig rig="threePt" dir="t"/>
+    </dgm:scene3d>
+    <dgm:sp3d z="-40000" prstMaterial="matte"/>
+    <dgm:txPr/>
+    <dgm:style>
+      <a:lnRef idx="2">
+        <a:scrgbClr r="0" g="0" b="0"/>
+      </a:lnRef>
+      <a:fillRef idx="0">
+        <a:scrgbClr r="0" g="0" b="0"/>
+      </a:fillRef>
+      <a:effectRef idx="0">
+        <a:scrgbClr r="0" g="0" b="0"/>
+      </a:effectRef>
+      <a:fontRef idx="minor"/>
+    </dgm:style>
+  </dgm:styleLbl>
+  <dgm:styleLbl name="parChTrans1D2">
+    <dgm:scene3d>
+      <a:camera prst="orthographicFront"/>
+      <a:lightRig rig="threePt" dir="t"/>
+    </dgm:scene3d>
+    <dgm:sp3d z="-40000" prstMaterial="matte"/>
+    <dgm:txPr/>
+    <dgm:style>
+      <a:lnRef idx="2">
+        <a:scrgbClr r="0" g="0" b="0"/>
+      </a:lnRef>
+      <a:fillRef idx="0">
+        <a:scrgbClr r="0" g="0" b="0"/>
+      </a:fillRef>
+      <a:effectRef idx="0">
+        <a:scrgbClr r="0" g="0" b="0"/>
+      </a:effectRef>
+      <a:fontRef idx="minor"/>
+    </dgm:style>
+  </dgm:styleLbl>
+  <dgm:styleLbl name="parChTrans1D3">
+    <dgm:scene3d>
+      <a:camera prst="orthographicFront"/>
+      <a:lightRig rig="threePt" dir="t"/>
+    </dgm:scene3d>
+    <dgm:sp3d z="-40000" prstMaterial="matte"/>
+    <dgm:txPr/>
+    <dgm:style>
+      <a:lnRef idx="2">
+        <a:scrgbClr r="0" g="0" b="0"/>
+      </a:lnRef>
+      <a:fillRef idx="0">
+        <a:scrgbClr r="0" g="0" b="0"/>
+      </a:fillRef>
+      <a:effectRef idx="0">
+        <a:scrgbClr r="0" g="0" b="0"/>
+      </a:effectRef>
+      <a:fontRef idx="minor"/>
+    </dgm:style>
+  </dgm:styleLbl>
+  <dgm:styleLbl name="parChTrans1D4">
+    <dgm:scene3d>
+      <a:camera prst="orthographicFront"/>
+      <a:lightRig rig="threePt" dir="t"/>
+    </dgm:scene3d>
+    <dgm:sp3d z="-40000" prstMaterial="matte"/>
+    <dgm:txPr/>
+    <dgm:style>
+      <a:lnRef idx="2">
+        <a:scrgbClr r="0" g="0" b="0"/>
+      </a:lnRef>
+      <a:fillRef idx="0">
+        <a:scrgbClr r="0" g="0" b="0"/>
+      </a:fillRef>
+      <a:effectRef idx="0">
+        <a:scrgbClr r="0" g="0" b="0"/>
+      </a:effectRef>
+      <a:fontRef idx="minor"/>
+    </dgm:style>
+  </dgm:styleLbl>
+  <dgm:styleLbl name="fgAcc1">
+    <dgm:scene3d>
+      <a:camera prst="orthographicFront"/>
+      <a:lightRig rig="threePt" dir="t"/>
+    </dgm:scene3d>
+    <dgm:sp3d z="57150" extrusionH="63500" prstMaterial="matte"/>
+    <dgm:txPr/>
+    <dgm:style>
+      <a:lnRef idx="1">
+        <a:scrgbClr r="0" g="0" b="0"/>
+      </a:lnRef>
+      <a:fillRef idx="1">
+        <a:scrgbClr r="0" g="0" b="0"/>
+      </a:fillRef>
+      <a:effectRef idx="0">
+        <a:scrgbClr r="0" g="0" b="0"/>
+      </a:effectRef>
+      <a:fontRef idx="minor"/>
+    </dgm:style>
+  </dgm:styleLbl>
+  <dgm:styleLbl name="conFgAcc1">
+    <dgm:scene3d>
+      <a:camera prst="orthographicFront"/>
+      <a:lightRig rig="threePt" dir="t"/>
+    </dgm:scene3d>
+    <dgm:sp3d z="-60000" extrusionH="63500" prstMaterial="matte"/>
+    <dgm:txPr/>
+    <dgm:style>
+      <a:lnRef idx="1">
+        <a:scrgbClr r="0" g="0" b="0"/>
+      </a:lnRef>
+      <a:fillRef idx="1">
+        <a:scrgbClr r="0" g="0" b="0"/>
+      </a:fillRef>
+      <a:effectRef idx="0">
+        <a:scrgbClr r="0" g="0" b="0"/>
+      </a:effectRef>
+      <a:fontRef idx="minor"/>
+    </dgm:style>
+  </dgm:styleLbl>
+  <dgm:styleLbl name="alignAcc1">
+    <dgm:scene3d>
+      <a:camera prst="orthographicFront"/>
+      <a:lightRig rig="threePt" dir="t"/>
+    </dgm:scene3d>
+    <dgm:sp3d z="-60000" extrusionH="63500" prstMaterial="matte"/>
+    <dgm:txPr/>
+    <dgm:style>
+      <a:lnRef idx="1">
+        <a:scrgbClr r="0" g="0" b="0"/>
+      </a:lnRef>
+      <a:fillRef idx="1">
+        <a:scrgbClr r="0" g="0" b="0"/>
+      </a:fillRef>
+      <a:effectRef idx="0">
+        <a:scrgbClr r="0" g="0" b="0"/>
+      </a:effectRef>
+      <a:fontRef idx="minor"/>
+    </dgm:style>
+  </dgm:styleLbl>
+  <dgm:styleLbl name="trAlignAcc1">
+    <dgm:scene3d>
+      <a:camera prst="orthographicFront"/>
+      <a:lightRig rig="threePt" dir="t"/>
+    </dgm:scene3d>
+    <dgm:sp3d extrusionH="381000" prstMaterial="matte"/>
+    <dgm:txPr/>
+    <dgm:style>
+      <a:lnRef idx="1">
+        <a:scrgbClr r="0" g="0" b="0"/>
+      </a:lnRef>
+      <a:fillRef idx="1">
+        <a:scrgbClr r="0" g="0" b="0"/>
+      </a:fillRef>
+      <a:effectRef idx="0">
+        <a:scrgbClr r="0" g="0" b="0"/>
+      </a:effectRef>
+      <a:fontRef idx="minor"/>
+    </dgm:style>
+  </dgm:styleLbl>
+  <dgm:styleLbl name="bgAcc1">
+    <dgm:scene3d>
+      <a:camera prst="orthographicFront"/>
+      <a:lightRig rig="threePt" dir="t"/>
+    </dgm:scene3d>
+    <dgm:sp3d z="-400500" extrusionH="63500" prstMaterial="matte"/>
+    <dgm:txPr/>
+    <dgm:style>
+      <a:lnRef idx="1">
+        <a:scrgbClr r="0" g="0" b="0"/>
+      </a:lnRef>
+      <a:fillRef idx="1">
+        <a:scrgbClr r="0" g="0" b="0"/>
+      </a:fillRef>
+      <a:effectRef idx="0">
+        <a:scrgbClr r="0" g="0" b="0"/>
+      </a:effectRef>
+      <a:fontRef idx="minor"/>
+    </dgm:style>
+  </dgm:styleLbl>
+  <dgm:styleLbl name="solidFgAcc1">
+    <dgm:scene3d>
+      <a:camera prst="orthographicFront"/>
+      <a:lightRig rig="threePt" dir="t"/>
+    </dgm:scene3d>
+    <dgm:sp3d z="57150" extrusionH="12700" prstMaterial="flat">
+      <a:bevelT w="50800" h="50800"/>
+    </dgm:sp3d>
+    <dgm:txPr/>
+    <dgm:style>
+      <a:lnRef idx="1">
+        <a:scrgbClr r="0" g="0" b="0"/>
+      </a:lnRef>
+      <a:fillRef idx="1">
+        <a:scrgbClr r="0" g="0" b="0"/>
+      </a:fillRef>
+      <a:effectRef idx="2">
+        <a:scrgbClr r="0" g="0" b="0"/>
+      </a:effectRef>
+      <a:fontRef idx="minor"/>
+    </dgm:style>
+  </dgm:styleLbl>
+  <dgm:styleLbl name="solidAlignAcc1">
+    <dgm:scene3d>
+      <a:camera prst="orthographicFront"/>
+      <a:lightRig rig="threePt" dir="t"/>
+    </dgm:scene3d>
+    <dgm:sp3d extrusionH="12700" prstMaterial="flat">
+      <a:bevelT w="50800" h="50800"/>
+    </dgm:sp3d>
+    <dgm:txPr/>
+    <dgm:style>
+      <a:lnRef idx="1">
+        <a:scrgbClr r="0" g="0" b="0"/>
+      </a:lnRef>
+      <a:fillRef idx="1">
+        <a:scrgbClr r="0" g="0" b="0"/>
+      </a:fillRef>
+      <a:effectRef idx="2">
+        <a:scrgbClr r="0" g="0" b="0"/>
+      </a:effectRef>
+      <a:fontRef idx="minor"/>
+    </dgm:style>
+  </dgm:styleLbl>
+  <dgm:styleLbl name="solidBgAcc1">
+    <dgm:scene3d>
+      <a:camera prst="orthographicFront"/>
+      <a:lightRig rig="threePt" dir="t"/>
+    </dgm:scene3d>
+    <dgm:sp3d z="-63500" extrusionH="63500" prstMaterial="matte"/>
+    <dgm:txPr/>
+    <dgm:style>
+      <a:lnRef idx="1">
+        <a:scrgbClr r="0" g="0" b="0"/>
+      </a:lnRef>
+      <a:fillRef idx="1">
+        <a:scrgbClr r="0" g="0" b="0"/>
+      </a:fillRef>
+      <a:effectRef idx="0">
+        <a:scrgbClr r="0" g="0" b="0"/>
+      </a:effectRef>
+      <a:fontRef idx="minor"/>
+    </dgm:style>
+  </dgm:styleLbl>
+  <dgm:styleLbl name="fgAccFollowNode1">
+    <dgm:scene3d>
+      <a:camera prst="orthographicFront"/>
+      <a:lightRig rig="threePt" dir="t"/>
+    </dgm:scene3d>
+    <dgm:sp3d z="57150" extrusionH="63500" contourW="12700" prstMaterial="matte">
+      <a:contourClr>
+        <a:schemeClr val="dk1">
+          <a:tint val="20000"/>
+        </a:schemeClr>
+      </a:contourClr>
+    </dgm:sp3d>
+    <dgm:txPr/>
+    <dgm:style>
+      <a:lnRef idx="0">
+        <a:scrgbClr r="0" g="0" b="0"/>
+      </a:lnRef>
+      <a:fillRef idx="1">
+        <a:scrgbClr r="0" g="0" b="0"/>
+      </a:fillRef>
+      <a:effectRef idx="0">
+        <a:scrgbClr r="0" g="0" b="0"/>
+      </a:effectRef>
+      <a:fontRef idx="minor"/>
+    </dgm:style>
+  </dgm:styleLbl>
+  <dgm:styleLbl name="alignAccFollowNode1">
+    <dgm:scene3d>
+      <a:camera prst="orthographicFront"/>
+      <a:lightRig rig="threePt" dir="t"/>
+    </dgm:scene3d>
+    <dgm:sp3d extrusionH="381000" contourW="38100" prstMaterial="matte">
+      <a:contourClr>
+        <a:schemeClr val="lt1"/>
+      </a:contourClr>
+    </dgm:sp3d>
+    <dgm:txPr/>
+    <dgm:style>
+      <a:lnRef idx="0">
+        <a:scrgbClr r="0" g="0" b="0"/>
+      </a:lnRef>
+      <a:fillRef idx="1">
+        <a:scrgbClr r="0" g="0" b="0"/>
+      </a:fillRef>
+      <a:effectRef idx="0">
+        <a:scrgbClr r="0" g="0" b="0"/>
+      </a:effectRef>
+      <a:fontRef idx="minor"/>
+    </dgm:style>
+  </dgm:styleLbl>
+  <dgm:styleLbl name="bgAccFollowNode1">
+    <dgm:scene3d>
+      <a:camera prst="orthographicFront"/>
+      <a:lightRig rig="threePt" dir="t"/>
+    </dgm:scene3d>
+    <dgm:sp3d z="-400500" extrusionH="63500" contourW="12700" prstMaterial="matte">
+      <a:contourClr>
+        <a:schemeClr val="lt1"/>
+      </a:contourClr>
+    </dgm:sp3d>
+    <dgm:txPr/>
+    <dgm:style>
+      <a:lnRef idx="0">
+        <a:scrgbClr r="0" g="0" b="0"/>
+      </a:lnRef>
+      <a:fillRef idx="1">
+        <a:scrgbClr r="0" g="0" b="0"/>
+      </a:fillRef>
+      <a:effectRef idx="2">
+        <a:scrgbClr r="0" g="0" b="0"/>
+      </a:effectRef>
+      <a:fontRef idx="minor"/>
+    </dgm:style>
+  </dgm:styleLbl>
+  <dgm:styleLbl name="fgAcc0">
+    <dgm:scene3d>
+      <a:camera prst="orthographicFront"/>
+      <a:lightRig rig="threePt" dir="t"/>
+    </dgm:scene3d>
+    <dgm:sp3d z="57150" extrusionH="63500" prstMaterial="matte"/>
+    <dgm:txPr/>
+    <dgm:style>
+      <a:lnRef idx="1">
+        <a:scrgbClr r="0" g="0" b="0"/>
+      </a:lnRef>
+      <a:fillRef idx="1">
+        <a:scrgbClr r="0" g="0" b="0"/>
+      </a:fillRef>
+      <a:effectRef idx="0">
+        <a:scrgbClr r="0" g="0" b="0"/>
+      </a:effectRef>
+      <a:fontRef idx="minor"/>
+    </dgm:style>
+  </dgm:styleLbl>
+  <dgm:styleLbl name="fgAcc2">
+    <dgm:scene3d>
+      <a:camera prst="orthographicFront"/>
+      <a:lightRig rig="threePt" dir="t"/>
+    </dgm:scene3d>
+    <dgm:sp3d z="57150" extrusionH="63500" prstMaterial="matte"/>
+    <dgm:txPr/>
+    <dgm:style>
+      <a:lnRef idx="1">
+        <a:scrgbClr r="0" g="0" b="0"/>
+      </a:lnRef>
+      <a:fillRef idx="1">
+        <a:scrgbClr r="0" g="0" b="0"/>
+      </a:fillRef>
+      <a:effectRef idx="0">
+        <a:scrgbClr r="0" g="0" b="0"/>
+      </a:effectRef>
+      <a:fontRef idx="minor"/>
+    </dgm:style>
+  </dgm:styleLbl>
+  <dgm:styleLbl name="fgAcc3">
+    <dgm:scene3d>
+      <a:camera prst="orthographicFront"/>
+      <a:lightRig rig="threePt" dir="t"/>
+    </dgm:scene3d>
+    <dgm:sp3d z="57150" extrusionH="63500" prstMaterial="matte"/>
+    <dgm:txPr/>
+    <dgm:style>
+      <a:lnRef idx="1">
+        <a:scrgbClr r="0" g="0" b="0"/>
+      </a:lnRef>
+      <a:fillRef idx="1">
+        <a:scrgbClr r="0" g="0" b="0"/>
+      </a:fillRef>
+      <a:effectRef idx="0">
+        <a:scrgbClr r="0" g="0" b="0"/>
+      </a:effectRef>
+      <a:fontRef idx="minor"/>
+    </dgm:style>
+  </dgm:styleLbl>
+  <dgm:styleLbl name="fgAcc4">
+    <dgm:scene3d>
+      <a:camera prst="orthographicFront"/>
+      <a:lightRig rig="threePt" dir="t"/>
+    </dgm:scene3d>
+    <dgm:sp3d z="57150" extrusionH="63500" prstMaterial="matte"/>
+    <dgm:txPr/>
+    <dgm:style>
+      <a:lnRef idx="1">
+        <a:scrgbClr r="0" g="0" b="0"/>
+      </a:lnRef>
+      <a:fillRef idx="1">
+        <a:scrgbClr r="0" g="0" b="0"/>
+      </a:fillRef>
+      <a:effectRef idx="0">
+        <a:scrgbClr r="0" g="0" b="0"/>
+      </a:effectRef>
+      <a:fontRef idx="minor"/>
+    </dgm:style>
+  </dgm:styleLbl>
+  <dgm:styleLbl name="bgShp">
+    <dgm:scene3d>
+      <a:camera prst="orthographicFront"/>
+      <a:lightRig rig="threePt" dir="t"/>
+    </dgm:scene3d>
+    <dgm:sp3d z="-400500" extrusionH="63500" contourW="12700" prstMaterial="matte">
+      <a:contourClr>
+        <a:schemeClr val="lt1">
+          <a:tint val="50000"/>
+        </a:schemeClr>
+      </a:contourClr>
+    </dgm:sp3d>
+    <dgm:txPr/>
+    <dgm:style>
+      <a:lnRef idx="0">
+        <a:scrgbClr r="0" g="0" b="0"/>
+      </a:lnRef>
+      <a:fillRef idx="1">
+        <a:scrgbClr r="0" g="0" b="0"/>
+      </a:fillRef>
+      <a:effectRef idx="0">
+        <a:scrgbClr r="0" g="0" b="0"/>
+      </a:effectRef>
+      <a:fontRef idx="minor"/>
+    </dgm:style>
+  </dgm:styleLbl>
+  <dgm:styleLbl name="dkBgShp">
+    <dgm:scene3d>
+      <a:camera prst="orthographicFront"/>
+      <a:lightRig rig="threePt" dir="t"/>
+    </dgm:scene3d>
+    <dgm:sp3d extrusionH="381000" contourW="38100" prstMaterial="matte">
+      <a:contourClr>
+        <a:schemeClr val="lt1"/>
+      </a:contourClr>
+    </dgm:sp3d>
+    <dgm:txPr/>
+    <dgm:style>
+      <a:lnRef idx="0">
+        <a:scrgbClr r="0" g="0" b="0"/>
+      </a:lnRef>
+      <a:fillRef idx="1">
+        <a:scrgbClr r="0" g="0" b="0"/>
+      </a:fillRef>
+      <a:effectRef idx="0">
+        <a:scrgbClr r="0" g="0" b="0"/>
+      </a:effectRef>
+      <a:fontRef idx="minor">
+        <a:schemeClr val="lt1"/>
+      </a:fontRef>
+    </dgm:style>
+  </dgm:styleLbl>
+  <dgm:styleLbl name="trBgShp">
+    <dgm:scene3d>
+      <a:camera prst="orthographicFront"/>
+      <a:lightRig rig="threePt" dir="t"/>
+    </dgm:scene3d>
+    <dgm:sp3d z="-400500" prstMaterial="matte"/>
+    <dgm:txPr/>
+    <dgm:style>
+      <a:lnRef idx="0">
+        <a:scrgbClr r="0" g="0" b="0"/>
+      </a:lnRef>
+      <a:fillRef idx="1">
+        <a:scrgbClr r="0" g="0" b="0"/>
+      </a:fillRef>
+      <a:effectRef idx="0">
+        <a:scrgbClr r="0" g="0" b="0"/>
+      </a:effectRef>
+      <a:fontRef idx="minor"/>
+    </dgm:style>
+  </dgm:styleLbl>
+  <dgm:styleLbl name="fgShp">
+    <dgm:scene3d>
+      <a:camera prst="orthographicFront"/>
+      <a:lightRig rig="threePt" dir="t"/>
+    </dgm:scene3d>
+    <dgm:sp3d z="57150" extrusionH="63500" contourW="12700" prstMaterial="matte">
+      <a:contourClr>
+        <a:schemeClr val="lt1">
+          <a:tint val="50000"/>
+        </a:schemeClr>
+      </a:contourClr>
+    </dgm:sp3d>
+    <dgm:txPr/>
+    <dgm:style>
+      <a:lnRef idx="0">
+        <a:scrgbClr r="0" g="0" b="0"/>
+      </a:lnRef>
+      <a:fillRef idx="1">
+        <a:scrgbClr r="0" g="0" b="0"/>
+      </a:fillRef>
+      <a:effectRef idx="0">
+        <a:scrgbClr r="0" g="0" b="0"/>
+      </a:effectRef>
+      <a:fontRef idx="minor"/>
+    </dgm:style>
+  </dgm:styleLbl>
+  <dgm:styleLbl name="revTx">
+    <dgm:scene3d>
+      <a:camera prst="orthographicFront"/>
+      <a:lightRig rig="threePt" dir="t"/>
+    </dgm:scene3d>
+    <dgm:sp3d/>
+    <dgm:txPr/>
+    <dgm:style>
+      <a:lnRef idx="0">
+        <a:scrgbClr r="0" g="0" b="0"/>
+      </a:lnRef>
+      <a:fillRef idx="0">
+        <a:scrgbClr r="0" g="0" b="0"/>
+      </a:fillRef>
+      <a:effectRef idx="0">
+        <a:scrgbClr r="0" g="0" b="0"/>
+      </a:effectRef>
+      <a:fontRef idx="minor"/>
+    </dgm:style>
+  </dgm:styleLbl>
+</dgm:styleDef>
+</file>
+
+<file path=ppt/notesMasters/notesMaster1.xml><?xml version="1.0" encoding="utf-8"?>
+<p:notesMaster xmlns:a="http://schemas.openxmlformats.org/drawingml/2006/main" xmlns:r="http://schemas.openxmlformats.org/officeDocument/2006/relationships" xmlns:p="http://schemas.openxmlformats.org/presentationml/2006/main">
+  <p:cSld>
+    <p:bg>
+      <p:bgRef idx="1001">
+        <a:schemeClr val="bg1"/>
+      </p:bgRef>
+    </p:bg>
+    <p:spTree>
+      <p:nvGrpSpPr>
+        <p:cNvPr id="1" name=""/>
+        <p:cNvGrpSpPr/>
+        <p:nvPr/>
+      </p:nvGrpSpPr>
+      <p:grpSpPr>
+        <a:xfrm>
+          <a:off x="0" y="0"/>
+          <a:ext cx="0" cy="0"/>
+          <a:chOff x="0" y="0"/>
+          <a:chExt cx="0" cy="0"/>
+        </a:xfrm>
+      </p:grpSpPr>
+      <p:sp>
+        <p:nvSpPr>
+          <p:cNvPr id="2" name="Header Placeholder 1"/>
+          <p:cNvSpPr>
+            <a:spLocks noGrp="1"/>
+          </p:cNvSpPr>
+          <p:nvPr>
+            <p:ph type="hdr" sz="quarter"/>
+          </p:nvPr>
+        </p:nvSpPr>
+        <p:spPr>
+          <a:xfrm>
+            <a:off x="0" y="0"/>
+            <a:ext cx="2971800" cy="458788"/>
+          </a:xfrm>
+          <a:prstGeom prst="rect">
+            <a:avLst/>
+          </a:prstGeom>
+        </p:spPr>
+        <p:txBody>
+          <a:bodyPr vert="horz" lIns="91440" tIns="45720" rIns="91440" bIns="45720" rtlCol="0"/>
+          <a:lstStyle>
+            <a:lvl1pPr algn="l">
+              <a:defRPr sz="1200"/>
+            </a:lvl1pPr>
+          </a:lstStyle>
+          <a:p>
+            <a:endParaRPr lang="en-US"/>
+          </a:p>
+        </p:txBody>
+      </p:sp>
+      <p:sp>
+        <p:nvSpPr>
+          <p:cNvPr id="3" name="Date Placeholder 2"/>
+          <p:cNvSpPr>
+            <a:spLocks noGrp="1"/>
+          </p:cNvSpPr>
+          <p:nvPr>
+            <p:ph type="dt" idx="1"/>
+          </p:nvPr>
+        </p:nvSpPr>
+        <p:spPr>
+          <a:xfrm>
+            <a:off x="3884613" y="0"/>
+            <a:ext cx="2971800" cy="458788"/>
+          </a:xfrm>
+          <a:prstGeom prst="rect">
+            <a:avLst/>
+          </a:prstGeom>
+        </p:spPr>
+        <p:txBody>
+          <a:bodyPr vert="horz" lIns="91440" tIns="45720" rIns="91440" bIns="45720" rtlCol="0"/>
+          <a:lstStyle>
+            <a:lvl1pPr algn="r">
+              <a:defRPr sz="1200"/>
+            </a:lvl1pPr>
+          </a:lstStyle>
+          <a:p>
+            <a:fld id="{4E7935B3-F5AC-0F49-A77F-693DEAA46623}" type="datetimeFigureOut">
+              <a:rPr lang="en-US" smtClean="0"/>
+              <a:t>7/25/24</a:t>
+            </a:fld>
+            <a:endParaRPr lang="en-US"/>
+          </a:p>
+        </p:txBody>
+      </p:sp>
+      <p:sp>
+        <p:nvSpPr>
+          <p:cNvPr id="4" name="Slide Image Placeholder 3"/>
+          <p:cNvSpPr>
+            <a:spLocks noGrp="1" noRot="1" noChangeAspect="1"/>
+          </p:cNvSpPr>
+          <p:nvPr>
+            <p:ph type="sldImg" idx="2"/>
+          </p:nvPr>
+        </p:nvSpPr>
+        <p:spPr>
+          <a:xfrm>
+            <a:off x="685800" y="1143000"/>
+            <a:ext cx="5486400" cy="3086100"/>
+          </a:xfrm>
+          <a:prstGeom prst="rect">
+            <a:avLst/>
+          </a:prstGeom>
+          <a:noFill/>
+          <a:ln w="12700">
+            <a:solidFill>
+              <a:prstClr val="black"/>
+            </a:solidFill>
+          </a:ln>
+        </p:spPr>
+        <p:txBody>
+          <a:bodyPr vert="horz" lIns="91440" tIns="45720" rIns="91440" bIns="45720" rtlCol="0" anchor="ctr"/>
+          <a:lstStyle/>
+          <a:p>
+            <a:endParaRPr lang="en-US"/>
+          </a:p>
+        </p:txBody>
+      </p:sp>
+      <p:sp>
+        <p:nvSpPr>
+          <p:cNvPr id="5" name="Notes Placeholder 4"/>
+          <p:cNvSpPr>
+            <a:spLocks noGrp="1"/>
+          </p:cNvSpPr>
+          <p:nvPr>
+            <p:ph type="body" sz="quarter" idx="3"/>
+          </p:nvPr>
+        </p:nvSpPr>
+        <p:spPr>
+          <a:xfrm>
+            <a:off x="685800" y="4400550"/>
+            <a:ext cx="5486400" cy="3600450"/>
+          </a:xfrm>
+          <a:prstGeom prst="rect">
+            <a:avLst/>
+          </a:prstGeom>
+        </p:spPr>
+        <p:txBody>
+          <a:bodyPr vert="horz" lIns="91440" tIns="45720" rIns="91440" bIns="45720" rtlCol="0"/>
+          <a:lstStyle/>
+          <a:p>
+            <a:pPr lvl="0"/>
+            <a:r>
+              <a:rPr lang="en-US"/>
+              <a:t>Edit Master text styles</a:t>
+            </a:r>
+          </a:p>
+          <a:p>
+            <a:pPr lvl="1"/>
+            <a:r>
+              <a:rPr lang="en-US"/>
+              <a:t>Second level</a:t>
+            </a:r>
+          </a:p>
+          <a:p>
+            <a:pPr lvl="2"/>
+            <a:r>
+              <a:rPr lang="en-US"/>
+              <a:t>Third level</a:t>
+            </a:r>
+          </a:p>
+          <a:p>
+            <a:pPr lvl="3"/>
+            <a:r>
+              <a:rPr lang="en-US"/>
+              <a:t>Fourth level</a:t>
+            </a:r>
+          </a:p>
+          <a:p>
+            <a:pPr lvl="4"/>
+            <a:r>
+              <a:rPr lang="en-US"/>
+              <a:t>Fifth level</a:t>
+            </a:r>
+          </a:p>
+        </p:txBody>
+      </p:sp>
+      <p:sp>
+        <p:nvSpPr>
+          <p:cNvPr id="6" name="Footer Placeholder 5"/>
+          <p:cNvSpPr>
+            <a:spLocks noGrp="1"/>
+          </p:cNvSpPr>
+          <p:nvPr>
+            <p:ph type="ftr" sz="quarter" idx="4"/>
+          </p:nvPr>
+        </p:nvSpPr>
+        <p:spPr>
+          <a:xfrm>
+            <a:off x="0" y="8685213"/>
+            <a:ext cx="2971800" cy="458787"/>
+          </a:xfrm>
+          <a:prstGeom prst="rect">
+            <a:avLst/>
+          </a:prstGeom>
+        </p:spPr>
+        <p:txBody>
+          <a:bodyPr vert="horz" lIns="91440" tIns="45720" rIns="91440" bIns="45720" rtlCol="0" anchor="b"/>
+          <a:lstStyle>
+            <a:lvl1pPr algn="l">
+              <a:defRPr sz="1200"/>
+            </a:lvl1pPr>
+          </a:lstStyle>
+          <a:p>
+            <a:endParaRPr lang="en-US"/>
+          </a:p>
+        </p:txBody>
+      </p:sp>
+      <p:sp>
+        <p:nvSpPr>
+          <p:cNvPr id="7" name="Slide Number Placeholder 6"/>
+          <p:cNvSpPr>
+            <a:spLocks noGrp="1"/>
+          </p:cNvSpPr>
+          <p:nvPr>
+            <p:ph type="sldNum" sz="quarter" idx="5"/>
+          </p:nvPr>
+        </p:nvSpPr>
+        <p:spPr>
+          <a:xfrm>
+            <a:off x="3884613" y="8685213"/>
+            <a:ext cx="2971800" cy="458787"/>
+          </a:xfrm>
+          <a:prstGeom prst="rect">
+            <a:avLst/>
+          </a:prstGeom>
+        </p:spPr>
+        <p:txBody>
+          <a:bodyPr vert="horz" lIns="91440" tIns="45720" rIns="91440" bIns="45720" rtlCol="0" anchor="b"/>
+          <a:lstStyle>
+            <a:lvl1pPr algn="r">
+              <a:defRPr sz="1200"/>
+            </a:lvl1pPr>
+          </a:lstStyle>
+          <a:p>
+            <a:fld id="{B9A8B51A-AF34-8043-88BB-7DEBFD50DDAE}" type="slidenum">
+              <a:rPr lang="en-US" smtClean="0"/>
+              <a:t>‹#›</a:t>
+            </a:fld>
+            <a:endParaRPr lang="en-US"/>
+          </a:p>
+        </p:txBody>
+      </p:sp>
+    </p:spTree>
+    <p:extLst>
+      <p:ext uri="{BB962C8B-B14F-4D97-AF65-F5344CB8AC3E}">
+        <p14:creationId xmlns:p14="http://schemas.microsoft.com/office/powerpoint/2010/main" val="4231684342"/>
+      </p:ext>
+    </p:extLst>
+  </p:cSld>
+  <p:clrMap bg1="lt1" tx1="dk1" bg2="lt2" tx2="dk2" accent1="accent1" accent2="accent2" accent3="accent3" accent4="accent4" accent5="accent5" accent6="accent6" hlink="hlink" folHlink="folHlink"/>
+  <p:notesStyle>
+    <a:lvl1pPr marL="0" algn="l" defTabSz="914400" rtl="0" eaLnBrk="1" latinLnBrk="0" hangingPunct="1">
+      <a:defRPr sz="1200" kern="1200">
+        <a:solidFill>
+          <a:schemeClr val="tx1"/>
+        </a:solidFill>
+        <a:latin typeface="+mn-lt"/>
+        <a:ea typeface="+mn-ea"/>
+        <a:cs typeface="+mn-cs"/>
+      </a:defRPr>
+    </a:lvl1pPr>
+    <a:lvl2pPr marL="457200" algn="l" defTabSz="914400" rtl="0" eaLnBrk="1" latinLnBrk="0" hangingPunct="1">
+      <a:defRPr sz="1200" kern="1200">
+        <a:solidFill>
+          <a:schemeClr val="tx1"/>
+        </a:solidFill>
+        <a:latin typeface="+mn-lt"/>
+        <a:ea typeface="+mn-ea"/>
+        <a:cs typeface="+mn-cs"/>
+      </a:defRPr>
+    </a:lvl2pPr>
+    <a:lvl3pPr marL="914400" algn="l" defTabSz="914400" rtl="0" eaLnBrk="1" latinLnBrk="0" hangingPunct="1">
+      <a:defRPr sz="1200" kern="1200">
+        <a:solidFill>
+          <a:schemeClr val="tx1"/>
+        </a:solidFill>
+        <a:latin typeface="+mn-lt"/>
+        <a:ea typeface="+mn-ea"/>
+        <a:cs typeface="+mn-cs"/>
+      </a:defRPr>
+    </a:lvl3pPr>
+    <a:lvl4pPr marL="1371600" algn="l" defTabSz="914400" rtl="0" eaLnBrk="1" latinLnBrk="0" hangingPunct="1">
+      <a:defRPr sz="1200" kern="1200">
+        <a:solidFill>
+          <a:schemeClr val="tx1"/>
+        </a:solidFill>
+        <a:latin typeface="+mn-lt"/>
+        <a:ea typeface="+mn-ea"/>
+        <a:cs typeface="+mn-cs"/>
+      </a:defRPr>
+    </a:lvl4pPr>
+    <a:lvl5pPr marL="1828800" algn="l" defTabSz="914400" rtl="0" eaLnBrk="1" latinLnBrk="0" hangingPunct="1">
+      <a:defRPr sz="1200" kern="1200">
+        <a:solidFill>
+          <a:schemeClr val="tx1"/>
+        </a:solidFill>
+        <a:latin typeface="+mn-lt"/>
+        <a:ea typeface="+mn-ea"/>
+        <a:cs typeface="+mn-cs"/>
+      </a:defRPr>
+    </a:lvl5pPr>
+    <a:lvl6pPr marL="2286000" algn="l" defTabSz="914400" rtl="0" eaLnBrk="1" latinLnBrk="0" hangingPunct="1">
+      <a:defRPr sz="1200" kern="1200">
+        <a:solidFill>
+          <a:schemeClr val="tx1"/>
+        </a:solidFill>
+        <a:latin typeface="+mn-lt"/>
+        <a:ea typeface="+mn-ea"/>
+        <a:cs typeface="+mn-cs"/>
+      </a:defRPr>
+    </a:lvl6pPr>
+    <a:lvl7pPr marL="2743200" algn="l" defTabSz="914400" rtl="0" eaLnBrk="1" latinLnBrk="0" hangingPunct="1">
+      <a:defRPr sz="1200" kern="1200">
+        <a:solidFill>
+          <a:schemeClr val="tx1"/>
+        </a:solidFill>
+        <a:latin typeface="+mn-lt"/>
+        <a:ea typeface="+mn-ea"/>
+        <a:cs typeface="+mn-cs"/>
+      </a:defRPr>
+    </a:lvl7pPr>
+    <a:lvl8pPr marL="3200400" algn="l" defTabSz="914400" rtl="0" eaLnBrk="1" latinLnBrk="0" hangingPunct="1">
+      <a:defRPr sz="1200" kern="1200">
+        <a:solidFill>
+          <a:schemeClr val="tx1"/>
+        </a:solidFill>
+        <a:latin typeface="+mn-lt"/>
+        <a:ea typeface="+mn-ea"/>
+        <a:cs typeface="+mn-cs"/>
+      </a:defRPr>
+    </a:lvl8pPr>
+    <a:lvl9pPr marL="3657600" algn="l" defTabSz="914400" rtl="0" eaLnBrk="1" latinLnBrk="0" hangingPunct="1">
+      <a:defRPr sz="1200" kern="1200">
+        <a:solidFill>
+          <a:schemeClr val="tx1"/>
+        </a:solidFill>
+        <a:latin typeface="+mn-lt"/>
+        <a:ea typeface="+mn-ea"/>
+        <a:cs typeface="+mn-cs"/>
+      </a:defRPr>
+    </a:lvl9pPr>
+  </p:notesStyle>
+</p:notesMaster>
+</file>
+
+<file path=ppt/notesSlides/notesSlide1.xml><?xml version="1.0" encoding="utf-8"?>
+<p:notes xmlns:a="http://schemas.openxmlformats.org/drawingml/2006/main" xmlns:r="http://schemas.openxmlformats.org/officeDocument/2006/relationships" xmlns:p="http://schemas.openxmlformats.org/presentationml/2006/main">
+  <p:cSld>
+    <p:spTree>
+      <p:nvGrpSpPr>
+        <p:cNvPr id="1" name=""/>
+        <p:cNvGrpSpPr/>
+        <p:nvPr/>
+      </p:nvGrpSpPr>
+      <p:grpSpPr>
+        <a:xfrm>
+          <a:off x="0" y="0"/>
+          <a:ext cx="0" cy="0"/>
+          <a:chOff x="0" y="0"/>
+          <a:chExt cx="0" cy="0"/>
+        </a:xfrm>
+      </p:grpSpPr>
+      <p:sp>
+        <p:nvSpPr>
+          <p:cNvPr id="2" name="Slide Image Placeholder 1"/>
+          <p:cNvSpPr>
+            <a:spLocks noGrp="1" noRot="1" noChangeAspect="1"/>
+          </p:cNvSpPr>
+          <p:nvPr>
+            <p:ph type="sldImg"/>
+          </p:nvPr>
+        </p:nvSpPr>
+        <p:spPr/>
+      </p:sp>
+      <p:sp>
+        <p:nvSpPr>
+          <p:cNvPr id="3" name="Notes Placeholder 2"/>
+          <p:cNvSpPr>
+            <a:spLocks noGrp="1"/>
+          </p:cNvSpPr>
+          <p:nvPr>
+            <p:ph type="body" idx="1"/>
+          </p:nvPr>
+        </p:nvSpPr>
+        <p:spPr/>
+        <p:txBody>
+          <a:bodyPr/>
+          <a:lstStyle/>
+          <a:p>
+            <a:endParaRPr lang="en-US" dirty="0"/>
+          </a:p>
+        </p:txBody>
+      </p:sp>
+      <p:sp>
+        <p:nvSpPr>
+          <p:cNvPr id="4" name="Slide Number Placeholder 3"/>
+          <p:cNvSpPr>
+            <a:spLocks noGrp="1"/>
+          </p:cNvSpPr>
+          <p:nvPr>
+            <p:ph type="sldNum" sz="quarter" idx="5"/>
+          </p:nvPr>
+        </p:nvSpPr>
+        <p:spPr/>
+        <p:txBody>
+          <a:bodyPr/>
+          <a:lstStyle/>
+          <a:p>
+            <a:fld id="{B9A8B51A-AF34-8043-88BB-7DEBFD50DDAE}" type="slidenum">
+              <a:rPr lang="en-US" smtClean="0"/>
+              <a:t>5</a:t>
+            </a:fld>
+            <a:endParaRPr lang="en-US"/>
+          </a:p>
+        </p:txBody>
+      </p:sp>
+    </p:spTree>
+    <p:extLst>
+      <p:ext uri="{BB962C8B-B14F-4D97-AF65-F5344CB8AC3E}">
+        <p14:creationId xmlns:p14="http://schemas.microsoft.com/office/powerpoint/2010/main" val="1078115833"/>
+      </p:ext>
+    </p:extLst>
+  </p:cSld>
+  <p:clrMapOvr>
+    <a:masterClrMapping/>
+  </p:clrMapOvr>
+</p:notes>
 </file>
 
 <file path=ppt/slideLayouts/slideLayout1.xml><?xml version="1.0" encoding="utf-8"?>
@@ -258,7 +3236,7 @@
           <a:p>
             <a:fld id="{D8C81EDA-B9C2-8543-B841-6A2EFDA806E7}" type="datetimeFigureOut">
               <a:rPr lang="en-US" smtClean="0"/>
-              <a:t>7/22/24</a:t>
+              <a:t>7/25/24</a:t>
             </a:fld>
             <a:endParaRPr lang="en-US"/>
           </a:p>
@@ -456,7 +3434,7 @@
           <a:p>
             <a:fld id="{D8C81EDA-B9C2-8543-B841-6A2EFDA806E7}" type="datetimeFigureOut">
               <a:rPr lang="en-US" smtClean="0"/>
-              <a:t>7/22/24</a:t>
+              <a:t>7/25/24</a:t>
             </a:fld>
             <a:endParaRPr lang="en-US"/>
           </a:p>
@@ -664,7 +3642,7 @@
           <a:p>
             <a:fld id="{D8C81EDA-B9C2-8543-B841-6A2EFDA806E7}" type="datetimeFigureOut">
               <a:rPr lang="en-US" smtClean="0"/>
-              <a:t>7/22/24</a:t>
+              <a:t>7/25/24</a:t>
             </a:fld>
             <a:endParaRPr lang="en-US"/>
           </a:p>
@@ -862,7 +3840,7 @@
           <a:p>
             <a:fld id="{D8C81EDA-B9C2-8543-B841-6A2EFDA806E7}" type="datetimeFigureOut">
               <a:rPr lang="en-US" smtClean="0"/>
-              <a:t>7/22/24</a:t>
+              <a:t>7/25/24</a:t>
             </a:fld>
             <a:endParaRPr lang="en-US"/>
           </a:p>
@@ -1137,7 +4115,7 @@
           <a:p>
             <a:fld id="{D8C81EDA-B9C2-8543-B841-6A2EFDA806E7}" type="datetimeFigureOut">
               <a:rPr lang="en-US" smtClean="0"/>
-              <a:t>7/22/24</a:t>
+              <a:t>7/25/24</a:t>
             </a:fld>
             <a:endParaRPr lang="en-US"/>
           </a:p>
@@ -1402,7 +4380,7 @@
           <a:p>
             <a:fld id="{D8C81EDA-B9C2-8543-B841-6A2EFDA806E7}" type="datetimeFigureOut">
               <a:rPr lang="en-US" smtClean="0"/>
-              <a:t>7/22/24</a:t>
+              <a:t>7/25/24</a:t>
             </a:fld>
             <a:endParaRPr lang="en-US"/>
           </a:p>
@@ -1814,7 +4792,7 @@
           <a:p>
             <a:fld id="{D8C81EDA-B9C2-8543-B841-6A2EFDA806E7}" type="datetimeFigureOut">
               <a:rPr lang="en-US" smtClean="0"/>
-              <a:t>7/22/24</a:t>
+              <a:t>7/25/24</a:t>
             </a:fld>
             <a:endParaRPr lang="en-US"/>
           </a:p>
@@ -1955,7 +4933,7 @@
           <a:p>
             <a:fld id="{D8C81EDA-B9C2-8543-B841-6A2EFDA806E7}" type="datetimeFigureOut">
               <a:rPr lang="en-US" smtClean="0"/>
-              <a:t>7/22/24</a:t>
+              <a:t>7/25/24</a:t>
             </a:fld>
             <a:endParaRPr lang="en-US"/>
           </a:p>
@@ -2068,7 +5046,7 @@
           <a:p>
             <a:fld id="{D8C81EDA-B9C2-8543-B841-6A2EFDA806E7}" type="datetimeFigureOut">
               <a:rPr lang="en-US" smtClean="0"/>
-              <a:t>7/22/24</a:t>
+              <a:t>7/25/24</a:t>
             </a:fld>
             <a:endParaRPr lang="en-US"/>
           </a:p>
@@ -2379,7 +5357,7 @@
           <a:p>
             <a:fld id="{D8C81EDA-B9C2-8543-B841-6A2EFDA806E7}" type="datetimeFigureOut">
               <a:rPr lang="en-US" smtClean="0"/>
-              <a:t>7/22/24</a:t>
+              <a:t>7/25/24</a:t>
             </a:fld>
             <a:endParaRPr lang="en-US"/>
           </a:p>
@@ -2667,7 +5645,7 @@
           <a:p>
             <a:fld id="{D8C81EDA-B9C2-8543-B841-6A2EFDA806E7}" type="datetimeFigureOut">
               <a:rPr lang="en-US" smtClean="0"/>
-              <a:t>7/22/24</a:t>
+              <a:t>7/25/24</a:t>
             </a:fld>
             <a:endParaRPr lang="en-US"/>
           </a:p>
@@ -2908,7 +5886,7 @@
           <a:p>
             <a:fld id="{D8C81EDA-B9C2-8543-B841-6A2EFDA806E7}" type="datetimeFigureOut">
               <a:rPr lang="en-US" smtClean="0"/>
-              <a:t>7/22/24</a:t>
+              <a:t>7/25/24</a:t>
             </a:fld>
             <a:endParaRPr lang="en-US"/>
           </a:p>
@@ -3667,133 +6645,508 @@
             <p:ph idx="1"/>
           </p:nvPr>
         </p:nvSpPr>
-        <p:spPr/>
+        <p:spPr>
+          <a:xfrm>
+            <a:off x="6925887" y="1006381"/>
+            <a:ext cx="3764280" cy="424581"/>
+          </a:xfrm>
+        </p:spPr>
         <p:txBody>
-          <a:bodyPr>
-            <a:normAutofit fontScale="92500" lnSpcReduction="10000"/>
+          <a:bodyPr anchor="ctr">
+            <a:normAutofit/>
           </a:bodyPr>
           <a:lstStyle/>
           <a:p>
-            <a:pPr marL="0" indent="0">
+            <a:pPr marL="0" indent="0" algn="just">
               <a:buNone/>
             </a:pPr>
             <a:r>
-              <a:rPr lang="en-US" dirty="0">
+              <a:rPr lang="en-US" sz="2000" dirty="0">
                 <a:hlinkClick r:id="rId2"/>
               </a:rPr>
-              <a:t>https://github.com/zhteg4/nemd </a:t>
-            </a:r>
-            <a:r>
-              <a:rPr lang="en-US" dirty="0"/>
-              <a:t>:</a:t>
-            </a:r>
-          </a:p>
-          <a:p>
-            <a:pPr marL="0" indent="0">
-              <a:buNone/>
-            </a:pPr>
-            <a:endParaRPr lang="en-US" dirty="0"/>
-          </a:p>
-          <a:p>
-            <a:pPr lvl="1"/>
-            <a:r>
-              <a:rPr lang="en-US" dirty="0" err="1"/>
-              <a:t>setup.py</a:t>
-            </a:r>
-            <a:r>
-              <a:rPr lang="en-US" dirty="0"/>
-              <a:t>: </a:t>
-            </a:r>
-            <a:r>
-              <a:rPr lang="en-US" sz="2200" dirty="0" err="1"/>
-              <a:t>PyPI</a:t>
-            </a:r>
-            <a:r>
-              <a:rPr lang="en-US" sz="2200" dirty="0"/>
-              <a:t> installation with dependencies on Darwin and Linux</a:t>
-            </a:r>
-          </a:p>
-          <a:p>
-            <a:pPr lvl="1"/>
-            <a:r>
-              <a:rPr lang="en-US" dirty="0" err="1"/>
-              <a:t>premake</a:t>
-            </a:r>
-            <a:r>
-              <a:rPr lang="en-US" dirty="0"/>
-              <a:t>: </a:t>
-            </a:r>
-            <a:r>
-              <a:rPr lang="en-US" sz="2200" dirty="0"/>
-              <a:t>environmental configuration for molecule, scripts and executables </a:t>
-            </a:r>
-          </a:p>
-          <a:p>
-            <a:pPr lvl="1"/>
-            <a:r>
-              <a:rPr lang="en-US" dirty="0" err="1"/>
-              <a:t>bash_scripts</a:t>
-            </a:r>
-            <a:r>
-              <a:rPr lang="en-US" dirty="0"/>
-              <a:t>: </a:t>
-            </a:r>
-            <a:r>
-              <a:rPr lang="en-US" sz="2200" dirty="0"/>
-              <a:t>bash executables to run python scripts, tests, and other utilities</a:t>
-            </a:r>
-          </a:p>
-          <a:p>
-            <a:pPr lvl="1"/>
-            <a:r>
-              <a:rPr lang="en-US" dirty="0"/>
-              <a:t>module: shared classes and functions importable by scripts and workflow</a:t>
-            </a:r>
-          </a:p>
-          <a:p>
-            <a:pPr lvl="1"/>
-            <a:r>
-              <a:rPr lang="en-US" dirty="0"/>
-              <a:t>scripts: drivers to perform one job from the command line</a:t>
-            </a:r>
-          </a:p>
-          <a:p>
-            <a:pPr lvl="1"/>
-            <a:r>
-              <a:rPr lang="en-US" dirty="0"/>
-              <a:t>workflows: multiple jobs from different states with aggregation</a:t>
-            </a:r>
-          </a:p>
-          <a:p>
-            <a:pPr lvl="1"/>
-            <a:r>
-              <a:rPr lang="en-US" dirty="0"/>
-              <a:t>submodule: source codes from other repositories</a:t>
-            </a:r>
-          </a:p>
-          <a:p>
-            <a:pPr lvl="1"/>
-            <a:r>
-              <a:rPr lang="en-US" dirty="0"/>
-              <a:t>test: unit tests, integration tests, and scientific tests</a:t>
-            </a:r>
-          </a:p>
-          <a:p>
-            <a:pPr lvl="1"/>
-            <a:r>
-              <a:rPr lang="en-US" dirty="0"/>
-              <a:t>practice: trial and error learning curve</a:t>
-            </a:r>
-          </a:p>
-          <a:p>
-            <a:pPr lvl="1"/>
-            <a:r>
-              <a:rPr lang="en-US" dirty="0"/>
-              <a:t>docs: PowerPoint and Words for roadmap, summary, and documentation</a:t>
-            </a:r>
+              <a:t>https://github.com/zhteg4/nemd/ </a:t>
+            </a:r>
+            <a:endParaRPr lang="en-US" sz="2000" dirty="0"/>
           </a:p>
         </p:txBody>
       </p:sp>
+      <p:graphicFrame>
+        <p:nvGraphicFramePr>
+          <p:cNvPr id="4" name="Table 3">
+            <a:extLst>
+              <a:ext uri="{FF2B5EF4-FFF2-40B4-BE49-F238E27FC236}">
+                <a16:creationId xmlns:a16="http://schemas.microsoft.com/office/drawing/2014/main" id="{1E2C1888-8148-534E-A074-A5D082788FBC}"/>
+              </a:ext>
+            </a:extLst>
+          </p:cNvPr>
+          <p:cNvGraphicFramePr>
+            <a:graphicFrameLocks noGrp="1"/>
+          </p:cNvGraphicFramePr>
+          <p:nvPr>
+            <p:extLst>
+              <p:ext uri="{D42A27DB-BD31-4B8C-83A1-F6EECF244321}">
+                <p14:modId xmlns:p14="http://schemas.microsoft.com/office/powerpoint/2010/main" val="1142022677"/>
+              </p:ext>
+            </p:extLst>
+          </p:nvPr>
+        </p:nvGraphicFramePr>
+        <p:xfrm>
+          <a:off x="1416857" y="1447588"/>
+          <a:ext cx="9248371" cy="4983480"/>
+        </p:xfrm>
+        <a:graphic>
+          <a:graphicData uri="http://schemas.openxmlformats.org/drawingml/2006/table">
+            <a:tbl>
+              <a:tblPr firstRow="1" bandRow="1">
+                <a:tableStyleId>{5C22544A-7EE6-4342-B048-85BDC9FD1C3A}</a:tableStyleId>
+              </a:tblPr>
+              <a:tblGrid>
+                <a:gridCol w="1755089">
+                  <a:extLst>
+                    <a:ext uri="{9D8B030D-6E8A-4147-A177-3AD203B41FA5}">
+                      <a16:colId xmlns:a16="http://schemas.microsoft.com/office/drawing/2014/main" val="3202141244"/>
+                    </a:ext>
+                  </a:extLst>
+                </a:gridCol>
+                <a:gridCol w="7493282">
+                  <a:extLst>
+                    <a:ext uri="{9D8B030D-6E8A-4147-A177-3AD203B41FA5}">
+                      <a16:colId xmlns:a16="http://schemas.microsoft.com/office/drawing/2014/main" val="2146602134"/>
+                    </a:ext>
+                  </a:extLst>
+                </a:gridCol>
+              </a:tblGrid>
+              <a:tr h="411480">
+                <a:tc>
+                  <a:txBody>
+                    <a:bodyPr/>
+                    <a:lstStyle/>
+                    <a:p>
+                      <a:pPr algn="ctr"/>
+                      <a:r>
+                        <a:rPr lang="en-US" dirty="0"/>
+                        <a:t>Name</a:t>
+                      </a:r>
+                    </a:p>
+                  </a:txBody>
+                  <a:tcPr anchor="ctr"/>
+                </a:tc>
+                <a:tc>
+                  <a:txBody>
+                    <a:bodyPr/>
+                    <a:lstStyle/>
+                    <a:p>
+                      <a:pPr algn="ctr"/>
+                      <a:r>
+                        <a:rPr lang="en-US" dirty="0"/>
+                        <a:t>Description</a:t>
+                      </a:r>
+                    </a:p>
+                  </a:txBody>
+                  <a:tcPr anchor="ctr"/>
+                </a:tc>
+                <a:extLst>
+                  <a:ext uri="{0D108BD9-81ED-4DB2-BD59-A6C34878D82A}">
+                    <a16:rowId xmlns:a16="http://schemas.microsoft.com/office/drawing/2014/main" val="2634331587"/>
+                  </a:ext>
+                </a:extLst>
+              </a:tr>
+              <a:tr h="457200">
+                <a:tc>
+                  <a:txBody>
+                    <a:bodyPr/>
+                    <a:lstStyle/>
+                    <a:p>
+                      <a:pPr algn="ctr"/>
+                      <a:r>
+                        <a:rPr lang="en-US" dirty="0" err="1"/>
+                        <a:t>setup.py</a:t>
+                      </a:r>
+                      <a:endParaRPr lang="en-US" dirty="0"/>
+                    </a:p>
+                  </a:txBody>
+                  <a:tcPr anchor="ctr"/>
+                </a:tc>
+                <a:tc>
+                  <a:txBody>
+                    <a:bodyPr/>
+                    <a:lstStyle/>
+                    <a:p>
+                      <a:pPr algn="ctr"/>
+                      <a:r>
+                        <a:rPr lang="en-US" sz="1800" dirty="0" err="1"/>
+                        <a:t>PyPI</a:t>
+                      </a:r>
+                      <a:r>
+                        <a:rPr lang="en-US" sz="1800" dirty="0"/>
+                        <a:t> installation with dependencies on Darwin and Linux</a:t>
+                      </a:r>
+                      <a:endParaRPr lang="en-US" dirty="0"/>
+                    </a:p>
+                  </a:txBody>
+                  <a:tcPr anchor="ctr"/>
+                </a:tc>
+                <a:extLst>
+                  <a:ext uri="{0D108BD9-81ED-4DB2-BD59-A6C34878D82A}">
+                    <a16:rowId xmlns:a16="http://schemas.microsoft.com/office/drawing/2014/main" val="2548513026"/>
+                  </a:ext>
+                </a:extLst>
+              </a:tr>
+              <a:tr h="457200">
+                <a:tc>
+                  <a:txBody>
+                    <a:bodyPr/>
+                    <a:lstStyle/>
+                    <a:p>
+                      <a:pPr algn="ctr"/>
+                      <a:r>
+                        <a:rPr lang="en-US" dirty="0" err="1"/>
+                        <a:t>premake</a:t>
+                      </a:r>
+                      <a:endParaRPr lang="en-US" dirty="0"/>
+                    </a:p>
+                  </a:txBody>
+                  <a:tcPr anchor="ctr"/>
+                </a:tc>
+                <a:tc>
+                  <a:txBody>
+                    <a:bodyPr/>
+                    <a:lstStyle/>
+                    <a:p>
+                      <a:pPr algn="ctr"/>
+                      <a:r>
+                        <a:rPr lang="en-US" sz="1800" dirty="0"/>
+                        <a:t>Environmental configuration for module, scripts, workflow and bash</a:t>
+                      </a:r>
+                      <a:endParaRPr lang="en-US" dirty="0"/>
+                    </a:p>
+                  </a:txBody>
+                  <a:tcPr anchor="ctr"/>
+                </a:tc>
+                <a:extLst>
+                  <a:ext uri="{0D108BD9-81ED-4DB2-BD59-A6C34878D82A}">
+                    <a16:rowId xmlns:a16="http://schemas.microsoft.com/office/drawing/2014/main" val="875388011"/>
+                  </a:ext>
+                </a:extLst>
+              </a:tr>
+              <a:tr h="457200">
+                <a:tc>
+                  <a:txBody>
+                    <a:bodyPr/>
+                    <a:lstStyle/>
+                    <a:p>
+                      <a:pPr algn="ctr"/>
+                      <a:r>
+                        <a:rPr lang="en-US" dirty="0" err="1"/>
+                        <a:t>bash_scripts</a:t>
+                      </a:r>
+                      <a:endParaRPr lang="en-US" dirty="0"/>
+                    </a:p>
+                  </a:txBody>
+                  <a:tcPr anchor="ctr"/>
+                </a:tc>
+                <a:tc>
+                  <a:txBody>
+                    <a:bodyPr/>
+                    <a:lstStyle/>
+                    <a:p>
+                      <a:pPr algn="ctr"/>
+                      <a:r>
+                        <a:rPr lang="en-US" sz="1800" dirty="0"/>
+                        <a:t>Bash executables to run python scripts, tests, and other utilities</a:t>
+                      </a:r>
+                      <a:endParaRPr lang="en-US" dirty="0"/>
+                    </a:p>
+                  </a:txBody>
+                  <a:tcPr anchor="ctr"/>
+                </a:tc>
+                <a:extLst>
+                  <a:ext uri="{0D108BD9-81ED-4DB2-BD59-A6C34878D82A}">
+                    <a16:rowId xmlns:a16="http://schemas.microsoft.com/office/drawing/2014/main" val="757901223"/>
+                  </a:ext>
+                </a:extLst>
+              </a:tr>
+              <a:tr h="457200">
+                <a:tc>
+                  <a:txBody>
+                    <a:bodyPr/>
+                    <a:lstStyle/>
+                    <a:p>
+                      <a:pPr algn="ctr"/>
+                      <a:r>
+                        <a:rPr lang="en-US" dirty="0"/>
+                        <a:t>module</a:t>
+                      </a:r>
+                    </a:p>
+                  </a:txBody>
+                  <a:tcPr anchor="ctr"/>
+                </a:tc>
+                <a:tc>
+                  <a:txBody>
+                    <a:bodyPr/>
+                    <a:lstStyle/>
+                    <a:p>
+                      <a:pPr algn="ctr"/>
+                      <a:r>
+                        <a:rPr lang="en-US" dirty="0"/>
+                        <a:t>Shared classes and functions importable by scripts and workflow</a:t>
+                      </a:r>
+                    </a:p>
+                  </a:txBody>
+                  <a:tcPr anchor="ctr"/>
+                </a:tc>
+                <a:extLst>
+                  <a:ext uri="{0D108BD9-81ED-4DB2-BD59-A6C34878D82A}">
+                    <a16:rowId xmlns:a16="http://schemas.microsoft.com/office/drawing/2014/main" val="4058676012"/>
+                  </a:ext>
+                </a:extLst>
+              </a:tr>
+              <a:tr h="457200">
+                <a:tc>
+                  <a:txBody>
+                    <a:bodyPr/>
+                    <a:lstStyle/>
+                    <a:p>
+                      <a:pPr algn="ctr"/>
+                      <a:r>
+                        <a:rPr lang="en-US" dirty="0"/>
+                        <a:t>scripts</a:t>
+                      </a:r>
+                    </a:p>
+                  </a:txBody>
+                  <a:tcPr anchor="ctr"/>
+                </a:tc>
+                <a:tc>
+                  <a:txBody>
+                    <a:bodyPr/>
+                    <a:lstStyle/>
+                    <a:p>
+                      <a:pPr marL="0" marR="0" lvl="0" indent="0" algn="ctr" defTabSz="914400" rtl="0" eaLnBrk="1" fontAlgn="auto" latinLnBrk="0" hangingPunct="1">
+                        <a:lnSpc>
+                          <a:spcPct val="100000"/>
+                        </a:lnSpc>
+                        <a:spcBef>
+                          <a:spcPts val="0"/>
+                        </a:spcBef>
+                        <a:spcAft>
+                          <a:spcPts val="0"/>
+                        </a:spcAft>
+                        <a:buClrTx/>
+                        <a:buSzTx/>
+                        <a:buFontTx/>
+                        <a:buNone/>
+                        <a:tabLst/>
+                        <a:defRPr/>
+                      </a:pPr>
+                      <a:r>
+                        <a:rPr lang="en-US" dirty="0"/>
+                        <a:t>Drivers to perform one job from the command line</a:t>
+                      </a:r>
+                    </a:p>
+                  </a:txBody>
+                  <a:tcPr anchor="ctr"/>
+                </a:tc>
+                <a:extLst>
+                  <a:ext uri="{0D108BD9-81ED-4DB2-BD59-A6C34878D82A}">
+                    <a16:rowId xmlns:a16="http://schemas.microsoft.com/office/drawing/2014/main" val="1213682544"/>
+                  </a:ext>
+                </a:extLst>
+              </a:tr>
+              <a:tr h="457200">
+                <a:tc>
+                  <a:txBody>
+                    <a:bodyPr/>
+                    <a:lstStyle/>
+                    <a:p>
+                      <a:pPr algn="ctr"/>
+                      <a:r>
+                        <a:rPr lang="en-US" dirty="0"/>
+                        <a:t>workflows</a:t>
+                      </a:r>
+                    </a:p>
+                  </a:txBody>
+                  <a:tcPr anchor="ctr"/>
+                </a:tc>
+                <a:tc>
+                  <a:txBody>
+                    <a:bodyPr/>
+                    <a:lstStyle/>
+                    <a:p>
+                      <a:pPr marL="0" marR="0" lvl="0" indent="0" algn="ctr" defTabSz="914400" rtl="0" eaLnBrk="1" fontAlgn="auto" latinLnBrk="0" hangingPunct="1">
+                        <a:lnSpc>
+                          <a:spcPct val="100000"/>
+                        </a:lnSpc>
+                        <a:spcBef>
+                          <a:spcPts val="0"/>
+                        </a:spcBef>
+                        <a:spcAft>
+                          <a:spcPts val="0"/>
+                        </a:spcAft>
+                        <a:buClrTx/>
+                        <a:buSzTx/>
+                        <a:buFontTx/>
+                        <a:buNone/>
+                        <a:tabLst/>
+                        <a:defRPr/>
+                      </a:pPr>
+                      <a:r>
+                        <a:rPr lang="en-US" dirty="0"/>
+                        <a:t>Multiple jobs from different states followed by aggregation</a:t>
+                      </a:r>
+                    </a:p>
+                  </a:txBody>
+                  <a:tcPr anchor="ctr"/>
+                </a:tc>
+                <a:extLst>
+                  <a:ext uri="{0D108BD9-81ED-4DB2-BD59-A6C34878D82A}">
+                    <a16:rowId xmlns:a16="http://schemas.microsoft.com/office/drawing/2014/main" val="206037774"/>
+                  </a:ext>
+                </a:extLst>
+              </a:tr>
+              <a:tr h="457200">
+                <a:tc>
+                  <a:txBody>
+                    <a:bodyPr/>
+                    <a:lstStyle/>
+                    <a:p>
+                      <a:pPr algn="ctr"/>
+                      <a:r>
+                        <a:rPr lang="en-US" dirty="0"/>
+                        <a:t>submodule</a:t>
+                      </a:r>
+                    </a:p>
+                  </a:txBody>
+                  <a:tcPr anchor="ctr"/>
+                </a:tc>
+                <a:tc>
+                  <a:txBody>
+                    <a:bodyPr/>
+                    <a:lstStyle/>
+                    <a:p>
+                      <a:pPr algn="ctr"/>
+                      <a:r>
+                        <a:rPr lang="en-US" dirty="0"/>
+                        <a:t>Source codes from other repositories</a:t>
+                      </a:r>
+                    </a:p>
+                  </a:txBody>
+                  <a:tcPr anchor="ctr"/>
+                </a:tc>
+                <a:extLst>
+                  <a:ext uri="{0D108BD9-81ED-4DB2-BD59-A6C34878D82A}">
+                    <a16:rowId xmlns:a16="http://schemas.microsoft.com/office/drawing/2014/main" val="314688040"/>
+                  </a:ext>
+                </a:extLst>
+              </a:tr>
+              <a:tr h="457200">
+                <a:tc>
+                  <a:txBody>
+                    <a:bodyPr/>
+                    <a:lstStyle/>
+                    <a:p>
+                      <a:pPr algn="ctr"/>
+                      <a:r>
+                        <a:rPr lang="en-US" dirty="0"/>
+                        <a:t>test</a:t>
+                      </a:r>
+                    </a:p>
+                  </a:txBody>
+                  <a:tcPr anchor="ctr"/>
+                </a:tc>
+                <a:tc>
+                  <a:txBody>
+                    <a:bodyPr/>
+                    <a:lstStyle/>
+                    <a:p>
+                      <a:pPr algn="ctr"/>
+                      <a:r>
+                        <a:rPr lang="en-US" dirty="0"/>
+                        <a:t>Unit tests, integration tests, and scientific tests</a:t>
+                      </a:r>
+                    </a:p>
+                  </a:txBody>
+                  <a:tcPr anchor="ctr"/>
+                </a:tc>
+                <a:extLst>
+                  <a:ext uri="{0D108BD9-81ED-4DB2-BD59-A6C34878D82A}">
+                    <a16:rowId xmlns:a16="http://schemas.microsoft.com/office/drawing/2014/main" val="3388681689"/>
+                  </a:ext>
+                </a:extLst>
+              </a:tr>
+              <a:tr h="457200">
+                <a:tc>
+                  <a:txBody>
+                    <a:bodyPr/>
+                    <a:lstStyle/>
+                    <a:p>
+                      <a:pPr algn="ctr"/>
+                      <a:r>
+                        <a:rPr lang="en-US" dirty="0"/>
+                        <a:t>practice</a:t>
+                      </a:r>
+                    </a:p>
+                  </a:txBody>
+                  <a:tcPr anchor="ctr"/>
+                </a:tc>
+                <a:tc>
+                  <a:txBody>
+                    <a:bodyPr/>
+                    <a:lstStyle/>
+                    <a:p>
+                      <a:pPr algn="ctr"/>
+                      <a:r>
+                        <a:rPr lang="en-US" dirty="0"/>
+                        <a:t>Trial and error learning curve</a:t>
+                      </a:r>
+                    </a:p>
+                  </a:txBody>
+                  <a:tcPr anchor="ctr"/>
+                </a:tc>
+                <a:extLst>
+                  <a:ext uri="{0D108BD9-81ED-4DB2-BD59-A6C34878D82A}">
+                    <a16:rowId xmlns:a16="http://schemas.microsoft.com/office/drawing/2014/main" val="436423513"/>
+                  </a:ext>
+                </a:extLst>
+              </a:tr>
+              <a:tr h="457200">
+                <a:tc>
+                  <a:txBody>
+                    <a:bodyPr/>
+                    <a:lstStyle/>
+                    <a:p>
+                      <a:pPr algn="ctr"/>
+                      <a:r>
+                        <a:rPr lang="en-US" dirty="0"/>
+                        <a:t>docs</a:t>
+                      </a:r>
+                    </a:p>
+                  </a:txBody>
+                  <a:tcPr anchor="ctr"/>
+                </a:tc>
+                <a:tc>
+                  <a:txBody>
+                    <a:bodyPr/>
+                    <a:lstStyle/>
+                    <a:p>
+                      <a:pPr algn="ctr"/>
+                      <a:r>
+                        <a:rPr lang="en-US" dirty="0"/>
+                        <a:t>PowerPoint and Words for roadmap, summary, and documentation</a:t>
+                      </a:r>
+                    </a:p>
+                  </a:txBody>
+                  <a:tcPr anchor="ctr"/>
+                </a:tc>
+                <a:extLst>
+                  <a:ext uri="{0D108BD9-81ED-4DB2-BD59-A6C34878D82A}">
+                    <a16:rowId xmlns:a16="http://schemas.microsoft.com/office/drawing/2014/main" val="828587505"/>
+                  </a:ext>
+                </a:extLst>
+              </a:tr>
+            </a:tbl>
+          </a:graphicData>
+        </a:graphic>
+      </p:graphicFrame>
     </p:spTree>
     <p:extLst>
       <p:ext uri="{BB962C8B-B14F-4D97-AF65-F5344CB8AC3E}">
@@ -3941,7 +7294,7 @@
             </a:r>
             <a:r>
               <a:rPr lang="en-US" sz="2400" dirty="0"/>
-              <a:t> is needed (pip3 install </a:t>
+              <a:t> is needed beforehand (pip3 install </a:t>
             </a:r>
             <a:r>
               <a:rPr lang="en-US" sz="2400" dirty="0" err="1"/>
@@ -4035,202 +7388,689 @@
           </a:p>
         </p:txBody>
       </p:sp>
-      <p:sp>
-        <p:nvSpPr>
-          <p:cNvPr id="3" name="Content Placeholder 2">
+      <p:graphicFrame>
+        <p:nvGraphicFramePr>
+          <p:cNvPr id="4" name="Table 3">
             <a:extLst>
               <a:ext uri="{FF2B5EF4-FFF2-40B4-BE49-F238E27FC236}">
-                <a16:creationId xmlns:a16="http://schemas.microsoft.com/office/drawing/2014/main" id="{9C1AEF52-7507-5346-803A-2E041D406CAF}"/>
+                <a16:creationId xmlns:a16="http://schemas.microsoft.com/office/drawing/2014/main" id="{374C8347-FFFA-AD4D-840F-167C914D09BE}"/>
               </a:ext>
             </a:extLst>
           </p:cNvPr>
-          <p:cNvSpPr>
-            <a:spLocks noGrp="1"/>
-          </p:cNvSpPr>
+          <p:cNvGraphicFramePr>
+            <a:graphicFrameLocks noGrp="1"/>
+          </p:cNvGraphicFramePr>
           <p:nvPr>
-            <p:ph idx="1"/>
+            <p:extLst>
+              <p:ext uri="{D42A27DB-BD31-4B8C-83A1-F6EECF244321}">
+                <p14:modId xmlns:p14="http://schemas.microsoft.com/office/powerpoint/2010/main" val="1030870982"/>
+              </p:ext>
+            </p:extLst>
           </p:nvPr>
-        </p:nvSpPr>
-        <p:spPr/>
-        <p:txBody>
-          <a:bodyPr/>
-          <a:lstStyle/>
-          <a:p>
-            <a:r>
-              <a:rPr lang="en-US" dirty="0"/>
-              <a:t>‘source </a:t>
-            </a:r>
-            <a:r>
-              <a:rPr lang="en-US" dirty="0" err="1"/>
-              <a:t>premake</a:t>
-            </a:r>
-            <a:r>
-              <a:rPr lang="en-US" dirty="0"/>
-              <a:t>’ in the </a:t>
-            </a:r>
-            <a:r>
-              <a:rPr lang="en-US" dirty="0" err="1"/>
-              <a:t>nemd</a:t>
-            </a:r>
-            <a:r>
-              <a:rPr lang="en-US" dirty="0"/>
-              <a:t> directory to access additional utilities</a:t>
-            </a:r>
-          </a:p>
-          <a:p>
-            <a:pPr marL="0" indent="0">
-              <a:buNone/>
-            </a:pPr>
-            <a:r>
-              <a:rPr lang="en-US" sz="2000" dirty="0"/>
-              <a:t>    A must before running any tests and strongly recommended when opening a new shell.</a:t>
-            </a:r>
-          </a:p>
-          <a:p>
-            <a:r>
-              <a:rPr lang="en-US" dirty="0"/>
-              <a:t> </a:t>
-            </a:r>
-            <a:r>
-              <a:rPr lang="en-US" sz="2700" dirty="0"/>
-              <a:t>‘</a:t>
-            </a:r>
-            <a:r>
-              <a:rPr lang="en-US" sz="2700" dirty="0" err="1"/>
-              <a:t>run_test</a:t>
-            </a:r>
-            <a:r>
-              <a:rPr lang="en-US" sz="2700" dirty="0"/>
-              <a:t>’ runs </a:t>
-            </a:r>
-            <a:r>
-              <a:rPr lang="en-US" sz="2700" dirty="0" err="1"/>
-              <a:t>unittests</a:t>
-            </a:r>
-            <a:r>
-              <a:rPr lang="en-US" sz="2700" dirty="0"/>
-              <a:t>: </a:t>
-            </a:r>
-            <a:r>
-              <a:rPr lang="en-US" sz="2700" dirty="0" err="1"/>
-              <a:t>nemd</a:t>
-            </a:r>
-            <a:r>
-              <a:rPr lang="en-US" sz="2700" dirty="0"/>
-              <a:t>/test/*_</a:t>
-            </a:r>
-            <a:r>
-              <a:rPr lang="en-US" sz="2700" dirty="0" err="1"/>
-              <a:t>test.py</a:t>
-            </a:r>
-            <a:r>
-              <a:rPr lang="en-US" sz="2700" dirty="0"/>
-              <a:t> </a:t>
-            </a:r>
-            <a:r>
-              <a:rPr lang="en-US" sz="2700" dirty="0" err="1"/>
-              <a:t>nemd</a:t>
-            </a:r>
-            <a:r>
-              <a:rPr lang="en-US" sz="2700" dirty="0"/>
-              <a:t>/module/*_</a:t>
-            </a:r>
-            <a:r>
-              <a:rPr lang="en-US" sz="2700" dirty="0" err="1"/>
-              <a:t>test.py</a:t>
-            </a:r>
-            <a:endParaRPr lang="en-US" sz="2700" dirty="0"/>
-          </a:p>
-          <a:p>
-            <a:pPr marL="0" indent="0">
-              <a:buNone/>
-            </a:pPr>
-            <a:r>
-              <a:rPr lang="en-US" sz="2600" dirty="0"/>
-              <a:t>    </a:t>
-            </a:r>
-            <a:r>
-              <a:rPr lang="en-US" sz="2000" dirty="0"/>
-              <a:t>Passed </a:t>
-            </a:r>
-            <a:r>
-              <a:rPr lang="en-US" sz="2000" dirty="0" err="1"/>
-              <a:t>unittests</a:t>
-            </a:r>
-            <a:r>
-              <a:rPr lang="en-US" sz="2000" dirty="0"/>
-              <a:t> make sure that functions and class methods are operating properly</a:t>
-            </a:r>
-          </a:p>
-          <a:p>
-            <a:r>
-              <a:rPr lang="en-US" dirty="0"/>
-              <a:t>‘</a:t>
-            </a:r>
-            <a:r>
-              <a:rPr lang="en-US" dirty="0" err="1"/>
-              <a:t>run_itest</a:t>
-            </a:r>
-            <a:r>
-              <a:rPr lang="en-US" dirty="0"/>
-              <a:t>’ runs integration tests: </a:t>
-            </a:r>
-            <a:r>
-              <a:rPr lang="en-US" dirty="0" err="1"/>
-              <a:t>nemd</a:t>
-            </a:r>
-            <a:r>
-              <a:rPr lang="en-US" dirty="0"/>
-              <a:t>/test/integration/</a:t>
-            </a:r>
-          </a:p>
-          <a:p>
-            <a:pPr marL="0" indent="0">
-              <a:buNone/>
-            </a:pPr>
-            <a:r>
-              <a:rPr lang="en-US" sz="2000" dirty="0"/>
-              <a:t>     Passed integration tests tells that all driver scripts run normally yielding expected results</a:t>
-            </a:r>
-          </a:p>
-          <a:p>
-            <a:r>
-              <a:rPr lang="en-US" dirty="0"/>
-              <a:t>Scientific tests are stored in </a:t>
-            </a:r>
-            <a:r>
-              <a:rPr lang="en-US" dirty="0" err="1"/>
-              <a:t>nemd</a:t>
-            </a:r>
-            <a:r>
-              <a:rPr lang="en-US" dirty="0"/>
-              <a:t>/test/</a:t>
-            </a:r>
-            <a:r>
-              <a:rPr lang="en-US" dirty="0" err="1"/>
-              <a:t>scientific_test</a:t>
-            </a:r>
-            <a:endParaRPr lang="en-US" dirty="0"/>
-          </a:p>
-          <a:p>
-            <a:pPr marL="0" indent="0">
-              <a:buNone/>
-            </a:pPr>
-            <a:r>
-              <a:rPr lang="en-US" sz="2000" dirty="0"/>
-              <a:t>    The </a:t>
-            </a:r>
-            <a:r>
-              <a:rPr lang="en-US" sz="2000" dirty="0" err="1"/>
-              <a:t>cmd</a:t>
-            </a:r>
-            <a:r>
-              <a:rPr lang="en-US" sz="2000" dirty="0"/>
-              <a:t> file in each subfolder runs either a driver job or a workflow with scientific outputs</a:t>
-            </a:r>
-          </a:p>
-        </p:txBody>
-      </p:sp>
+        </p:nvGraphicFramePr>
+        <p:xfrm>
+          <a:off x="714893" y="1911292"/>
+          <a:ext cx="10753965" cy="4141024"/>
+        </p:xfrm>
+        <a:graphic>
+          <a:graphicData uri="http://schemas.openxmlformats.org/drawingml/2006/table">
+            <a:tbl>
+              <a:tblPr firstRow="1" bandRow="1">
+                <a:tableStyleId>{2D5ABB26-0587-4C30-8999-92F81FD0307C}</a:tableStyleId>
+              </a:tblPr>
+              <a:tblGrid>
+                <a:gridCol w="1828800">
+                  <a:extLst>
+                    <a:ext uri="{9D8B030D-6E8A-4147-A177-3AD203B41FA5}">
+                      <a16:colId xmlns:a16="http://schemas.microsoft.com/office/drawing/2014/main" val="140681280"/>
+                    </a:ext>
+                  </a:extLst>
+                </a:gridCol>
+                <a:gridCol w="2978206">
+                  <a:extLst>
+                    <a:ext uri="{9D8B030D-6E8A-4147-A177-3AD203B41FA5}">
+                      <a16:colId xmlns:a16="http://schemas.microsoft.com/office/drawing/2014/main" val="819792391"/>
+                    </a:ext>
+                  </a:extLst>
+                </a:gridCol>
+                <a:gridCol w="5946959">
+                  <a:extLst>
+                    <a:ext uri="{9D8B030D-6E8A-4147-A177-3AD203B41FA5}">
+                      <a16:colId xmlns:a16="http://schemas.microsoft.com/office/drawing/2014/main" val="3388334755"/>
+                    </a:ext>
+                  </a:extLst>
+                </a:gridCol>
+              </a:tblGrid>
+              <a:tr h="548640">
+                <a:tc>
+                  <a:txBody>
+                    <a:bodyPr/>
+                    <a:lstStyle/>
+                    <a:p>
+                      <a:pPr algn="just"/>
+                      <a:r>
+                        <a:rPr lang="en-US" dirty="0"/>
+                        <a:t>Command</a:t>
+                      </a:r>
+                    </a:p>
+                  </a:txBody>
+                  <a:tcPr marL="137160" marR="137160" marT="137160" marB="137160" anchor="ctr">
+                    <a:lnB w="12700" cap="flat" cmpd="sng" algn="ctr">
+                      <a:solidFill>
+                        <a:schemeClr val="tx1"/>
+                      </a:solidFill>
+                      <a:prstDash val="solid"/>
+                      <a:round/>
+                      <a:headEnd type="none" w="med" len="med"/>
+                      <a:tailEnd type="none" w="med" len="med"/>
+                    </a:lnB>
+                  </a:tcPr>
+                </a:tc>
+                <a:tc>
+                  <a:txBody>
+                    <a:bodyPr/>
+                    <a:lstStyle/>
+                    <a:p>
+                      <a:pPr algn="just"/>
+                      <a:r>
+                        <a:rPr lang="en-US" dirty="0"/>
+                        <a:t>Location</a:t>
+                      </a:r>
+                    </a:p>
+                  </a:txBody>
+                  <a:tcPr marL="137160" marR="137160" marT="137160" marB="137160" anchor="ctr">
+                    <a:lnB w="12700" cap="flat" cmpd="sng" algn="ctr">
+                      <a:solidFill>
+                        <a:schemeClr val="tx1"/>
+                      </a:solidFill>
+                      <a:prstDash val="solid"/>
+                      <a:round/>
+                      <a:headEnd type="none" w="med" len="med"/>
+                      <a:tailEnd type="none" w="med" len="med"/>
+                    </a:lnB>
+                  </a:tcPr>
+                </a:tc>
+                <a:tc>
+                  <a:txBody>
+                    <a:bodyPr/>
+                    <a:lstStyle/>
+                    <a:p>
+                      <a:pPr algn="just"/>
+                      <a:r>
+                        <a:rPr lang="en-US" dirty="0"/>
+                        <a:t>Description</a:t>
+                      </a:r>
+                    </a:p>
+                  </a:txBody>
+                  <a:tcPr marL="137160" marR="137160" marT="137160" marB="137160" anchor="ctr">
+                    <a:lnB w="12700" cap="flat" cmpd="sng" algn="ctr">
+                      <a:solidFill>
+                        <a:schemeClr val="tx1"/>
+                      </a:solidFill>
+                      <a:prstDash val="solid"/>
+                      <a:round/>
+                      <a:headEnd type="none" w="med" len="med"/>
+                      <a:tailEnd type="none" w="med" len="med"/>
+                    </a:lnB>
+                  </a:tcPr>
+                </a:tc>
+                <a:extLst>
+                  <a:ext uri="{0D108BD9-81ED-4DB2-BD59-A6C34878D82A}">
+                    <a16:rowId xmlns:a16="http://schemas.microsoft.com/office/drawing/2014/main" val="2761390173"/>
+                  </a:ext>
+                </a:extLst>
+              </a:tr>
+              <a:tr h="898096">
+                <a:tc>
+                  <a:txBody>
+                    <a:bodyPr/>
+                    <a:lstStyle/>
+                    <a:p>
+                      <a:pPr algn="just"/>
+                      <a:r>
+                        <a:rPr lang="en-US" dirty="0"/>
+                        <a:t>source </a:t>
+                      </a:r>
+                      <a:r>
+                        <a:rPr lang="en-US" dirty="0" err="1"/>
+                        <a:t>premake</a:t>
+                      </a:r>
+                      <a:endParaRPr lang="en-US" dirty="0"/>
+                    </a:p>
+                  </a:txBody>
+                  <a:tcPr marL="137160" marR="137160" marT="137160" marB="137160" anchor="ctr">
+                    <a:lnT w="12700" cap="flat" cmpd="sng" algn="ctr">
+                      <a:solidFill>
+                        <a:schemeClr val="tx1"/>
+                      </a:solidFill>
+                      <a:prstDash val="solid"/>
+                      <a:round/>
+                      <a:headEnd type="none" w="med" len="med"/>
+                      <a:tailEnd type="none" w="med" len="med"/>
+                    </a:lnT>
+                    <a:lnB w="12700" cap="flat" cmpd="sng" algn="ctr">
+                      <a:solidFill>
+                        <a:schemeClr val="tx1"/>
+                      </a:solidFill>
+                      <a:prstDash val="solid"/>
+                      <a:round/>
+                      <a:headEnd type="none" w="med" len="med"/>
+                      <a:tailEnd type="none" w="med" len="med"/>
+                    </a:lnB>
+                  </a:tcPr>
+                </a:tc>
+                <a:tc>
+                  <a:txBody>
+                    <a:bodyPr/>
+                    <a:lstStyle/>
+                    <a:p>
+                      <a:pPr algn="just"/>
+                      <a:r>
+                        <a:rPr lang="en-US" dirty="0" err="1"/>
+                        <a:t>nemd</a:t>
+                      </a:r>
+                      <a:r>
+                        <a:rPr lang="en-US" dirty="0"/>
+                        <a:t>/</a:t>
+                      </a:r>
+                      <a:r>
+                        <a:rPr lang="en-US" dirty="0" err="1"/>
+                        <a:t>premake</a:t>
+                      </a:r>
+                      <a:endParaRPr lang="en-US" dirty="0"/>
+                    </a:p>
+                  </a:txBody>
+                  <a:tcPr marL="137160" marR="137160" marT="137160" marB="137160" anchor="ctr">
+                    <a:lnT w="12700" cap="flat" cmpd="sng" algn="ctr">
+                      <a:solidFill>
+                        <a:schemeClr val="tx1"/>
+                      </a:solidFill>
+                      <a:prstDash val="solid"/>
+                      <a:round/>
+                      <a:headEnd type="none" w="med" len="med"/>
+                      <a:tailEnd type="none" w="med" len="med"/>
+                    </a:lnT>
+                    <a:lnB w="12700" cap="flat" cmpd="sng" algn="ctr">
+                      <a:solidFill>
+                        <a:schemeClr val="tx1"/>
+                      </a:solidFill>
+                      <a:prstDash val="solid"/>
+                      <a:round/>
+                      <a:headEnd type="none" w="med" len="med"/>
+                      <a:tailEnd type="none" w="med" len="med"/>
+                    </a:lnB>
+                  </a:tcPr>
+                </a:tc>
+                <a:tc>
+                  <a:txBody>
+                    <a:bodyPr/>
+                    <a:lstStyle/>
+                    <a:p>
+                      <a:pPr algn="just"/>
+                      <a:r>
+                        <a:rPr lang="en-US" dirty="0"/>
+                        <a:t>Environmental configuration allows additional utilities, strongly recommended when opening a new shell.</a:t>
+                      </a:r>
+                    </a:p>
+                  </a:txBody>
+                  <a:tcPr marL="137160" marR="137160" marT="137160" marB="137160" anchor="ctr">
+                    <a:lnT w="12700" cap="flat" cmpd="sng" algn="ctr">
+                      <a:solidFill>
+                        <a:schemeClr val="tx1"/>
+                      </a:solidFill>
+                      <a:prstDash val="solid"/>
+                      <a:round/>
+                      <a:headEnd type="none" w="med" len="med"/>
+                      <a:tailEnd type="none" w="med" len="med"/>
+                    </a:lnT>
+                    <a:lnB w="12700" cap="flat" cmpd="sng" algn="ctr">
+                      <a:solidFill>
+                        <a:schemeClr val="tx1"/>
+                      </a:solidFill>
+                      <a:prstDash val="solid"/>
+                      <a:round/>
+                      <a:headEnd type="none" w="med" len="med"/>
+                      <a:tailEnd type="none" w="med" len="med"/>
+                    </a:lnB>
+                  </a:tcPr>
+                </a:tc>
+                <a:extLst>
+                  <a:ext uri="{0D108BD9-81ED-4DB2-BD59-A6C34878D82A}">
+                    <a16:rowId xmlns:a16="http://schemas.microsoft.com/office/drawing/2014/main" val="1825471136"/>
+                  </a:ext>
+                </a:extLst>
+              </a:tr>
+              <a:tr h="898096">
+                <a:tc>
+                  <a:txBody>
+                    <a:bodyPr/>
+                    <a:lstStyle/>
+                    <a:p>
+                      <a:pPr algn="just"/>
+                      <a:r>
+                        <a:rPr lang="en-US" sz="1800" dirty="0" err="1"/>
+                        <a:t>run_test</a:t>
+                      </a:r>
+                      <a:endParaRPr lang="en-US" dirty="0"/>
+                    </a:p>
+                  </a:txBody>
+                  <a:tcPr marL="137160" marR="137160" marT="137160" marB="137160" anchor="ctr">
+                    <a:lnT w="12700" cap="flat" cmpd="sng" algn="ctr">
+                      <a:solidFill>
+                        <a:schemeClr val="tx1"/>
+                      </a:solidFill>
+                      <a:prstDash val="solid"/>
+                      <a:round/>
+                      <a:headEnd type="none" w="med" len="med"/>
+                      <a:tailEnd type="none" w="med" len="med"/>
+                    </a:lnT>
+                    <a:lnB w="12700" cap="flat" cmpd="sng" algn="ctr">
+                      <a:solidFill>
+                        <a:schemeClr val="tx1"/>
+                      </a:solidFill>
+                      <a:prstDash val="solid"/>
+                      <a:round/>
+                      <a:headEnd type="none" w="med" len="med"/>
+                      <a:tailEnd type="none" w="med" len="med"/>
+                    </a:lnB>
+                  </a:tcPr>
+                </a:tc>
+                <a:tc>
+                  <a:txBody>
+                    <a:bodyPr/>
+                    <a:lstStyle/>
+                    <a:p>
+                      <a:pPr algn="just"/>
+                      <a:r>
+                        <a:rPr lang="en-US" sz="1800" dirty="0" err="1"/>
+                        <a:t>nemd</a:t>
+                      </a:r>
+                      <a:r>
+                        <a:rPr lang="en-US" sz="1800" dirty="0"/>
+                        <a:t>/test/*_</a:t>
+                      </a:r>
+                      <a:r>
+                        <a:rPr lang="en-US" sz="1800" dirty="0" err="1"/>
+                        <a:t>test.py</a:t>
+                      </a:r>
+                      <a:r>
+                        <a:rPr lang="en-US" sz="1800" dirty="0"/>
+                        <a:t> </a:t>
+                      </a:r>
+                      <a:r>
+                        <a:rPr lang="en-US" sz="1800" dirty="0" err="1"/>
+                        <a:t>nemd</a:t>
+                      </a:r>
+                      <a:r>
+                        <a:rPr lang="en-US" sz="1800" dirty="0"/>
+                        <a:t>/module/*_</a:t>
+                      </a:r>
+                      <a:r>
+                        <a:rPr lang="en-US" sz="1800" dirty="0" err="1"/>
+                        <a:t>test.py</a:t>
+                      </a:r>
+                      <a:endParaRPr lang="en-US" dirty="0"/>
+                    </a:p>
+                  </a:txBody>
+                  <a:tcPr marL="137160" marR="137160" marT="137160" marB="137160" anchor="ctr">
+                    <a:lnT w="12700" cap="flat" cmpd="sng" algn="ctr">
+                      <a:solidFill>
+                        <a:schemeClr val="tx1"/>
+                      </a:solidFill>
+                      <a:prstDash val="solid"/>
+                      <a:round/>
+                      <a:headEnd type="none" w="med" len="med"/>
+                      <a:tailEnd type="none" w="med" len="med"/>
+                    </a:lnT>
+                    <a:lnB w="12700" cap="flat" cmpd="sng" algn="ctr">
+                      <a:solidFill>
+                        <a:schemeClr val="tx1"/>
+                      </a:solidFill>
+                      <a:prstDash val="solid"/>
+                      <a:round/>
+                      <a:headEnd type="none" w="med" len="med"/>
+                      <a:tailEnd type="none" w="med" len="med"/>
+                    </a:lnB>
+                  </a:tcPr>
+                </a:tc>
+                <a:tc>
+                  <a:txBody>
+                    <a:bodyPr/>
+                    <a:lstStyle/>
+                    <a:p>
+                      <a:pPr algn="just"/>
+                      <a:r>
+                        <a:rPr lang="en-US" sz="1800" dirty="0">
+                          <a:solidFill>
+                            <a:schemeClr val="accent4">
+                              <a:lumMod val="75000"/>
+                            </a:schemeClr>
+                          </a:solidFill>
+                        </a:rPr>
+                        <a:t>Unit testing </a:t>
+                      </a:r>
+                      <a:r>
+                        <a:rPr lang="en-US" sz="1800" dirty="0"/>
+                        <a:t>makes sure that functions and class methods are operating properly.</a:t>
+                      </a:r>
+                      <a:endParaRPr lang="en-US" dirty="0"/>
+                    </a:p>
+                  </a:txBody>
+                  <a:tcPr marL="137160" marR="137160" marT="137160" marB="137160" anchor="ctr">
+                    <a:lnT w="12700" cap="flat" cmpd="sng" algn="ctr">
+                      <a:solidFill>
+                        <a:schemeClr val="tx1"/>
+                      </a:solidFill>
+                      <a:prstDash val="solid"/>
+                      <a:round/>
+                      <a:headEnd type="none" w="med" len="med"/>
+                      <a:tailEnd type="none" w="med" len="med"/>
+                    </a:lnT>
+                    <a:lnB w="12700" cap="flat" cmpd="sng" algn="ctr">
+                      <a:solidFill>
+                        <a:schemeClr val="tx1"/>
+                      </a:solidFill>
+                      <a:prstDash val="solid"/>
+                      <a:round/>
+                      <a:headEnd type="none" w="med" len="med"/>
+                      <a:tailEnd type="none" w="med" len="med"/>
+                    </a:lnB>
+                  </a:tcPr>
+                </a:tc>
+                <a:extLst>
+                  <a:ext uri="{0D108BD9-81ED-4DB2-BD59-A6C34878D82A}">
+                    <a16:rowId xmlns:a16="http://schemas.microsoft.com/office/drawing/2014/main" val="1370259124"/>
+                  </a:ext>
+                </a:extLst>
+              </a:tr>
+              <a:tr h="898096">
+                <a:tc>
+                  <a:txBody>
+                    <a:bodyPr/>
+                    <a:lstStyle/>
+                    <a:p>
+                      <a:pPr algn="just"/>
+                      <a:r>
+                        <a:rPr lang="en-US" dirty="0" err="1"/>
+                        <a:t>run_itest</a:t>
+                      </a:r>
+                      <a:endParaRPr lang="en-US" dirty="0"/>
+                    </a:p>
+                  </a:txBody>
+                  <a:tcPr marL="137160" marR="137160" marT="137160" marB="137160" anchor="ctr">
+                    <a:lnT w="12700" cap="flat" cmpd="sng" algn="ctr">
+                      <a:solidFill>
+                        <a:schemeClr val="tx1"/>
+                      </a:solidFill>
+                      <a:prstDash val="solid"/>
+                      <a:round/>
+                      <a:headEnd type="none" w="med" len="med"/>
+                      <a:tailEnd type="none" w="med" len="med"/>
+                    </a:lnT>
+                    <a:lnB w="12700" cap="flat" cmpd="sng" algn="ctr">
+                      <a:solidFill>
+                        <a:schemeClr val="tx1"/>
+                      </a:solidFill>
+                      <a:prstDash val="solid"/>
+                      <a:round/>
+                      <a:headEnd type="none" w="med" len="med"/>
+                      <a:tailEnd type="none" w="med" len="med"/>
+                    </a:lnB>
+                  </a:tcPr>
+                </a:tc>
+                <a:tc>
+                  <a:txBody>
+                    <a:bodyPr/>
+                    <a:lstStyle/>
+                    <a:p>
+                      <a:pPr marL="0" marR="0" lvl="0" indent="0" algn="just" defTabSz="914400" rtl="0" eaLnBrk="1" fontAlgn="auto" latinLnBrk="0" hangingPunct="1">
+                        <a:lnSpc>
+                          <a:spcPct val="100000"/>
+                        </a:lnSpc>
+                        <a:spcBef>
+                          <a:spcPts val="0"/>
+                        </a:spcBef>
+                        <a:spcAft>
+                          <a:spcPts val="0"/>
+                        </a:spcAft>
+                        <a:buClrTx/>
+                        <a:buSzTx/>
+                        <a:buFontTx/>
+                        <a:buNone/>
+                        <a:tabLst/>
+                        <a:defRPr/>
+                      </a:pPr>
+                      <a:r>
+                        <a:rPr lang="en-US" dirty="0" err="1"/>
+                        <a:t>nemd</a:t>
+                      </a:r>
+                      <a:r>
+                        <a:rPr lang="en-US" dirty="0"/>
+                        <a:t>/test/integration/</a:t>
+                      </a:r>
+                    </a:p>
+                  </a:txBody>
+                  <a:tcPr marL="137160" marR="137160" marT="137160" marB="137160" anchor="ctr">
+                    <a:lnT w="12700" cap="flat" cmpd="sng" algn="ctr">
+                      <a:solidFill>
+                        <a:schemeClr val="tx1"/>
+                      </a:solidFill>
+                      <a:prstDash val="solid"/>
+                      <a:round/>
+                      <a:headEnd type="none" w="med" len="med"/>
+                      <a:tailEnd type="none" w="med" len="med"/>
+                    </a:lnT>
+                    <a:lnB w="12700" cap="flat" cmpd="sng" algn="ctr">
+                      <a:solidFill>
+                        <a:schemeClr val="tx1"/>
+                      </a:solidFill>
+                      <a:prstDash val="solid"/>
+                      <a:round/>
+                      <a:headEnd type="none" w="med" len="med"/>
+                      <a:tailEnd type="none" w="med" len="med"/>
+                    </a:lnB>
+                  </a:tcPr>
+                </a:tc>
+                <a:tc>
+                  <a:txBody>
+                    <a:bodyPr/>
+                    <a:lstStyle/>
+                    <a:p>
+                      <a:pPr algn="just"/>
+                      <a:r>
+                        <a:rPr lang="en-US" sz="1800" kern="1200" dirty="0">
+                          <a:solidFill>
+                            <a:schemeClr val="accent6"/>
+                          </a:solidFill>
+                          <a:effectLst/>
+                        </a:rPr>
+                        <a:t>Integration testing</a:t>
+                      </a:r>
+                      <a:r>
+                        <a:rPr lang="en-US" sz="1800" kern="1200" dirty="0">
+                          <a:effectLst/>
+                        </a:rPr>
+                        <a:t> </a:t>
+                      </a:r>
+                      <a:r>
+                        <a:rPr lang="en-US" sz="1800" dirty="0"/>
+                        <a:t>makes sure that driver scripts run normally yielding expected results.</a:t>
+                      </a:r>
+                      <a:endParaRPr lang="en-US" dirty="0"/>
+                    </a:p>
+                  </a:txBody>
+                  <a:tcPr marL="137160" marR="137160" marT="137160" marB="137160" anchor="ctr">
+                    <a:lnT w="12700" cap="flat" cmpd="sng" algn="ctr">
+                      <a:solidFill>
+                        <a:schemeClr val="tx1"/>
+                      </a:solidFill>
+                      <a:prstDash val="solid"/>
+                      <a:round/>
+                      <a:headEnd type="none" w="med" len="med"/>
+                      <a:tailEnd type="none" w="med" len="med"/>
+                    </a:lnT>
+                    <a:lnB w="12700" cap="flat" cmpd="sng" algn="ctr">
+                      <a:solidFill>
+                        <a:schemeClr val="tx1"/>
+                      </a:solidFill>
+                      <a:prstDash val="solid"/>
+                      <a:round/>
+                      <a:headEnd type="none" w="med" len="med"/>
+                      <a:tailEnd type="none" w="med" len="med"/>
+                    </a:lnB>
+                  </a:tcPr>
+                </a:tc>
+                <a:extLst>
+                  <a:ext uri="{0D108BD9-81ED-4DB2-BD59-A6C34878D82A}">
+                    <a16:rowId xmlns:a16="http://schemas.microsoft.com/office/drawing/2014/main" val="1118220872"/>
+                  </a:ext>
+                </a:extLst>
+              </a:tr>
+              <a:tr h="898096">
+                <a:tc>
+                  <a:txBody>
+                    <a:bodyPr/>
+                    <a:lstStyle/>
+                    <a:p>
+                      <a:pPr algn="just"/>
+                      <a:r>
+                        <a:rPr lang="en-US" dirty="0"/>
+                        <a:t>bash </a:t>
+                      </a:r>
+                      <a:r>
+                        <a:rPr lang="en-US" dirty="0" err="1"/>
+                        <a:t>cmd</a:t>
+                      </a:r>
+                      <a:endParaRPr lang="en-US" dirty="0"/>
+                    </a:p>
+                  </a:txBody>
+                  <a:tcPr marL="137160" marR="137160" marT="137160" marB="137160" anchor="ctr">
+                    <a:lnT w="12700" cap="flat" cmpd="sng" algn="ctr">
+                      <a:solidFill>
+                        <a:schemeClr val="tx1"/>
+                      </a:solidFill>
+                      <a:prstDash val="solid"/>
+                      <a:round/>
+                      <a:headEnd type="none" w="med" len="med"/>
+                      <a:tailEnd type="none" w="med" len="med"/>
+                    </a:lnT>
+                  </a:tcPr>
+                </a:tc>
+                <a:tc>
+                  <a:txBody>
+                    <a:bodyPr/>
+                    <a:lstStyle/>
+                    <a:p>
+                      <a:pPr algn="just"/>
+                      <a:r>
+                        <a:rPr lang="en-US" dirty="0" err="1"/>
+                        <a:t>nemd</a:t>
+                      </a:r>
+                      <a:r>
+                        <a:rPr lang="en-US" dirty="0"/>
+                        <a:t>/test/</a:t>
+                      </a:r>
+                      <a:r>
+                        <a:rPr lang="en-US" dirty="0" err="1"/>
+                        <a:t>scientific_test</a:t>
+                      </a:r>
+                      <a:r>
+                        <a:rPr lang="en-US" dirty="0"/>
+                        <a:t>/*/</a:t>
+                      </a:r>
+                    </a:p>
+                  </a:txBody>
+                  <a:tcPr marL="137160" marR="137160" marT="137160" marB="137160" anchor="ctr">
+                    <a:lnT w="12700" cap="flat" cmpd="sng" algn="ctr">
+                      <a:solidFill>
+                        <a:schemeClr val="tx1"/>
+                      </a:solidFill>
+                      <a:prstDash val="solid"/>
+                      <a:round/>
+                      <a:headEnd type="none" w="med" len="med"/>
+                      <a:tailEnd type="none" w="med" len="med"/>
+                    </a:lnT>
+                  </a:tcPr>
+                </a:tc>
+                <a:tc>
+                  <a:txBody>
+                    <a:bodyPr/>
+                    <a:lstStyle/>
+                    <a:p>
+                      <a:pPr algn="just"/>
+                      <a:r>
+                        <a:rPr lang="en-US" sz="1800" dirty="0">
+                          <a:solidFill>
+                            <a:schemeClr val="accent1"/>
+                          </a:solidFill>
+                        </a:rPr>
+                        <a:t>Manually testing </a:t>
+                      </a:r>
+                      <a:r>
+                        <a:rPr lang="en-US" sz="1800" dirty="0"/>
+                        <a:t>using the </a:t>
+                      </a:r>
+                      <a:r>
+                        <a:rPr lang="en-US" sz="1800" dirty="0" err="1"/>
+                        <a:t>cmd</a:t>
+                      </a:r>
+                      <a:r>
+                        <a:rPr lang="en-US" sz="1800" dirty="0"/>
+                        <a:t> files in each subfolder makes sure of the scientific outputs from drivers and workflows.</a:t>
+                      </a:r>
+                      <a:endParaRPr lang="en-US" dirty="0"/>
+                    </a:p>
+                  </a:txBody>
+                  <a:tcPr marL="137160" marR="137160" marT="137160" marB="137160" anchor="ctr">
+                    <a:lnT w="12700" cap="flat" cmpd="sng" algn="ctr">
+                      <a:solidFill>
+                        <a:schemeClr val="tx1"/>
+                      </a:solidFill>
+                      <a:prstDash val="solid"/>
+                      <a:round/>
+                      <a:headEnd type="none" w="med" len="med"/>
+                      <a:tailEnd type="none" w="med" len="med"/>
+                    </a:lnT>
+                  </a:tcPr>
+                </a:tc>
+                <a:extLst>
+                  <a:ext uri="{0D108BD9-81ED-4DB2-BD59-A6C34878D82A}">
+                    <a16:rowId xmlns:a16="http://schemas.microsoft.com/office/drawing/2014/main" val="1872328772"/>
+                  </a:ext>
+                </a:extLst>
+              </a:tr>
+            </a:tbl>
+          </a:graphicData>
+        </a:graphic>
+      </p:graphicFrame>
+      <p:graphicFrame>
+        <p:nvGraphicFramePr>
+          <p:cNvPr id="6" name="Diagram 5">
+            <a:extLst>
+              <a:ext uri="{FF2B5EF4-FFF2-40B4-BE49-F238E27FC236}">
+                <a16:creationId xmlns:a16="http://schemas.microsoft.com/office/drawing/2014/main" id="{F1048F2F-0844-2E45-9091-AA5D125314BF}"/>
+              </a:ext>
+            </a:extLst>
+          </p:cNvPr>
+          <p:cNvGraphicFramePr/>
+          <p:nvPr>
+            <p:extLst>
+              <p:ext uri="{D42A27DB-BD31-4B8C-83A1-F6EECF244321}">
+                <p14:modId xmlns:p14="http://schemas.microsoft.com/office/powerpoint/2010/main" val="212388920"/>
+              </p:ext>
+            </p:extLst>
+          </p:nvPr>
+        </p:nvGraphicFramePr>
+        <p:xfrm>
+          <a:off x="9490366" y="828400"/>
+          <a:ext cx="2373744" cy="1562793"/>
+        </p:xfrm>
+        <a:graphic>
+          <a:graphicData uri="http://schemas.openxmlformats.org/drawingml/2006/diagram">
+            <dgm:relIds xmlns:dgm="http://schemas.openxmlformats.org/drawingml/2006/diagram" xmlns:r="http://schemas.openxmlformats.org/officeDocument/2006/relationships" r:dm="rId3" r:lo="rId4" r:qs="rId5" r:cs="rId6"/>
+          </a:graphicData>
+        </a:graphic>
+      </p:graphicFrame>
     </p:spTree>
     <p:extLst>
       <p:ext uri="{BB962C8B-B14F-4D97-AF65-F5344CB8AC3E}">
@@ -4537,4 +8377,299 @@
     </a:ext>
   </a:extLst>
 </a:theme>
+</file>
+
+<file path=ppt/theme/theme2.xml><?xml version="1.0" encoding="utf-8"?>
+<a:theme xmlns:a="http://schemas.openxmlformats.org/drawingml/2006/main" name="Office Theme">
+  <a:themeElements>
+    <a:clrScheme name="Office">
+      <a:dk1>
+        <a:sysClr val="windowText" lastClr="000000"/>
+      </a:dk1>
+      <a:lt1>
+        <a:sysClr val="window" lastClr="FFFFFF"/>
+      </a:lt1>
+      <a:dk2>
+        <a:srgbClr val="44546A"/>
+      </a:dk2>
+      <a:lt2>
+        <a:srgbClr val="E7E6E6"/>
+      </a:lt2>
+      <a:accent1>
+        <a:srgbClr val="4472C4"/>
+      </a:accent1>
+      <a:accent2>
+        <a:srgbClr val="ED7D31"/>
+      </a:accent2>
+      <a:accent3>
+        <a:srgbClr val="A5A5A5"/>
+      </a:accent3>
+      <a:accent4>
+        <a:srgbClr val="FFC000"/>
+      </a:accent4>
+      <a:accent5>
+        <a:srgbClr val="5B9BD5"/>
+      </a:accent5>
+      <a:accent6>
+        <a:srgbClr val="70AD47"/>
+      </a:accent6>
+      <a:hlink>
+        <a:srgbClr val="0563C1"/>
+      </a:hlink>
+      <a:folHlink>
+        <a:srgbClr val="954F72"/>
+      </a:folHlink>
+    </a:clrScheme>
+    <a:fontScheme name="Office">
+      <a:majorFont>
+        <a:latin typeface="Calibri Light" panose="020F0302020204030204"/>
+        <a:ea typeface=""/>
+        <a:cs typeface=""/>
+        <a:font script="Jpan" typeface="游ゴシック Light"/>
+        <a:font script="Hang" typeface="맑은 고딕"/>
+        <a:font script="Hans" typeface="等线 Light"/>
+        <a:font script="Hant" typeface="新細明體"/>
+        <a:font script="Arab" typeface="Times New Roman"/>
+        <a:font script="Hebr" typeface="Times New Roman"/>
+        <a:font script="Thai" typeface="Angsana New"/>
+        <a:font script="Ethi" typeface="Nyala"/>
+        <a:font script="Beng" typeface="Vrinda"/>
+        <a:font script="Gujr" typeface="Shruti"/>
+        <a:font script="Khmr" typeface="MoolBoran"/>
+        <a:font script="Knda" typeface="Tunga"/>
+        <a:font script="Guru" typeface="Raavi"/>
+        <a:font script="Cans" typeface="Euphemia"/>
+        <a:font script="Cher" typeface="Plantagenet Cherokee"/>
+        <a:font script="Yiii" typeface="Microsoft Yi Baiti"/>
+        <a:font script="Tibt" typeface="Microsoft Himalaya"/>
+        <a:font script="Thaa" typeface="MV Boli"/>
+        <a:font script="Deva" typeface="Mangal"/>
+        <a:font script="Telu" typeface="Gautami"/>
+        <a:font script="Taml" typeface="Latha"/>
+        <a:font script="Syrc" typeface="Estrangelo Edessa"/>
+        <a:font script="Orya" typeface="Kalinga"/>
+        <a:font script="Mlym" typeface="Kartika"/>
+        <a:font script="Laoo" typeface="DokChampa"/>
+        <a:font script="Sinh" typeface="Iskoola Pota"/>
+        <a:font script="Mong" typeface="Mongolian Baiti"/>
+        <a:font script="Viet" typeface="Times New Roman"/>
+        <a:font script="Uigh" typeface="Microsoft Uighur"/>
+        <a:font script="Geor" typeface="Sylfaen"/>
+        <a:font script="Armn" typeface="Arial"/>
+        <a:font script="Bugi" typeface="Leelawadee UI"/>
+        <a:font script="Bopo" typeface="Microsoft JhengHei"/>
+        <a:font script="Java" typeface="Javanese Text"/>
+        <a:font script="Lisu" typeface="Segoe UI"/>
+        <a:font script="Mymr" typeface="Myanmar Text"/>
+        <a:font script="Nkoo" typeface="Ebrima"/>
+        <a:font script="Olck" typeface="Nirmala UI"/>
+        <a:font script="Osma" typeface="Ebrima"/>
+        <a:font script="Phag" typeface="Phagspa"/>
+        <a:font script="Syrn" typeface="Estrangelo Edessa"/>
+        <a:font script="Syrj" typeface="Estrangelo Edessa"/>
+        <a:font script="Syre" typeface="Estrangelo Edessa"/>
+        <a:font script="Sora" typeface="Nirmala UI"/>
+        <a:font script="Tale" typeface="Microsoft Tai Le"/>
+        <a:font script="Talu" typeface="Microsoft New Tai Lue"/>
+        <a:font script="Tfng" typeface="Ebrima"/>
+      </a:majorFont>
+      <a:minorFont>
+        <a:latin typeface="Calibri" panose="020F0502020204030204"/>
+        <a:ea typeface=""/>
+        <a:cs typeface=""/>
+        <a:font script="Jpan" typeface="游ゴシック"/>
+        <a:font script="Hang" typeface="맑은 고딕"/>
+        <a:font script="Hans" typeface="等线"/>
+        <a:font script="Hant" typeface="新細明體"/>
+        <a:font script="Arab" typeface="Arial"/>
+        <a:font script="Hebr" typeface="Arial"/>
+        <a:font script="Thai" typeface="Cordia New"/>
+        <a:font script="Ethi" typeface="Nyala"/>
+        <a:font script="Beng" typeface="Vrinda"/>
+        <a:font script="Gujr" typeface="Shruti"/>
+        <a:font script="Khmr" typeface="DaunPenh"/>
+        <a:font script="Knda" typeface="Tunga"/>
+        <a:font script="Guru" typeface="Raavi"/>
+        <a:font script="Cans" typeface="Euphemia"/>
+        <a:font script="Cher" typeface="Plantagenet Cherokee"/>
+        <a:font script="Yiii" typeface="Microsoft Yi Baiti"/>
+        <a:font script="Tibt" typeface="Microsoft Himalaya"/>
+        <a:font script="Thaa" typeface="MV Boli"/>
+        <a:font script="Deva" typeface="Mangal"/>
+        <a:font script="Telu" typeface="Gautami"/>
+        <a:font script="Taml" typeface="Latha"/>
+        <a:font script="Syrc" typeface="Estrangelo Edessa"/>
+        <a:font script="Orya" typeface="Kalinga"/>
+        <a:font script="Mlym" typeface="Kartika"/>
+        <a:font script="Laoo" typeface="DokChampa"/>
+        <a:font script="Sinh" typeface="Iskoola Pota"/>
+        <a:font script="Mong" typeface="Mongolian Baiti"/>
+        <a:font script="Viet" typeface="Arial"/>
+        <a:font script="Uigh" typeface="Microsoft Uighur"/>
+        <a:font script="Geor" typeface="Sylfaen"/>
+        <a:font script="Armn" typeface="Arial"/>
+        <a:font script="Bugi" typeface="Leelawadee UI"/>
+        <a:font script="Bopo" typeface="Microsoft JhengHei"/>
+        <a:font script="Java" typeface="Javanese Text"/>
+        <a:font script="Lisu" typeface="Segoe UI"/>
+        <a:font script="Mymr" typeface="Myanmar Text"/>
+        <a:font script="Nkoo" typeface="Ebrima"/>
+        <a:font script="Olck" typeface="Nirmala UI"/>
+        <a:font script="Osma" typeface="Ebrima"/>
+        <a:font script="Phag" typeface="Phagspa"/>
+        <a:font script="Syrn" typeface="Estrangelo Edessa"/>
+        <a:font script="Syrj" typeface="Estrangelo Edessa"/>
+        <a:font script="Syre" typeface="Estrangelo Edessa"/>
+        <a:font script="Sora" typeface="Nirmala UI"/>
+        <a:font script="Tale" typeface="Microsoft Tai Le"/>
+        <a:font script="Talu" typeface="Microsoft New Tai Lue"/>
+        <a:font script="Tfng" typeface="Ebrima"/>
+      </a:minorFont>
+    </a:fontScheme>
+    <a:fmtScheme name="Office">
+      <a:fillStyleLst>
+        <a:solidFill>
+          <a:schemeClr val="phClr"/>
+        </a:solidFill>
+        <a:gradFill rotWithShape="1">
+          <a:gsLst>
+            <a:gs pos="0">
+              <a:schemeClr val="phClr">
+                <a:lumMod val="110000"/>
+                <a:satMod val="105000"/>
+                <a:tint val="67000"/>
+              </a:schemeClr>
+            </a:gs>
+            <a:gs pos="50000">
+              <a:schemeClr val="phClr">
+                <a:lumMod val="105000"/>
+                <a:satMod val="103000"/>
+                <a:tint val="73000"/>
+              </a:schemeClr>
+            </a:gs>
+            <a:gs pos="100000">
+              <a:schemeClr val="phClr">
+                <a:lumMod val="105000"/>
+                <a:satMod val="109000"/>
+                <a:tint val="81000"/>
+              </a:schemeClr>
+            </a:gs>
+          </a:gsLst>
+          <a:lin ang="5400000" scaled="0"/>
+        </a:gradFill>
+        <a:gradFill rotWithShape="1">
+          <a:gsLst>
+            <a:gs pos="0">
+              <a:schemeClr val="phClr">
+                <a:satMod val="103000"/>
+                <a:lumMod val="102000"/>
+                <a:tint val="94000"/>
+              </a:schemeClr>
+            </a:gs>
+            <a:gs pos="50000">
+              <a:schemeClr val="phClr">
+                <a:satMod val="110000"/>
+                <a:lumMod val="100000"/>
+                <a:shade val="100000"/>
+              </a:schemeClr>
+            </a:gs>
+            <a:gs pos="100000">
+              <a:schemeClr val="phClr">
+                <a:lumMod val="99000"/>
+                <a:satMod val="120000"/>
+                <a:shade val="78000"/>
+              </a:schemeClr>
+            </a:gs>
+          </a:gsLst>
+          <a:lin ang="5400000" scaled="0"/>
+        </a:gradFill>
+      </a:fillStyleLst>
+      <a:lnStyleLst>
+        <a:ln w="6350" cap="flat" cmpd="sng" algn="ctr">
+          <a:solidFill>
+            <a:schemeClr val="phClr"/>
+          </a:solidFill>
+          <a:prstDash val="solid"/>
+          <a:miter lim="800000"/>
+        </a:ln>
+        <a:ln w="12700" cap="flat" cmpd="sng" algn="ctr">
+          <a:solidFill>
+            <a:schemeClr val="phClr"/>
+          </a:solidFill>
+          <a:prstDash val="solid"/>
+          <a:miter lim="800000"/>
+        </a:ln>
+        <a:ln w="19050" cap="flat" cmpd="sng" algn="ctr">
+          <a:solidFill>
+            <a:schemeClr val="phClr"/>
+          </a:solidFill>
+          <a:prstDash val="solid"/>
+          <a:miter lim="800000"/>
+        </a:ln>
+      </a:lnStyleLst>
+      <a:effectStyleLst>
+        <a:effectStyle>
+          <a:effectLst/>
+        </a:effectStyle>
+        <a:effectStyle>
+          <a:effectLst/>
+        </a:effectStyle>
+        <a:effectStyle>
+          <a:effectLst>
+            <a:outerShdw blurRad="57150" dist="19050" dir="5400000" algn="ctr" rotWithShape="0">
+              <a:srgbClr val="000000">
+                <a:alpha val="63000"/>
+              </a:srgbClr>
+            </a:outerShdw>
+          </a:effectLst>
+        </a:effectStyle>
+      </a:effectStyleLst>
+      <a:bgFillStyleLst>
+        <a:solidFill>
+          <a:schemeClr val="phClr"/>
+        </a:solidFill>
+        <a:solidFill>
+          <a:schemeClr val="phClr">
+            <a:tint val="95000"/>
+            <a:satMod val="170000"/>
+          </a:schemeClr>
+        </a:solidFill>
+        <a:gradFill rotWithShape="1">
+          <a:gsLst>
+            <a:gs pos="0">
+              <a:schemeClr val="phClr">
+                <a:tint val="93000"/>
+                <a:satMod val="150000"/>
+                <a:shade val="98000"/>
+                <a:lumMod val="102000"/>
+              </a:schemeClr>
+            </a:gs>
+            <a:gs pos="50000">
+              <a:schemeClr val="phClr">
+                <a:tint val="98000"/>
+                <a:satMod val="130000"/>
+                <a:shade val="90000"/>
+                <a:lumMod val="103000"/>
+              </a:schemeClr>
+            </a:gs>
+            <a:gs pos="100000">
+              <a:schemeClr val="phClr">
+                <a:shade val="63000"/>
+                <a:satMod val="120000"/>
+              </a:schemeClr>
+            </a:gs>
+          </a:gsLst>
+          <a:lin ang="5400000" scaled="0"/>
+        </a:gradFill>
+      </a:bgFillStyleLst>
+    </a:fmtScheme>
+  </a:themeElements>
+  <a:objectDefaults/>
+  <a:extraClrSchemeLst/>
+  <a:extLst>
+    <a:ext uri="{05A4C25C-085E-4340-85A3-A5531E510DB2}">
+      <thm15:themeFamily xmlns:thm15="http://schemas.microsoft.com/office/thememl/2012/main" name="Office Theme" id="{62F939B6-93AF-4DB8-9C6B-D6C7DFDC589F}" vid="{4A3C46E8-61CC-4603-A589-7422A47A8E4A}"/>
+    </a:ext>
+  </a:extLst>
+</a:theme>
 </file>
</xml_diff>